<commit_message>
this version has clause and function outline marked in orange to provide guidance and shape to lesson
</commit_message>
<xml_diff>
--- a/times_and_dates.pptx
+++ b/times_and_dates.pptx
@@ -18,18 +18,27 @@
     <p:sldId id="267" r:id="rId12"/>
     <p:sldId id="268" r:id="rId13"/>
     <p:sldId id="272" r:id="rId14"/>
-    <p:sldId id="273" r:id="rId15"/>
-    <p:sldId id="263" r:id="rId16"/>
-    <p:sldId id="264" r:id="rId17"/>
-    <p:sldId id="265" r:id="rId18"/>
-    <p:sldId id="277" r:id="rId19"/>
-    <p:sldId id="259" r:id="rId20"/>
-    <p:sldId id="269" r:id="rId21"/>
-    <p:sldId id="270" r:id="rId22"/>
-    <p:sldId id="275" r:id="rId23"/>
-    <p:sldId id="276" r:id="rId24"/>
-    <p:sldId id="260" r:id="rId25"/>
-    <p:sldId id="261" r:id="rId26"/>
+    <p:sldId id="289" r:id="rId15"/>
+    <p:sldId id="288" r:id="rId16"/>
+    <p:sldId id="290" r:id="rId17"/>
+    <p:sldId id="287" r:id="rId18"/>
+    <p:sldId id="291" r:id="rId19"/>
+    <p:sldId id="273" r:id="rId20"/>
+    <p:sldId id="263" r:id="rId21"/>
+    <p:sldId id="264" r:id="rId22"/>
+    <p:sldId id="265" r:id="rId23"/>
+    <p:sldId id="277" r:id="rId24"/>
+    <p:sldId id="259" r:id="rId25"/>
+    <p:sldId id="269" r:id="rId26"/>
+    <p:sldId id="270" r:id="rId27"/>
+    <p:sldId id="275" r:id="rId28"/>
+    <p:sldId id="276" r:id="rId29"/>
+    <p:sldId id="260" r:id="rId30"/>
+    <p:sldId id="261" r:id="rId31"/>
+    <p:sldId id="284" r:id="rId32"/>
+    <p:sldId id="283" r:id="rId33"/>
+    <p:sldId id="285" r:id="rId34"/>
+    <p:sldId id="286" r:id="rId35"/>
   </p:sldIdLst>
   <p:sldSz cx="12192000" cy="6858000"/>
   <p:notesSz cx="6858000" cy="9144000"/>
@@ -283,7 +292,7 @@
           <a:p>
             <a:fld id="{2F74CE59-38D4-45E4-AB46-7030959C2F5B}" type="datetimeFigureOut">
               <a:rPr lang="en-US" smtClean="0"/>
-              <a:t>4/15/2020</a:t>
+              <a:t>4/16/2020</a:t>
             </a:fld>
             <a:endParaRPr lang="en-US"/>
           </a:p>
@@ -481,7 +490,7 @@
           <a:p>
             <a:fld id="{2F74CE59-38D4-45E4-AB46-7030959C2F5B}" type="datetimeFigureOut">
               <a:rPr lang="en-US" smtClean="0"/>
-              <a:t>4/15/2020</a:t>
+              <a:t>4/16/2020</a:t>
             </a:fld>
             <a:endParaRPr lang="en-US"/>
           </a:p>
@@ -689,7 +698,7 @@
           <a:p>
             <a:fld id="{2F74CE59-38D4-45E4-AB46-7030959C2F5B}" type="datetimeFigureOut">
               <a:rPr lang="en-US" smtClean="0"/>
-              <a:t>4/15/2020</a:t>
+              <a:t>4/16/2020</a:t>
             </a:fld>
             <a:endParaRPr lang="en-US"/>
           </a:p>
@@ -887,7 +896,7 @@
           <a:p>
             <a:fld id="{2F74CE59-38D4-45E4-AB46-7030959C2F5B}" type="datetimeFigureOut">
               <a:rPr lang="en-US" smtClean="0"/>
-              <a:t>4/15/2020</a:t>
+              <a:t>4/16/2020</a:t>
             </a:fld>
             <a:endParaRPr lang="en-US"/>
           </a:p>
@@ -1162,7 +1171,7 @@
           <a:p>
             <a:fld id="{2F74CE59-38D4-45E4-AB46-7030959C2F5B}" type="datetimeFigureOut">
               <a:rPr lang="en-US" smtClean="0"/>
-              <a:t>4/15/2020</a:t>
+              <a:t>4/16/2020</a:t>
             </a:fld>
             <a:endParaRPr lang="en-US"/>
           </a:p>
@@ -1427,7 +1436,7 @@
           <a:p>
             <a:fld id="{2F74CE59-38D4-45E4-AB46-7030959C2F5B}" type="datetimeFigureOut">
               <a:rPr lang="en-US" smtClean="0"/>
-              <a:t>4/15/2020</a:t>
+              <a:t>4/16/2020</a:t>
             </a:fld>
             <a:endParaRPr lang="en-US"/>
           </a:p>
@@ -1839,7 +1848,7 @@
           <a:p>
             <a:fld id="{2F74CE59-38D4-45E4-AB46-7030959C2F5B}" type="datetimeFigureOut">
               <a:rPr lang="en-US" smtClean="0"/>
-              <a:t>4/15/2020</a:t>
+              <a:t>4/16/2020</a:t>
             </a:fld>
             <a:endParaRPr lang="en-US"/>
           </a:p>
@@ -1980,7 +1989,7 @@
           <a:p>
             <a:fld id="{2F74CE59-38D4-45E4-AB46-7030959C2F5B}" type="datetimeFigureOut">
               <a:rPr lang="en-US" smtClean="0"/>
-              <a:t>4/15/2020</a:t>
+              <a:t>4/16/2020</a:t>
             </a:fld>
             <a:endParaRPr lang="en-US"/>
           </a:p>
@@ -2093,7 +2102,7 @@
           <a:p>
             <a:fld id="{2F74CE59-38D4-45E4-AB46-7030959C2F5B}" type="datetimeFigureOut">
               <a:rPr lang="en-US" smtClean="0"/>
-              <a:t>4/15/2020</a:t>
+              <a:t>4/16/2020</a:t>
             </a:fld>
             <a:endParaRPr lang="en-US"/>
           </a:p>
@@ -2404,7 +2413,7 @@
           <a:p>
             <a:fld id="{2F74CE59-38D4-45E4-AB46-7030959C2F5B}" type="datetimeFigureOut">
               <a:rPr lang="en-US" smtClean="0"/>
-              <a:t>4/15/2020</a:t>
+              <a:t>4/16/2020</a:t>
             </a:fld>
             <a:endParaRPr lang="en-US"/>
           </a:p>
@@ -2692,7 +2701,7 @@
           <a:p>
             <a:fld id="{2F74CE59-38D4-45E4-AB46-7030959C2F5B}" type="datetimeFigureOut">
               <a:rPr lang="en-US" smtClean="0"/>
-              <a:t>4/15/2020</a:t>
+              <a:t>4/16/2020</a:t>
             </a:fld>
             <a:endParaRPr lang="en-US"/>
           </a:p>
@@ -2933,7 +2942,7 @@
           <a:p>
             <a:fld id="{2F74CE59-38D4-45E4-AB46-7030959C2F5B}" type="datetimeFigureOut">
               <a:rPr lang="en-US" smtClean="0"/>
-              <a:t>4/15/2020</a:t>
+              <a:t>4/16/2020</a:t>
             </a:fld>
             <a:endParaRPr lang="en-US"/>
           </a:p>
@@ -5936,6 +5945,704 @@
           <p:cNvPr id="2" name="Title 1">
             <a:extLst>
               <a:ext uri="{FF2B5EF4-FFF2-40B4-BE49-F238E27FC236}">
+                <a16:creationId xmlns:a16="http://schemas.microsoft.com/office/drawing/2014/main" id="{20288032-0A35-4119-9DC7-22FA6B8E9797}"/>
+              </a:ext>
+            </a:extLst>
+          </p:cNvPr>
+          <p:cNvSpPr>
+            <a:spLocks noGrp="1"/>
+          </p:cNvSpPr>
+          <p:nvPr>
+            <p:ph type="title"/>
+          </p:nvPr>
+        </p:nvSpPr>
+        <p:spPr>
+          <a:solidFill>
+            <a:schemeClr val="accent2">
+              <a:lumMod val="60000"/>
+              <a:lumOff val="40000"/>
+            </a:schemeClr>
+          </a:solidFill>
+        </p:spPr>
+        <p:txBody>
+          <a:bodyPr/>
+          <a:lstStyle/>
+          <a:p>
+            <a:r>
+              <a:rPr lang="en-US" dirty="0"/>
+              <a:t>What time is it?</a:t>
+            </a:r>
+          </a:p>
+        </p:txBody>
+      </p:sp>
+      <p:sp>
+        <p:nvSpPr>
+          <p:cNvPr id="3" name="Content Placeholder 2">
+            <a:extLst>
+              <a:ext uri="{FF2B5EF4-FFF2-40B4-BE49-F238E27FC236}">
+                <a16:creationId xmlns:a16="http://schemas.microsoft.com/office/drawing/2014/main" id="{8656073D-84FA-4E86-8A41-365BD88E422A}"/>
+              </a:ext>
+            </a:extLst>
+          </p:cNvPr>
+          <p:cNvSpPr>
+            <a:spLocks noGrp="1"/>
+          </p:cNvSpPr>
+          <p:nvPr>
+            <p:ph idx="1"/>
+          </p:nvPr>
+        </p:nvSpPr>
+        <p:spPr/>
+        <p:txBody>
+          <a:bodyPr>
+            <a:normAutofit fontScale="92500" lnSpcReduction="20000"/>
+          </a:bodyPr>
+          <a:lstStyle/>
+          <a:p>
+            <a:r>
+              <a:rPr lang="en-US" dirty="0" err="1"/>
+              <a:t>clock_timestamp</a:t>
+            </a:r>
+            <a:r>
+              <a:rPr lang="en-US" dirty="0"/>
+              <a:t>() </a:t>
+            </a:r>
+          </a:p>
+          <a:p>
+            <a:r>
+              <a:rPr lang="en-US" dirty="0" err="1"/>
+              <a:t>current_date</a:t>
+            </a:r>
+            <a:endParaRPr lang="en-US" dirty="0"/>
+          </a:p>
+          <a:p>
+            <a:r>
+              <a:rPr lang="en-US" dirty="0" err="1"/>
+              <a:t>current_time</a:t>
+            </a:r>
+            <a:endParaRPr lang="en-US" dirty="0"/>
+          </a:p>
+          <a:p>
+            <a:r>
+              <a:rPr lang="en-US" dirty="0" err="1"/>
+              <a:t>current_timestamp</a:t>
+            </a:r>
+            <a:endParaRPr lang="en-US" dirty="0"/>
+          </a:p>
+          <a:p>
+            <a:r>
+              <a:rPr lang="en-US" dirty="0" err="1"/>
+              <a:t>Localtime</a:t>
+            </a:r>
+            <a:endParaRPr lang="en-US" dirty="0"/>
+          </a:p>
+          <a:p>
+            <a:r>
+              <a:rPr lang="en-US" dirty="0" err="1"/>
+              <a:t>Localtimestamp</a:t>
+            </a:r>
+            <a:endParaRPr lang="en-US" dirty="0"/>
+          </a:p>
+          <a:p>
+            <a:r>
+              <a:rPr lang="en-US" dirty="0"/>
+              <a:t>now()</a:t>
+            </a:r>
+          </a:p>
+          <a:p>
+            <a:r>
+              <a:rPr lang="en-US" dirty="0" err="1"/>
+              <a:t>statement_timestamp</a:t>
+            </a:r>
+            <a:r>
+              <a:rPr lang="en-US" dirty="0"/>
+              <a:t>()</a:t>
+            </a:r>
+          </a:p>
+          <a:p>
+            <a:r>
+              <a:rPr lang="en-US" dirty="0" err="1"/>
+              <a:t>timeofday</a:t>
+            </a:r>
+            <a:r>
+              <a:rPr lang="en-US" dirty="0"/>
+              <a:t>()</a:t>
+            </a:r>
+          </a:p>
+          <a:p>
+            <a:r>
+              <a:rPr lang="en-US" dirty="0" err="1"/>
+              <a:t>transaction_timestamp</a:t>
+            </a:r>
+            <a:r>
+              <a:rPr lang="en-US" dirty="0"/>
+              <a:t>()	</a:t>
+            </a:r>
+          </a:p>
+          <a:p>
+            <a:endParaRPr lang="en-US" dirty="0"/>
+          </a:p>
+        </p:txBody>
+      </p:sp>
+    </p:spTree>
+    <p:extLst>
+      <p:ext uri="{BB962C8B-B14F-4D97-AF65-F5344CB8AC3E}">
+        <p14:creationId xmlns:p14="http://schemas.microsoft.com/office/powerpoint/2010/main" val="4200978645"/>
+      </p:ext>
+    </p:extLst>
+  </p:cSld>
+  <p:clrMapOvr>
+    <a:masterClrMapping/>
+  </p:clrMapOvr>
+</p:sld>
+</file>
+
+<file path=ppt/slides/slide15.xml><?xml version="1.0" encoding="utf-8"?>
+<p:sld xmlns:a="http://schemas.openxmlformats.org/drawingml/2006/main" xmlns:r="http://schemas.openxmlformats.org/officeDocument/2006/relationships" xmlns:p="http://schemas.openxmlformats.org/presentationml/2006/main">
+  <p:cSld>
+    <p:spTree>
+      <p:nvGrpSpPr>
+        <p:cNvPr id="1" name=""/>
+        <p:cNvGrpSpPr/>
+        <p:nvPr/>
+      </p:nvGrpSpPr>
+      <p:grpSpPr>
+        <a:xfrm>
+          <a:off x="0" y="0"/>
+          <a:ext cx="0" cy="0"/>
+          <a:chOff x="0" y="0"/>
+          <a:chExt cx="0" cy="0"/>
+        </a:xfrm>
+      </p:grpSpPr>
+      <p:sp>
+        <p:nvSpPr>
+          <p:cNvPr id="2" name="Title 1">
+            <a:extLst>
+              <a:ext uri="{FF2B5EF4-FFF2-40B4-BE49-F238E27FC236}">
+                <a16:creationId xmlns:a16="http://schemas.microsoft.com/office/drawing/2014/main" id="{20288032-0A35-4119-9DC7-22FA6B8E9797}"/>
+              </a:ext>
+            </a:extLst>
+          </p:cNvPr>
+          <p:cNvSpPr>
+            <a:spLocks noGrp="1"/>
+          </p:cNvSpPr>
+          <p:nvPr>
+            <p:ph type="title"/>
+          </p:nvPr>
+        </p:nvSpPr>
+        <p:spPr>
+          <a:solidFill>
+            <a:schemeClr val="accent2">
+              <a:lumMod val="60000"/>
+              <a:lumOff val="40000"/>
+            </a:schemeClr>
+          </a:solidFill>
+        </p:spPr>
+        <p:txBody>
+          <a:bodyPr/>
+          <a:lstStyle/>
+          <a:p>
+            <a:r>
+              <a:rPr lang="en-US" dirty="0"/>
+              <a:t>Age and interval</a:t>
+            </a:r>
+          </a:p>
+        </p:txBody>
+      </p:sp>
+      <p:sp>
+        <p:nvSpPr>
+          <p:cNvPr id="3" name="Content Placeholder 2">
+            <a:extLst>
+              <a:ext uri="{FF2B5EF4-FFF2-40B4-BE49-F238E27FC236}">
+                <a16:creationId xmlns:a16="http://schemas.microsoft.com/office/drawing/2014/main" id="{8656073D-84FA-4E86-8A41-365BD88E422A}"/>
+              </a:ext>
+            </a:extLst>
+          </p:cNvPr>
+          <p:cNvSpPr>
+            <a:spLocks noGrp="1"/>
+          </p:cNvSpPr>
+          <p:nvPr>
+            <p:ph idx="1"/>
+          </p:nvPr>
+        </p:nvSpPr>
+        <p:spPr/>
+        <p:txBody>
+          <a:bodyPr/>
+          <a:lstStyle/>
+          <a:p>
+            <a:r>
+              <a:rPr lang="en-US" dirty="0"/>
+              <a:t>age(timestamp)</a:t>
+            </a:r>
+          </a:p>
+          <a:p>
+            <a:r>
+              <a:rPr lang="en-US" dirty="0"/>
+              <a:t>age(timestamp, timestamp)</a:t>
+            </a:r>
+          </a:p>
+          <a:p>
+            <a:endParaRPr lang="en-US" dirty="0"/>
+          </a:p>
+        </p:txBody>
+      </p:sp>
+    </p:spTree>
+    <p:extLst>
+      <p:ext uri="{BB962C8B-B14F-4D97-AF65-F5344CB8AC3E}">
+        <p14:creationId xmlns:p14="http://schemas.microsoft.com/office/powerpoint/2010/main" val="3504110969"/>
+      </p:ext>
+    </p:extLst>
+  </p:cSld>
+  <p:clrMapOvr>
+    <a:masterClrMapping/>
+  </p:clrMapOvr>
+</p:sld>
+</file>
+
+<file path=ppt/slides/slide16.xml><?xml version="1.0" encoding="utf-8"?>
+<p:sld xmlns:a="http://schemas.openxmlformats.org/drawingml/2006/main" xmlns:r="http://schemas.openxmlformats.org/officeDocument/2006/relationships" xmlns:p="http://schemas.openxmlformats.org/presentationml/2006/main">
+  <p:cSld>
+    <p:spTree>
+      <p:nvGrpSpPr>
+        <p:cNvPr id="1" name=""/>
+        <p:cNvGrpSpPr/>
+        <p:nvPr/>
+      </p:nvGrpSpPr>
+      <p:grpSpPr>
+        <a:xfrm>
+          <a:off x="0" y="0"/>
+          <a:ext cx="0" cy="0"/>
+          <a:chOff x="0" y="0"/>
+          <a:chExt cx="0" cy="0"/>
+        </a:xfrm>
+      </p:grpSpPr>
+      <p:sp>
+        <p:nvSpPr>
+          <p:cNvPr id="2" name="Title 1">
+            <a:extLst>
+              <a:ext uri="{FF2B5EF4-FFF2-40B4-BE49-F238E27FC236}">
+                <a16:creationId xmlns:a16="http://schemas.microsoft.com/office/drawing/2014/main" id="{20288032-0A35-4119-9DC7-22FA6B8E9797}"/>
+              </a:ext>
+            </a:extLst>
+          </p:cNvPr>
+          <p:cNvSpPr>
+            <a:spLocks noGrp="1"/>
+          </p:cNvSpPr>
+          <p:nvPr>
+            <p:ph type="title"/>
+          </p:nvPr>
+        </p:nvSpPr>
+        <p:spPr>
+          <a:solidFill>
+            <a:schemeClr val="accent2">
+              <a:lumMod val="60000"/>
+              <a:lumOff val="40000"/>
+            </a:schemeClr>
+          </a:solidFill>
+        </p:spPr>
+        <p:txBody>
+          <a:bodyPr/>
+          <a:lstStyle/>
+          <a:p>
+            <a:r>
+              <a:rPr lang="en-US" dirty="0"/>
+              <a:t>Edit selection</a:t>
+            </a:r>
+          </a:p>
+        </p:txBody>
+      </p:sp>
+      <p:sp>
+        <p:nvSpPr>
+          <p:cNvPr id="3" name="Content Placeholder 2">
+            <a:extLst>
+              <a:ext uri="{FF2B5EF4-FFF2-40B4-BE49-F238E27FC236}">
+                <a16:creationId xmlns:a16="http://schemas.microsoft.com/office/drawing/2014/main" id="{8656073D-84FA-4E86-8A41-365BD88E422A}"/>
+              </a:ext>
+            </a:extLst>
+          </p:cNvPr>
+          <p:cNvSpPr>
+            <a:spLocks noGrp="1"/>
+          </p:cNvSpPr>
+          <p:nvPr>
+            <p:ph idx="1"/>
+          </p:nvPr>
+        </p:nvSpPr>
+        <p:spPr/>
+        <p:txBody>
+          <a:bodyPr>
+            <a:normAutofit lnSpcReduction="10000"/>
+          </a:bodyPr>
+          <a:lstStyle/>
+          <a:p>
+            <a:r>
+              <a:rPr lang="en-US" dirty="0" err="1"/>
+              <a:t>date_part</a:t>
+            </a:r>
+            <a:r>
+              <a:rPr lang="en-US" dirty="0"/>
+              <a:t>(text, timestamp)</a:t>
+            </a:r>
+          </a:p>
+          <a:p>
+            <a:r>
+              <a:rPr lang="en-US" dirty="0" err="1"/>
+              <a:t>date_part</a:t>
+            </a:r>
+            <a:r>
+              <a:rPr lang="en-US" dirty="0"/>
+              <a:t>(text, interval)</a:t>
+            </a:r>
+          </a:p>
+          <a:p>
+            <a:r>
+              <a:rPr lang="en-US" dirty="0" err="1"/>
+              <a:t>date_trunc</a:t>
+            </a:r>
+            <a:r>
+              <a:rPr lang="en-US" dirty="0"/>
+              <a:t>(text, timestamp)</a:t>
+            </a:r>
+          </a:p>
+          <a:p>
+            <a:r>
+              <a:rPr lang="en-US" dirty="0" err="1"/>
+              <a:t>date_trunc</a:t>
+            </a:r>
+            <a:r>
+              <a:rPr lang="en-US" dirty="0"/>
+              <a:t>(text, interval)</a:t>
+            </a:r>
+          </a:p>
+          <a:p>
+            <a:r>
+              <a:rPr lang="en-US" dirty="0"/>
+              <a:t>extract(field from timestamp)</a:t>
+            </a:r>
+          </a:p>
+          <a:p>
+            <a:r>
+              <a:rPr lang="en-US" dirty="0"/>
+              <a:t>extract(field from interval)</a:t>
+            </a:r>
+          </a:p>
+          <a:p>
+            <a:r>
+              <a:rPr lang="en-US" dirty="0" err="1"/>
+              <a:t>justify_days</a:t>
+            </a:r>
+            <a:r>
+              <a:rPr lang="en-US" dirty="0"/>
+              <a:t>(interval)</a:t>
+            </a:r>
+          </a:p>
+          <a:p>
+            <a:r>
+              <a:rPr lang="en-US" dirty="0" err="1"/>
+              <a:t>justify_hours</a:t>
+            </a:r>
+            <a:r>
+              <a:rPr lang="en-US" dirty="0"/>
+              <a:t>(interval)</a:t>
+            </a:r>
+          </a:p>
+          <a:p>
+            <a:r>
+              <a:rPr lang="en-US" dirty="0" err="1"/>
+              <a:t>justify_interval</a:t>
+            </a:r>
+            <a:r>
+              <a:rPr lang="en-US" dirty="0"/>
+              <a:t>(interval)</a:t>
+            </a:r>
+          </a:p>
+        </p:txBody>
+      </p:sp>
+    </p:spTree>
+    <p:extLst>
+      <p:ext uri="{BB962C8B-B14F-4D97-AF65-F5344CB8AC3E}">
+        <p14:creationId xmlns:p14="http://schemas.microsoft.com/office/powerpoint/2010/main" val="986528449"/>
+      </p:ext>
+    </p:extLst>
+  </p:cSld>
+  <p:clrMapOvr>
+    <a:masterClrMapping/>
+  </p:clrMapOvr>
+</p:sld>
+</file>
+
+<file path=ppt/slides/slide17.xml><?xml version="1.0" encoding="utf-8"?>
+<p:sld xmlns:a="http://schemas.openxmlformats.org/drawingml/2006/main" xmlns:r="http://schemas.openxmlformats.org/officeDocument/2006/relationships" xmlns:p="http://schemas.openxmlformats.org/presentationml/2006/main">
+  <p:cSld>
+    <p:spTree>
+      <p:nvGrpSpPr>
+        <p:cNvPr id="1" name=""/>
+        <p:cNvGrpSpPr/>
+        <p:nvPr/>
+      </p:nvGrpSpPr>
+      <p:grpSpPr>
+        <a:xfrm>
+          <a:off x="0" y="0"/>
+          <a:ext cx="0" cy="0"/>
+          <a:chOff x="0" y="0"/>
+          <a:chExt cx="0" cy="0"/>
+        </a:xfrm>
+      </p:grpSpPr>
+      <p:sp>
+        <p:nvSpPr>
+          <p:cNvPr id="2" name="Title 1">
+            <a:extLst>
+              <a:ext uri="{FF2B5EF4-FFF2-40B4-BE49-F238E27FC236}">
+                <a16:creationId xmlns:a16="http://schemas.microsoft.com/office/drawing/2014/main" id="{86552A4B-67D6-4AEF-B487-CE5E107CF63C}"/>
+              </a:ext>
+            </a:extLst>
+          </p:cNvPr>
+          <p:cNvSpPr>
+            <a:spLocks noGrp="1"/>
+          </p:cNvSpPr>
+          <p:nvPr>
+            <p:ph type="title"/>
+          </p:nvPr>
+        </p:nvSpPr>
+        <p:spPr>
+          <a:solidFill>
+            <a:schemeClr val="accent2">
+              <a:lumMod val="60000"/>
+              <a:lumOff val="40000"/>
+            </a:schemeClr>
+          </a:solidFill>
+        </p:spPr>
+        <p:txBody>
+          <a:bodyPr/>
+          <a:lstStyle/>
+          <a:p>
+            <a:r>
+              <a:rPr lang="en-US" dirty="0"/>
+              <a:t>Test Bool</a:t>
+            </a:r>
+          </a:p>
+        </p:txBody>
+      </p:sp>
+      <p:sp>
+        <p:nvSpPr>
+          <p:cNvPr id="3" name="Content Placeholder 2">
+            <a:extLst>
+              <a:ext uri="{FF2B5EF4-FFF2-40B4-BE49-F238E27FC236}">
+                <a16:creationId xmlns:a16="http://schemas.microsoft.com/office/drawing/2014/main" id="{EA2561B4-DD47-4A30-9988-F1B56987E0DA}"/>
+              </a:ext>
+            </a:extLst>
+          </p:cNvPr>
+          <p:cNvSpPr>
+            <a:spLocks noGrp="1"/>
+          </p:cNvSpPr>
+          <p:nvPr>
+            <p:ph idx="1"/>
+          </p:nvPr>
+        </p:nvSpPr>
+        <p:spPr/>
+        <p:txBody>
+          <a:bodyPr/>
+          <a:lstStyle/>
+          <a:p>
+            <a:r>
+              <a:rPr lang="en-US" dirty="0" err="1"/>
+              <a:t>isfinite</a:t>
+            </a:r>
+            <a:r>
+              <a:rPr lang="en-US" dirty="0"/>
+              <a:t>(date)</a:t>
+            </a:r>
+          </a:p>
+          <a:p>
+            <a:r>
+              <a:rPr lang="en-US" dirty="0" err="1"/>
+              <a:t>isfinite</a:t>
+            </a:r>
+            <a:r>
+              <a:rPr lang="en-US" dirty="0"/>
+              <a:t>(timestamp)</a:t>
+            </a:r>
+          </a:p>
+          <a:p>
+            <a:r>
+              <a:rPr lang="en-US" dirty="0" err="1"/>
+              <a:t>isfinite</a:t>
+            </a:r>
+            <a:r>
+              <a:rPr lang="en-US" dirty="0"/>
+              <a:t>(interval)</a:t>
+            </a:r>
+          </a:p>
+        </p:txBody>
+      </p:sp>
+    </p:spTree>
+    <p:extLst>
+      <p:ext uri="{BB962C8B-B14F-4D97-AF65-F5344CB8AC3E}">
+        <p14:creationId xmlns:p14="http://schemas.microsoft.com/office/powerpoint/2010/main" val="3935330386"/>
+      </p:ext>
+    </p:extLst>
+  </p:cSld>
+  <p:clrMapOvr>
+    <a:masterClrMapping/>
+  </p:clrMapOvr>
+</p:sld>
+</file>
+
+<file path=ppt/slides/slide18.xml><?xml version="1.0" encoding="utf-8"?>
+<p:sld xmlns:a="http://schemas.openxmlformats.org/drawingml/2006/main" xmlns:r="http://schemas.openxmlformats.org/officeDocument/2006/relationships" xmlns:p="http://schemas.openxmlformats.org/presentationml/2006/main">
+  <p:cSld>
+    <p:spTree>
+      <p:nvGrpSpPr>
+        <p:cNvPr id="1" name=""/>
+        <p:cNvGrpSpPr/>
+        <p:nvPr/>
+      </p:nvGrpSpPr>
+      <p:grpSpPr>
+        <a:xfrm>
+          <a:off x="0" y="0"/>
+          <a:ext cx="0" cy="0"/>
+          <a:chOff x="0" y="0"/>
+          <a:chExt cx="0" cy="0"/>
+        </a:xfrm>
+      </p:grpSpPr>
+      <p:sp>
+        <p:nvSpPr>
+          <p:cNvPr id="2" name="Title 1">
+            <a:extLst>
+              <a:ext uri="{FF2B5EF4-FFF2-40B4-BE49-F238E27FC236}">
+                <a16:creationId xmlns:a16="http://schemas.microsoft.com/office/drawing/2014/main" id="{86552A4B-67D6-4AEF-B487-CE5E107CF63C}"/>
+              </a:ext>
+            </a:extLst>
+          </p:cNvPr>
+          <p:cNvSpPr>
+            <a:spLocks noGrp="1"/>
+          </p:cNvSpPr>
+          <p:nvPr>
+            <p:ph type="title"/>
+          </p:nvPr>
+        </p:nvSpPr>
+        <p:spPr>
+          <a:solidFill>
+            <a:schemeClr val="accent2">
+              <a:lumMod val="60000"/>
+              <a:lumOff val="40000"/>
+            </a:schemeClr>
+          </a:solidFill>
+        </p:spPr>
+        <p:txBody>
+          <a:bodyPr/>
+          <a:lstStyle/>
+          <a:p>
+            <a:r>
+              <a:rPr lang="en-US" dirty="0"/>
+              <a:t>Make it so</a:t>
+            </a:r>
+          </a:p>
+        </p:txBody>
+      </p:sp>
+      <p:sp>
+        <p:nvSpPr>
+          <p:cNvPr id="3" name="Content Placeholder 2">
+            <a:extLst>
+              <a:ext uri="{FF2B5EF4-FFF2-40B4-BE49-F238E27FC236}">
+                <a16:creationId xmlns:a16="http://schemas.microsoft.com/office/drawing/2014/main" id="{EA2561B4-DD47-4A30-9988-F1B56987E0DA}"/>
+              </a:ext>
+            </a:extLst>
+          </p:cNvPr>
+          <p:cNvSpPr>
+            <a:spLocks noGrp="1"/>
+          </p:cNvSpPr>
+          <p:nvPr>
+            <p:ph idx="1"/>
+          </p:nvPr>
+        </p:nvSpPr>
+        <p:spPr/>
+        <p:txBody>
+          <a:bodyPr/>
+          <a:lstStyle/>
+          <a:p>
+            <a:r>
+              <a:rPr lang="en-US" dirty="0" err="1"/>
+              <a:t>make_date</a:t>
+            </a:r>
+            <a:r>
+              <a:rPr lang="en-US" dirty="0"/>
+              <a:t>(year int, month int, day int)</a:t>
+            </a:r>
+          </a:p>
+          <a:p>
+            <a:r>
+              <a:rPr lang="en-US" dirty="0" err="1"/>
+              <a:t>make_interval</a:t>
+            </a:r>
+            <a:r>
+              <a:rPr lang="en-US" dirty="0"/>
+              <a:t>(years int DEFAULT 0, months int DEFAULT 0, weeks int DEFAULT 0, days int DEFAULT 0, hours int DEFAULT 0, mins int DEFAULT 0, secs double precision DEFAULT 0.0)</a:t>
+            </a:r>
+          </a:p>
+          <a:p>
+            <a:r>
+              <a:rPr lang="en-US" dirty="0" err="1"/>
+              <a:t>make_time</a:t>
+            </a:r>
+            <a:r>
+              <a:rPr lang="en-US" dirty="0"/>
+              <a:t>(hour int, min int, sec double precision)</a:t>
+            </a:r>
+          </a:p>
+          <a:p>
+            <a:r>
+              <a:rPr lang="en-US" dirty="0" err="1"/>
+              <a:t>make_timestamptz</a:t>
+            </a:r>
+            <a:r>
+              <a:rPr lang="en-US" dirty="0"/>
+              <a:t>(year int, month int, day int, hour int, min int, sec double precision, [ </a:t>
+            </a:r>
+            <a:r>
+              <a:rPr lang="en-US" dirty="0" err="1"/>
+              <a:t>timezone</a:t>
+            </a:r>
+            <a:r>
+              <a:rPr lang="en-US" dirty="0"/>
+              <a:t> text ])</a:t>
+            </a:r>
+          </a:p>
+        </p:txBody>
+      </p:sp>
+    </p:spTree>
+    <p:extLst>
+      <p:ext uri="{BB962C8B-B14F-4D97-AF65-F5344CB8AC3E}">
+        <p14:creationId xmlns:p14="http://schemas.microsoft.com/office/powerpoint/2010/main" val="151265237"/>
+      </p:ext>
+    </p:extLst>
+  </p:cSld>
+  <p:clrMapOvr>
+    <a:masterClrMapping/>
+  </p:clrMapOvr>
+</p:sld>
+</file>
+
+<file path=ppt/slides/slide19.xml><?xml version="1.0" encoding="utf-8"?>
+<p:sld xmlns:a="http://schemas.openxmlformats.org/drawingml/2006/main" xmlns:r="http://schemas.openxmlformats.org/officeDocument/2006/relationships" xmlns:p="http://schemas.openxmlformats.org/presentationml/2006/main">
+  <p:cSld>
+    <p:spTree>
+      <p:nvGrpSpPr>
+        <p:cNvPr id="1" name=""/>
+        <p:cNvGrpSpPr/>
+        <p:nvPr/>
+      </p:nvGrpSpPr>
+      <p:grpSpPr>
+        <a:xfrm>
+          <a:off x="0" y="0"/>
+          <a:ext cx="0" cy="0"/>
+          <a:chOff x="0" y="0"/>
+          <a:chExt cx="0" cy="0"/>
+        </a:xfrm>
+      </p:grpSpPr>
+      <p:sp>
+        <p:nvSpPr>
+          <p:cNvPr id="2" name="Title 1">
+            <a:extLst>
+              <a:ext uri="{FF2B5EF4-FFF2-40B4-BE49-F238E27FC236}">
                 <a16:creationId xmlns:a16="http://schemas.microsoft.com/office/drawing/2014/main" id="{4CDA0D02-8257-4FA5-8CEE-FB527CB8DAA7}"/>
               </a:ext>
             </a:extLst>
@@ -5997,7 +6704,127 @@
 </p:sld>
 </file>
 
-<file path=ppt/slides/slide15.xml><?xml version="1.0" encoding="utf-8"?>
+<file path=ppt/slides/slide2.xml><?xml version="1.0" encoding="utf-8"?>
+<p:sld xmlns:a="http://schemas.openxmlformats.org/drawingml/2006/main" xmlns:r="http://schemas.openxmlformats.org/officeDocument/2006/relationships" xmlns:p="http://schemas.openxmlformats.org/presentationml/2006/main">
+  <p:cSld>
+    <p:spTree>
+      <p:nvGrpSpPr>
+        <p:cNvPr id="1" name=""/>
+        <p:cNvGrpSpPr/>
+        <p:nvPr/>
+      </p:nvGrpSpPr>
+      <p:grpSpPr>
+        <a:xfrm>
+          <a:off x="0" y="0"/>
+          <a:ext cx="0" cy="0"/>
+          <a:chOff x="0" y="0"/>
+          <a:chExt cx="0" cy="0"/>
+        </a:xfrm>
+      </p:grpSpPr>
+      <p:sp>
+        <p:nvSpPr>
+          <p:cNvPr id="2" name="Title 1">
+            <a:extLst>
+              <a:ext uri="{FF2B5EF4-FFF2-40B4-BE49-F238E27FC236}">
+                <a16:creationId xmlns:a16="http://schemas.microsoft.com/office/drawing/2014/main" id="{53F32065-F94F-44CC-909D-3FEE483545B0}"/>
+              </a:ext>
+            </a:extLst>
+          </p:cNvPr>
+          <p:cNvSpPr>
+            <a:spLocks noGrp="1"/>
+          </p:cNvSpPr>
+          <p:nvPr>
+            <p:ph type="title"/>
+          </p:nvPr>
+        </p:nvSpPr>
+        <p:spPr/>
+        <p:txBody>
+          <a:bodyPr/>
+          <a:lstStyle/>
+          <a:p>
+            <a:endParaRPr lang="en-US" dirty="0">
+              <a:latin typeface="Courier New" panose="02070309020205020404" pitchFamily="49" charset="0"/>
+              <a:cs typeface="Courier New" panose="02070309020205020404" pitchFamily="49" charset="0"/>
+            </a:endParaRPr>
+          </a:p>
+        </p:txBody>
+      </p:sp>
+      <p:sp>
+        <p:nvSpPr>
+          <p:cNvPr id="3" name="Content Placeholder 2">
+            <a:extLst>
+              <a:ext uri="{FF2B5EF4-FFF2-40B4-BE49-F238E27FC236}">
+                <a16:creationId xmlns:a16="http://schemas.microsoft.com/office/drawing/2014/main" id="{ECD71E81-4C52-47F5-AB09-7340EB3AE8E6}"/>
+              </a:ext>
+            </a:extLst>
+          </p:cNvPr>
+          <p:cNvSpPr>
+            <a:spLocks noGrp="1"/>
+          </p:cNvSpPr>
+          <p:nvPr>
+            <p:ph idx="1"/>
+          </p:nvPr>
+        </p:nvSpPr>
+        <p:spPr/>
+        <p:txBody>
+          <a:bodyPr>
+            <a:normAutofit/>
+          </a:bodyPr>
+          <a:lstStyle/>
+          <a:p>
+            <a:r>
+              <a:rPr lang="en-US" dirty="0">
+                <a:latin typeface="Courier New" panose="02070309020205020404" pitchFamily="49" charset="0"/>
+                <a:cs typeface="Courier New" panose="02070309020205020404" pitchFamily="49" charset="0"/>
+              </a:rPr>
+              <a:t>Information about the data types you can use when creating a table or database can be found below</a:t>
+            </a:r>
+          </a:p>
+          <a:p>
+            <a:r>
+              <a:rPr lang="en-US" dirty="0">
+                <a:latin typeface="Courier New" panose="02070309020205020404" pitchFamily="49" charset="0"/>
+                <a:cs typeface="Courier New" panose="02070309020205020404" pitchFamily="49" charset="0"/>
+                <a:hlinkClick r:id="rId2"/>
+              </a:rPr>
+              <a:t>https://www.postgresql.org/docs/12/datatype-datetime.html</a:t>
+            </a:r>
+            <a:endParaRPr lang="en-US" dirty="0">
+              <a:latin typeface="Courier New" panose="02070309020205020404" pitchFamily="49" charset="0"/>
+              <a:cs typeface="Courier New" panose="02070309020205020404" pitchFamily="49" charset="0"/>
+            </a:endParaRPr>
+          </a:p>
+          <a:p>
+            <a:pPr marL="0" indent="0">
+              <a:buNone/>
+            </a:pPr>
+            <a:endParaRPr lang="en-US" dirty="0">
+              <a:latin typeface="Courier New" panose="02070309020205020404" pitchFamily="49" charset="0"/>
+              <a:cs typeface="Courier New" panose="02070309020205020404" pitchFamily="49" charset="0"/>
+            </a:endParaRPr>
+          </a:p>
+          <a:p>
+            <a:endParaRPr lang="en-US" dirty="0">
+              <a:latin typeface="Courier New" panose="02070309020205020404" pitchFamily="49" charset="0"/>
+              <a:cs typeface="Courier New" panose="02070309020205020404" pitchFamily="49" charset="0"/>
+            </a:endParaRPr>
+          </a:p>
+        </p:txBody>
+      </p:sp>
+    </p:spTree>
+    <p:extLst>
+      <p:ext uri="{BB962C8B-B14F-4D97-AF65-F5344CB8AC3E}">
+        <p14:creationId xmlns:p14="http://schemas.microsoft.com/office/powerpoint/2010/main" val="2356603706"/>
+      </p:ext>
+    </p:extLst>
+  </p:cSld>
+  <p:clrMapOvr>
+    <a:masterClrMapping/>
+  </p:clrMapOvr>
+</p:sld>
+</file>
+
+<file path=ppt/slides/slide20.xml><?xml version="1.0" encoding="utf-8"?>
 <p:sld xmlns:a="http://schemas.openxmlformats.org/drawingml/2006/main" xmlns:r="http://schemas.openxmlformats.org/officeDocument/2006/relationships" xmlns:p="http://schemas.openxmlformats.org/presentationml/2006/main">
   <p:cSld>
     <p:bg>
@@ -6432,7 +7259,7 @@
 </p:sld>
 </file>
 
-<file path=ppt/slides/slide16.xml><?xml version="1.0" encoding="utf-8"?>
+<file path=ppt/slides/slide21.xml><?xml version="1.0" encoding="utf-8"?>
 <p:sld xmlns:a="http://schemas.openxmlformats.org/drawingml/2006/main" xmlns:r="http://schemas.openxmlformats.org/officeDocument/2006/relationships" xmlns:p="http://schemas.openxmlformats.org/presentationml/2006/main">
   <p:cSld>
     <p:bg>
@@ -6882,7 +7709,7 @@
 </p:sld>
 </file>
 
-<file path=ppt/slides/slide17.xml><?xml version="1.0" encoding="utf-8"?>
+<file path=ppt/slides/slide22.xml><?xml version="1.0" encoding="utf-8"?>
 <p:sld xmlns:a="http://schemas.openxmlformats.org/drawingml/2006/main" xmlns:r="http://schemas.openxmlformats.org/officeDocument/2006/relationships" xmlns:p="http://schemas.openxmlformats.org/presentationml/2006/main">
   <p:cSld>
     <p:spTree>
@@ -6953,26 +7780,16 @@
           <a:p>
             <a:r>
               <a:rPr lang="en-US" dirty="0"/>
-              <a:t>-- SELECT NOW(); -- timestamp with time zone</a:t>
+              <a:t>SELECT NOW(); -- timestamp with time zone</a:t>
             </a:r>
           </a:p>
           <a:p>
             <a:r>
               <a:rPr lang="en-US" dirty="0"/>
-              <a:t>-- SELECT CURRENT_TIME; -- time with time zone</a:t>
-            </a:r>
-          </a:p>
-          <a:p>
-            <a:endParaRPr lang="en-US" dirty="0"/>
-          </a:p>
-          <a:p>
-            <a:endParaRPr lang="en-US" dirty="0"/>
-          </a:p>
-          <a:p>
-            <a:r>
-              <a:rPr lang="en-US" dirty="0"/>
-              <a:t>-- SELECT </a:t>
-            </a:r>
+              <a:t>CURRENT_TIME; -- time with time zone</a:t>
+            </a:r>
+          </a:p>
+          <a:p>
             <a:r>
               <a:rPr lang="en-US" dirty="0" err="1"/>
               <a:t>transaction_timestamp</a:t>
@@ -6983,12 +7800,9 @@
             </a:r>
           </a:p>
           <a:p>
-            <a:endParaRPr lang="en-US" dirty="0"/>
-          </a:p>
-          <a:p>
             <a:r>
               <a:rPr lang="en-US" dirty="0"/>
-              <a:t>-- SELECT CURRENT_DATE; -- date without </a:t>
+              <a:t>CURRENT_DATE; -- date without </a:t>
             </a:r>
             <a:r>
               <a:rPr lang="en-US" dirty="0" err="1"/>
@@ -6999,7 +7813,7 @@
           <a:p>
             <a:r>
               <a:rPr lang="en-US" dirty="0"/>
-              <a:t>-- SELECT CURRENT_TIMESTAMP; -- timestamp with </a:t>
+              <a:t>CURRENT_TIMESTAMP; -- timestamp with </a:t>
             </a:r>
             <a:r>
               <a:rPr lang="en-US" dirty="0" err="1"/>
@@ -7010,12 +7824,50 @@
           <a:p>
             <a:r>
               <a:rPr lang="en-US" dirty="0"/>
-              <a:t>-- SELECT LOCALTIME; -- time without </a:t>
+              <a:t>LOCALTIME; -- time without </a:t>
             </a:r>
             <a:r>
               <a:rPr lang="en-US" dirty="0" err="1"/>
               <a:t>timezone</a:t>
             </a:r>
+            <a:endParaRPr lang="en-US" dirty="0"/>
+          </a:p>
+          <a:p>
+            <a:r>
+              <a:rPr lang="en-US" dirty="0" err="1"/>
+              <a:t>localtimestamp</a:t>
+            </a:r>
+            <a:endParaRPr lang="en-US" dirty="0"/>
+          </a:p>
+          <a:p>
+            <a:r>
+              <a:rPr lang="en-US" dirty="0" err="1"/>
+              <a:t>timeofday</a:t>
+            </a:r>
+            <a:r>
+              <a:rPr lang="en-US" dirty="0"/>
+              <a:t>() -- Current date and time (like </a:t>
+            </a:r>
+            <a:r>
+              <a:rPr lang="en-US" dirty="0" err="1"/>
+              <a:t>clock_timestamp</a:t>
+            </a:r>
+            <a:r>
+              <a:rPr lang="en-US" dirty="0"/>
+              <a:t>, but as a text string)</a:t>
+            </a:r>
+          </a:p>
+          <a:p>
+            <a:r>
+              <a:rPr lang="en-US" dirty="0" err="1"/>
+              <a:t>statement_timestamp</a:t>
+            </a:r>
+            <a:r>
+              <a:rPr lang="en-US" dirty="0"/>
+              <a:t>()</a:t>
+            </a:r>
+          </a:p>
+          <a:p>
             <a:endParaRPr lang="en-US" dirty="0"/>
           </a:p>
         </p:txBody>
@@ -7033,7 +7885,7 @@
 </p:sld>
 </file>
 
-<file path=ppt/slides/slide18.xml><?xml version="1.0" encoding="utf-8"?>
+<file path=ppt/slides/slide23.xml><?xml version="1.0" encoding="utf-8"?>
 <p:sld xmlns:a="http://schemas.openxmlformats.org/drawingml/2006/main" xmlns:r="http://schemas.openxmlformats.org/officeDocument/2006/relationships" xmlns:p="http://schemas.openxmlformats.org/presentationml/2006/main">
   <p:cSld>
     <p:spTree>
@@ -7155,7 +8007,7 @@
 </p:sld>
 </file>
 
-<file path=ppt/slides/slide19.xml><?xml version="1.0" encoding="utf-8"?>
+<file path=ppt/slides/slide24.xml><?xml version="1.0" encoding="utf-8"?>
 <p:sld xmlns:a="http://schemas.openxmlformats.org/drawingml/2006/main" xmlns:r="http://schemas.openxmlformats.org/officeDocument/2006/relationships" xmlns:p="http://schemas.openxmlformats.org/presentationml/2006/main">
   <p:cSld>
     <p:bg>
@@ -7453,127 +8305,7 @@
 </p:sld>
 </file>
 
-<file path=ppt/slides/slide2.xml><?xml version="1.0" encoding="utf-8"?>
-<p:sld xmlns:a="http://schemas.openxmlformats.org/drawingml/2006/main" xmlns:r="http://schemas.openxmlformats.org/officeDocument/2006/relationships" xmlns:p="http://schemas.openxmlformats.org/presentationml/2006/main">
-  <p:cSld>
-    <p:spTree>
-      <p:nvGrpSpPr>
-        <p:cNvPr id="1" name=""/>
-        <p:cNvGrpSpPr/>
-        <p:nvPr/>
-      </p:nvGrpSpPr>
-      <p:grpSpPr>
-        <a:xfrm>
-          <a:off x="0" y="0"/>
-          <a:ext cx="0" cy="0"/>
-          <a:chOff x="0" y="0"/>
-          <a:chExt cx="0" cy="0"/>
-        </a:xfrm>
-      </p:grpSpPr>
-      <p:sp>
-        <p:nvSpPr>
-          <p:cNvPr id="2" name="Title 1">
-            <a:extLst>
-              <a:ext uri="{FF2B5EF4-FFF2-40B4-BE49-F238E27FC236}">
-                <a16:creationId xmlns:a16="http://schemas.microsoft.com/office/drawing/2014/main" id="{53F32065-F94F-44CC-909D-3FEE483545B0}"/>
-              </a:ext>
-            </a:extLst>
-          </p:cNvPr>
-          <p:cNvSpPr>
-            <a:spLocks noGrp="1"/>
-          </p:cNvSpPr>
-          <p:nvPr>
-            <p:ph type="title"/>
-          </p:nvPr>
-        </p:nvSpPr>
-        <p:spPr/>
-        <p:txBody>
-          <a:bodyPr/>
-          <a:lstStyle/>
-          <a:p>
-            <a:endParaRPr lang="en-US" dirty="0">
-              <a:latin typeface="Courier New" panose="02070309020205020404" pitchFamily="49" charset="0"/>
-              <a:cs typeface="Courier New" panose="02070309020205020404" pitchFamily="49" charset="0"/>
-            </a:endParaRPr>
-          </a:p>
-        </p:txBody>
-      </p:sp>
-      <p:sp>
-        <p:nvSpPr>
-          <p:cNvPr id="3" name="Content Placeholder 2">
-            <a:extLst>
-              <a:ext uri="{FF2B5EF4-FFF2-40B4-BE49-F238E27FC236}">
-                <a16:creationId xmlns:a16="http://schemas.microsoft.com/office/drawing/2014/main" id="{ECD71E81-4C52-47F5-AB09-7340EB3AE8E6}"/>
-              </a:ext>
-            </a:extLst>
-          </p:cNvPr>
-          <p:cNvSpPr>
-            <a:spLocks noGrp="1"/>
-          </p:cNvSpPr>
-          <p:nvPr>
-            <p:ph idx="1"/>
-          </p:nvPr>
-        </p:nvSpPr>
-        <p:spPr/>
-        <p:txBody>
-          <a:bodyPr>
-            <a:normAutofit/>
-          </a:bodyPr>
-          <a:lstStyle/>
-          <a:p>
-            <a:r>
-              <a:rPr lang="en-US" dirty="0">
-                <a:latin typeface="Courier New" panose="02070309020205020404" pitchFamily="49" charset="0"/>
-                <a:cs typeface="Courier New" panose="02070309020205020404" pitchFamily="49" charset="0"/>
-              </a:rPr>
-              <a:t>Information about the data types you can use when creating a table or database can be found below</a:t>
-            </a:r>
-          </a:p>
-          <a:p>
-            <a:r>
-              <a:rPr lang="en-US" dirty="0">
-                <a:latin typeface="Courier New" panose="02070309020205020404" pitchFamily="49" charset="0"/>
-                <a:cs typeface="Courier New" panose="02070309020205020404" pitchFamily="49" charset="0"/>
-                <a:hlinkClick r:id="rId2"/>
-              </a:rPr>
-              <a:t>https://www.postgresql.org/docs/12/datatype-datetime.html</a:t>
-            </a:r>
-            <a:endParaRPr lang="en-US" dirty="0">
-              <a:latin typeface="Courier New" panose="02070309020205020404" pitchFamily="49" charset="0"/>
-              <a:cs typeface="Courier New" panose="02070309020205020404" pitchFamily="49" charset="0"/>
-            </a:endParaRPr>
-          </a:p>
-          <a:p>
-            <a:pPr marL="0" indent="0">
-              <a:buNone/>
-            </a:pPr>
-            <a:endParaRPr lang="en-US" dirty="0">
-              <a:latin typeface="Courier New" panose="02070309020205020404" pitchFamily="49" charset="0"/>
-              <a:cs typeface="Courier New" panose="02070309020205020404" pitchFamily="49" charset="0"/>
-            </a:endParaRPr>
-          </a:p>
-          <a:p>
-            <a:endParaRPr lang="en-US" dirty="0">
-              <a:latin typeface="Courier New" panose="02070309020205020404" pitchFamily="49" charset="0"/>
-              <a:cs typeface="Courier New" panose="02070309020205020404" pitchFamily="49" charset="0"/>
-            </a:endParaRPr>
-          </a:p>
-        </p:txBody>
-      </p:sp>
-    </p:spTree>
-    <p:extLst>
-      <p:ext uri="{BB962C8B-B14F-4D97-AF65-F5344CB8AC3E}">
-        <p14:creationId xmlns:p14="http://schemas.microsoft.com/office/powerpoint/2010/main" val="2356603706"/>
-      </p:ext>
-    </p:extLst>
-  </p:cSld>
-  <p:clrMapOvr>
-    <a:masterClrMapping/>
-  </p:clrMapOvr>
-</p:sld>
-</file>
-
-<file path=ppt/slides/slide20.xml><?xml version="1.0" encoding="utf-8"?>
+<file path=ppt/slides/slide25.xml><?xml version="1.0" encoding="utf-8"?>
 <p:sld xmlns:a="http://schemas.openxmlformats.org/drawingml/2006/main" xmlns:r="http://schemas.openxmlformats.org/officeDocument/2006/relationships" xmlns:p="http://schemas.openxmlformats.org/presentationml/2006/main">
   <p:cSld>
     <p:spTree>
@@ -7712,7 +8444,7 @@
 </p:sld>
 </file>
 
-<file path=ppt/slides/slide21.xml><?xml version="1.0" encoding="utf-8"?>
+<file path=ppt/slides/slide26.xml><?xml version="1.0" encoding="utf-8"?>
 <p:sld xmlns:a="http://schemas.openxmlformats.org/drawingml/2006/main" xmlns:r="http://schemas.openxmlformats.org/officeDocument/2006/relationships" xmlns:p="http://schemas.openxmlformats.org/presentationml/2006/main">
   <p:cSld>
     <p:spTree>
@@ -7895,7 +8627,7 @@
 </p:sld>
 </file>
 
-<file path=ppt/slides/slide22.xml><?xml version="1.0" encoding="utf-8"?>
+<file path=ppt/slides/slide27.xml><?xml version="1.0" encoding="utf-8"?>
 <p:sld xmlns:a="http://schemas.openxmlformats.org/drawingml/2006/main" xmlns:r="http://schemas.openxmlformats.org/officeDocument/2006/relationships" xmlns:p="http://schemas.openxmlformats.org/presentationml/2006/main">
   <p:cSld>
     <p:spTree>
@@ -8040,7 +8772,7 @@
 </p:sld>
 </file>
 
-<file path=ppt/slides/slide23.xml><?xml version="1.0" encoding="utf-8"?>
+<file path=ppt/slides/slide28.xml><?xml version="1.0" encoding="utf-8"?>
 <p:sld xmlns:a="http://schemas.openxmlformats.org/drawingml/2006/main" xmlns:r="http://schemas.openxmlformats.org/officeDocument/2006/relationships" xmlns:p="http://schemas.openxmlformats.org/presentationml/2006/main">
   <p:cSld>
     <p:spTree>
@@ -8209,7 +8941,7 @@
 </p:sld>
 </file>
 
-<file path=ppt/slides/slide24.xml><?xml version="1.0" encoding="utf-8"?>
+<file path=ppt/slides/slide29.xml><?xml version="1.0" encoding="utf-8"?>
 <p:sld xmlns:a="http://schemas.openxmlformats.org/drawingml/2006/main" xmlns:r="http://schemas.openxmlformats.org/officeDocument/2006/relationships" xmlns:p="http://schemas.openxmlformats.org/presentationml/2006/main">
   <p:cSld>
     <p:spTree>
@@ -8325,101 +9057,6 @@
     <p:extLst>
       <p:ext uri="{BB962C8B-B14F-4D97-AF65-F5344CB8AC3E}">
         <p14:creationId xmlns:p14="http://schemas.microsoft.com/office/powerpoint/2010/main" val="215803295"/>
-      </p:ext>
-    </p:extLst>
-  </p:cSld>
-  <p:clrMapOvr>
-    <a:masterClrMapping/>
-  </p:clrMapOvr>
-</p:sld>
-</file>
-
-<file path=ppt/slides/slide25.xml><?xml version="1.0" encoding="utf-8"?>
-<p:sld xmlns:a="http://schemas.openxmlformats.org/drawingml/2006/main" xmlns:r="http://schemas.openxmlformats.org/officeDocument/2006/relationships" xmlns:p="http://schemas.openxmlformats.org/presentationml/2006/main">
-  <p:cSld>
-    <p:spTree>
-      <p:nvGrpSpPr>
-        <p:cNvPr id="1" name=""/>
-        <p:cNvGrpSpPr/>
-        <p:nvPr/>
-      </p:nvGrpSpPr>
-      <p:grpSpPr>
-        <a:xfrm>
-          <a:off x="0" y="0"/>
-          <a:ext cx="0" cy="0"/>
-          <a:chOff x="0" y="0"/>
-          <a:chExt cx="0" cy="0"/>
-        </a:xfrm>
-      </p:grpSpPr>
-      <p:sp>
-        <p:nvSpPr>
-          <p:cNvPr id="2" name="Title 1">
-            <a:extLst>
-              <a:ext uri="{FF2B5EF4-FFF2-40B4-BE49-F238E27FC236}">
-                <a16:creationId xmlns:a16="http://schemas.microsoft.com/office/drawing/2014/main" id="{C662B513-408F-4526-A2DC-27228DD074DD}"/>
-              </a:ext>
-            </a:extLst>
-          </p:cNvPr>
-          <p:cNvSpPr>
-            <a:spLocks noGrp="1"/>
-          </p:cNvSpPr>
-          <p:nvPr>
-            <p:ph type="title"/>
-          </p:nvPr>
-        </p:nvSpPr>
-        <p:spPr/>
-        <p:txBody>
-          <a:bodyPr/>
-          <a:lstStyle/>
-          <a:p>
-            <a:endParaRPr lang="en-US"/>
-          </a:p>
-        </p:txBody>
-      </p:sp>
-      <p:sp>
-        <p:nvSpPr>
-          <p:cNvPr id="3" name="Content Placeholder 2">
-            <a:extLst>
-              <a:ext uri="{FF2B5EF4-FFF2-40B4-BE49-F238E27FC236}">
-                <a16:creationId xmlns:a16="http://schemas.microsoft.com/office/drawing/2014/main" id="{95DEE2D4-DB30-4A39-86AE-D6C20B4BB097}"/>
-              </a:ext>
-            </a:extLst>
-          </p:cNvPr>
-          <p:cNvSpPr>
-            <a:spLocks noGrp="1"/>
-          </p:cNvSpPr>
-          <p:nvPr>
-            <p:ph idx="1"/>
-          </p:nvPr>
-        </p:nvSpPr>
-        <p:spPr/>
-        <p:txBody>
-          <a:bodyPr/>
-          <a:lstStyle/>
-          <a:p>
-            <a:endParaRPr lang="en-US" dirty="0"/>
-          </a:p>
-          <a:p>
-            <a:r>
-              <a:rPr lang="en-US" dirty="0"/>
-              <a:t>3)</a:t>
-            </a:r>
-          </a:p>
-          <a:p>
-            <a:endParaRPr lang="en-US" dirty="0"/>
-          </a:p>
-          <a:p>
-            <a:r>
-              <a:rPr lang="en-US"/>
-              <a:t>INTERVAL - </a:t>
-            </a:r>
-          </a:p>
-        </p:txBody>
-      </p:sp>
-    </p:spTree>
-    <p:extLst>
-      <p:ext uri="{BB962C8B-B14F-4D97-AF65-F5344CB8AC3E}">
-        <p14:creationId xmlns:p14="http://schemas.microsoft.com/office/powerpoint/2010/main" val="2528630659"/>
       </p:ext>
     </p:extLst>
   </p:cSld>
@@ -8503,6 +9140,2188 @@
     <p:extLst>
       <p:ext uri="{BB962C8B-B14F-4D97-AF65-F5344CB8AC3E}">
         <p14:creationId xmlns:p14="http://schemas.microsoft.com/office/powerpoint/2010/main" val="1423730924"/>
+      </p:ext>
+    </p:extLst>
+  </p:cSld>
+  <p:clrMapOvr>
+    <a:masterClrMapping/>
+  </p:clrMapOvr>
+</p:sld>
+</file>
+
+<file path=ppt/slides/slide30.xml><?xml version="1.0" encoding="utf-8"?>
+<p:sld xmlns:a="http://schemas.openxmlformats.org/drawingml/2006/main" xmlns:r="http://schemas.openxmlformats.org/officeDocument/2006/relationships" xmlns:p="http://schemas.openxmlformats.org/presentationml/2006/main">
+  <p:cSld>
+    <p:spTree>
+      <p:nvGrpSpPr>
+        <p:cNvPr id="1" name=""/>
+        <p:cNvGrpSpPr/>
+        <p:nvPr/>
+      </p:nvGrpSpPr>
+      <p:grpSpPr>
+        <a:xfrm>
+          <a:off x="0" y="0"/>
+          <a:ext cx="0" cy="0"/>
+          <a:chOff x="0" y="0"/>
+          <a:chExt cx="0" cy="0"/>
+        </a:xfrm>
+      </p:grpSpPr>
+      <p:sp>
+        <p:nvSpPr>
+          <p:cNvPr id="2" name="Title 1">
+            <a:extLst>
+              <a:ext uri="{FF2B5EF4-FFF2-40B4-BE49-F238E27FC236}">
+                <a16:creationId xmlns:a16="http://schemas.microsoft.com/office/drawing/2014/main" id="{C662B513-408F-4526-A2DC-27228DD074DD}"/>
+              </a:ext>
+            </a:extLst>
+          </p:cNvPr>
+          <p:cNvSpPr>
+            <a:spLocks noGrp="1"/>
+          </p:cNvSpPr>
+          <p:nvPr>
+            <p:ph type="title"/>
+          </p:nvPr>
+        </p:nvSpPr>
+        <p:spPr/>
+        <p:txBody>
+          <a:bodyPr/>
+          <a:lstStyle/>
+          <a:p>
+            <a:endParaRPr lang="en-US"/>
+          </a:p>
+        </p:txBody>
+      </p:sp>
+      <p:sp>
+        <p:nvSpPr>
+          <p:cNvPr id="3" name="Content Placeholder 2">
+            <a:extLst>
+              <a:ext uri="{FF2B5EF4-FFF2-40B4-BE49-F238E27FC236}">
+                <a16:creationId xmlns:a16="http://schemas.microsoft.com/office/drawing/2014/main" id="{95DEE2D4-DB30-4A39-86AE-D6C20B4BB097}"/>
+              </a:ext>
+            </a:extLst>
+          </p:cNvPr>
+          <p:cNvSpPr>
+            <a:spLocks noGrp="1"/>
+          </p:cNvSpPr>
+          <p:nvPr>
+            <p:ph idx="1"/>
+          </p:nvPr>
+        </p:nvSpPr>
+        <p:spPr/>
+        <p:txBody>
+          <a:bodyPr/>
+          <a:lstStyle/>
+          <a:p>
+            <a:endParaRPr lang="en-US" dirty="0"/>
+          </a:p>
+          <a:p>
+            <a:r>
+              <a:rPr lang="en-US" dirty="0"/>
+              <a:t>3)</a:t>
+            </a:r>
+          </a:p>
+          <a:p>
+            <a:endParaRPr lang="en-US" dirty="0"/>
+          </a:p>
+          <a:p>
+            <a:r>
+              <a:rPr lang="en-US" dirty="0"/>
+              <a:t>INTERVAL –</a:t>
+            </a:r>
+          </a:p>
+          <a:p>
+            <a:r>
+              <a:rPr lang="en-US" dirty="0"/>
+              <a:t> DATE_PART() function extracts a subfield from a date or time value. The following illustrates the DATE_PART() function:</a:t>
+            </a:r>
+          </a:p>
+          <a:p>
+            <a:r>
+              <a:rPr lang="en-US" dirty="0"/>
+              <a:t>DATE_PART(</a:t>
+            </a:r>
+            <a:r>
+              <a:rPr lang="en-US" dirty="0" err="1"/>
+              <a:t>field,source</a:t>
+            </a:r>
+            <a:r>
+              <a:rPr lang="en-US" dirty="0"/>
+              <a:t>)</a:t>
+            </a:r>
+          </a:p>
+        </p:txBody>
+      </p:sp>
+    </p:spTree>
+    <p:extLst>
+      <p:ext uri="{BB962C8B-B14F-4D97-AF65-F5344CB8AC3E}">
+        <p14:creationId xmlns:p14="http://schemas.microsoft.com/office/powerpoint/2010/main" val="2528630659"/>
+      </p:ext>
+    </p:extLst>
+  </p:cSld>
+  <p:clrMapOvr>
+    <a:masterClrMapping/>
+  </p:clrMapOvr>
+</p:sld>
+</file>
+
+<file path=ppt/slides/slide31.xml><?xml version="1.0" encoding="utf-8"?>
+<p:sld xmlns:a="http://schemas.openxmlformats.org/drawingml/2006/main" xmlns:r="http://schemas.openxmlformats.org/officeDocument/2006/relationships" xmlns:p="http://schemas.openxmlformats.org/presentationml/2006/main">
+  <p:cSld>
+    <p:spTree>
+      <p:nvGrpSpPr>
+        <p:cNvPr id="1" name=""/>
+        <p:cNvGrpSpPr/>
+        <p:nvPr/>
+      </p:nvGrpSpPr>
+      <p:grpSpPr>
+        <a:xfrm>
+          <a:off x="0" y="0"/>
+          <a:ext cx="0" cy="0"/>
+          <a:chOff x="0" y="0"/>
+          <a:chExt cx="0" cy="0"/>
+        </a:xfrm>
+      </p:grpSpPr>
+      <p:sp>
+        <p:nvSpPr>
+          <p:cNvPr id="2" name="Title 1">
+            <a:extLst>
+              <a:ext uri="{FF2B5EF4-FFF2-40B4-BE49-F238E27FC236}">
+                <a16:creationId xmlns:a16="http://schemas.microsoft.com/office/drawing/2014/main" id="{FC21EBD1-43B3-4D3D-9FC3-42E2C7DC3319}"/>
+              </a:ext>
+            </a:extLst>
+          </p:cNvPr>
+          <p:cNvSpPr>
+            <a:spLocks noGrp="1"/>
+          </p:cNvSpPr>
+          <p:nvPr>
+            <p:ph type="title"/>
+          </p:nvPr>
+        </p:nvSpPr>
+        <p:spPr/>
+        <p:txBody>
+          <a:bodyPr/>
+          <a:lstStyle/>
+          <a:p>
+            <a:r>
+              <a:rPr lang="en-US" dirty="0"/>
+              <a:t>DATE_PART(</a:t>
+            </a:r>
+            <a:r>
+              <a:rPr lang="en-US" dirty="0" err="1"/>
+              <a:t>field,source</a:t>
+            </a:r>
+            <a:r>
+              <a:rPr lang="en-US" dirty="0"/>
+              <a:t>)</a:t>
+            </a:r>
+            <a:br>
+              <a:rPr lang="en-US" dirty="0"/>
+            </a:br>
+            <a:endParaRPr lang="en-US" dirty="0"/>
+          </a:p>
+        </p:txBody>
+      </p:sp>
+      <p:sp>
+        <p:nvSpPr>
+          <p:cNvPr id="3" name="Content Placeholder 2">
+            <a:extLst>
+              <a:ext uri="{FF2B5EF4-FFF2-40B4-BE49-F238E27FC236}">
+                <a16:creationId xmlns:a16="http://schemas.microsoft.com/office/drawing/2014/main" id="{6E7253D8-D2BC-4DE0-8361-92DF67AA52F4}"/>
+              </a:ext>
+            </a:extLst>
+          </p:cNvPr>
+          <p:cNvSpPr>
+            <a:spLocks noGrp="1"/>
+          </p:cNvSpPr>
+          <p:nvPr>
+            <p:ph idx="1"/>
+          </p:nvPr>
+        </p:nvSpPr>
+        <p:spPr>
+          <a:xfrm>
+            <a:off x="1495880" y="2799556"/>
+            <a:ext cx="3914318" cy="3693319"/>
+          </a:xfrm>
+        </p:spPr>
+        <p:txBody>
+          <a:bodyPr>
+            <a:normAutofit fontScale="92500" lnSpcReduction="20000"/>
+          </a:bodyPr>
+          <a:lstStyle/>
+          <a:p>
+            <a:r>
+              <a:rPr lang="en-US" dirty="0"/>
+              <a:t>century</a:t>
+            </a:r>
+          </a:p>
+          <a:p>
+            <a:r>
+              <a:rPr lang="en-US" dirty="0"/>
+              <a:t>decade</a:t>
+            </a:r>
+          </a:p>
+          <a:p>
+            <a:r>
+              <a:rPr lang="en-US" dirty="0"/>
+              <a:t>year</a:t>
+            </a:r>
+          </a:p>
+          <a:p>
+            <a:r>
+              <a:rPr lang="en-US" dirty="0"/>
+              <a:t>month</a:t>
+            </a:r>
+          </a:p>
+          <a:p>
+            <a:r>
+              <a:rPr lang="en-US" dirty="0"/>
+              <a:t>day</a:t>
+            </a:r>
+          </a:p>
+          <a:p>
+            <a:r>
+              <a:rPr lang="en-US" dirty="0"/>
+              <a:t>hour</a:t>
+            </a:r>
+          </a:p>
+          <a:p>
+            <a:r>
+              <a:rPr lang="en-US" dirty="0"/>
+              <a:t>minute</a:t>
+            </a:r>
+          </a:p>
+          <a:p>
+            <a:r>
+              <a:rPr lang="en-US" dirty="0"/>
+              <a:t>second</a:t>
+            </a:r>
+          </a:p>
+          <a:p>
+            <a:r>
+              <a:rPr lang="en-US" dirty="0"/>
+              <a:t>microseconds</a:t>
+            </a:r>
+          </a:p>
+        </p:txBody>
+      </p:sp>
+      <p:sp>
+        <p:nvSpPr>
+          <p:cNvPr id="5" name="TextBox 4">
+            <a:extLst>
+              <a:ext uri="{FF2B5EF4-FFF2-40B4-BE49-F238E27FC236}">
+                <a16:creationId xmlns:a16="http://schemas.microsoft.com/office/drawing/2014/main" id="{AD0852CC-CDA9-4AC1-B516-0382C0EEEBB6}"/>
+              </a:ext>
+            </a:extLst>
+          </p:cNvPr>
+          <p:cNvSpPr txBox="1"/>
+          <p:nvPr/>
+        </p:nvSpPr>
+        <p:spPr>
+          <a:xfrm>
+            <a:off x="5943598" y="2799555"/>
+            <a:ext cx="4315328" cy="3693319"/>
+          </a:xfrm>
+          <a:prstGeom prst="rect">
+            <a:avLst/>
+          </a:prstGeom>
+          <a:noFill/>
+        </p:spPr>
+        <p:txBody>
+          <a:bodyPr wrap="square" rtlCol="0">
+            <a:spAutoFit/>
+          </a:bodyPr>
+          <a:lstStyle/>
+          <a:p>
+            <a:pPr marL="285750" indent="-285750">
+              <a:buFont typeface="Arial" panose="020B0604020202020204" pitchFamily="34" charset="0"/>
+              <a:buChar char="•"/>
+            </a:pPr>
+            <a:r>
+              <a:rPr lang="en-US" sz="2600" dirty="0"/>
+              <a:t>milliseconds</a:t>
+            </a:r>
+          </a:p>
+          <a:p>
+            <a:pPr marL="285750" indent="-285750">
+              <a:buFont typeface="Arial" panose="020B0604020202020204" pitchFamily="34" charset="0"/>
+              <a:buChar char="•"/>
+            </a:pPr>
+            <a:r>
+              <a:rPr lang="en-US" sz="2600" dirty="0" err="1"/>
+              <a:t>dow</a:t>
+            </a:r>
+            <a:r>
+              <a:rPr lang="en-US" sz="2600" dirty="0"/>
+              <a:t> (day of week)</a:t>
+            </a:r>
+          </a:p>
+          <a:p>
+            <a:pPr marL="285750" indent="-285750">
+              <a:buFont typeface="Arial" panose="020B0604020202020204" pitchFamily="34" charset="0"/>
+              <a:buChar char="•"/>
+            </a:pPr>
+            <a:r>
+              <a:rPr lang="en-US" sz="2600" dirty="0" err="1"/>
+              <a:t>doy</a:t>
+            </a:r>
+            <a:r>
+              <a:rPr lang="en-US" sz="2600" dirty="0"/>
+              <a:t> (day of year)</a:t>
+            </a:r>
+          </a:p>
+          <a:p>
+            <a:pPr marL="285750" indent="-285750">
+              <a:buFont typeface="Arial" panose="020B0604020202020204" pitchFamily="34" charset="0"/>
+              <a:buChar char="•"/>
+            </a:pPr>
+            <a:r>
+              <a:rPr lang="en-US" sz="2600" dirty="0"/>
+              <a:t>epoch</a:t>
+            </a:r>
+          </a:p>
+          <a:p>
+            <a:pPr marL="285750" indent="-285750">
+              <a:buFont typeface="Arial" panose="020B0604020202020204" pitchFamily="34" charset="0"/>
+              <a:buChar char="•"/>
+            </a:pPr>
+            <a:r>
+              <a:rPr lang="en-US" sz="2600" dirty="0" err="1"/>
+              <a:t>isodow</a:t>
+            </a:r>
+            <a:endParaRPr lang="en-US" sz="2600" dirty="0"/>
+          </a:p>
+          <a:p>
+            <a:pPr marL="285750" indent="-285750">
+              <a:buFont typeface="Arial" panose="020B0604020202020204" pitchFamily="34" charset="0"/>
+              <a:buChar char="•"/>
+            </a:pPr>
+            <a:r>
+              <a:rPr lang="en-US" sz="2600" dirty="0" err="1"/>
+              <a:t>isoyear</a:t>
+            </a:r>
+            <a:endParaRPr lang="en-US" sz="2600" dirty="0"/>
+          </a:p>
+          <a:p>
+            <a:pPr marL="285750" indent="-285750">
+              <a:buFont typeface="Arial" panose="020B0604020202020204" pitchFamily="34" charset="0"/>
+              <a:buChar char="•"/>
+            </a:pPr>
+            <a:r>
+              <a:rPr lang="en-US" sz="2600" dirty="0" err="1"/>
+              <a:t>timezone</a:t>
+            </a:r>
+            <a:endParaRPr lang="en-US" sz="2600" dirty="0"/>
+          </a:p>
+          <a:p>
+            <a:pPr marL="285750" indent="-285750">
+              <a:buFont typeface="Arial" panose="020B0604020202020204" pitchFamily="34" charset="0"/>
+              <a:buChar char="•"/>
+            </a:pPr>
+            <a:r>
+              <a:rPr lang="en-US" sz="2600" dirty="0" err="1"/>
+              <a:t>timezone_hour</a:t>
+            </a:r>
+            <a:endParaRPr lang="en-US" sz="2600" dirty="0"/>
+          </a:p>
+          <a:p>
+            <a:pPr marL="285750" indent="-285750">
+              <a:buFont typeface="Arial" panose="020B0604020202020204" pitchFamily="34" charset="0"/>
+              <a:buChar char="•"/>
+            </a:pPr>
+            <a:r>
+              <a:rPr lang="en-US" sz="2600" dirty="0" err="1"/>
+              <a:t>timezone_minute</a:t>
+            </a:r>
+            <a:endParaRPr lang="en-US" sz="2600" dirty="0"/>
+          </a:p>
+        </p:txBody>
+      </p:sp>
+      <p:sp>
+        <p:nvSpPr>
+          <p:cNvPr id="6" name="Rectangle 5">
+            <a:extLst>
+              <a:ext uri="{FF2B5EF4-FFF2-40B4-BE49-F238E27FC236}">
+                <a16:creationId xmlns:a16="http://schemas.microsoft.com/office/drawing/2014/main" id="{2182DBBA-6054-4936-961A-DA5C57B8E2E4}"/>
+              </a:ext>
+            </a:extLst>
+          </p:cNvPr>
+          <p:cNvSpPr/>
+          <p:nvPr/>
+        </p:nvSpPr>
+        <p:spPr>
+          <a:xfrm>
+            <a:off x="838201" y="980083"/>
+            <a:ext cx="10515599" cy="1754326"/>
+          </a:xfrm>
+          <a:prstGeom prst="rect">
+            <a:avLst/>
+          </a:prstGeom>
+        </p:spPr>
+        <p:txBody>
+          <a:bodyPr wrap="square">
+            <a:spAutoFit/>
+          </a:bodyPr>
+          <a:lstStyle/>
+          <a:p>
+            <a:r>
+              <a:rPr lang="en-US" dirty="0"/>
+              <a:t>The field is an identifier that determines what field to </a:t>
+            </a:r>
+            <a:r>
+              <a:rPr lang="en-US" b="1" dirty="0"/>
+              <a:t>extract</a:t>
+            </a:r>
+            <a:r>
+              <a:rPr lang="en-US" dirty="0"/>
+              <a:t> from the source. </a:t>
+            </a:r>
+          </a:p>
+          <a:p>
+            <a:pPr marL="342900" indent="-342900">
+              <a:buAutoNum type="arabicParenR"/>
+            </a:pPr>
+            <a:r>
+              <a:rPr lang="en-US" dirty="0"/>
+              <a:t>The values of the field must be in a list of permitted values mentioned below</a:t>
+            </a:r>
+          </a:p>
+          <a:p>
+            <a:pPr marL="342900" indent="-342900">
+              <a:buAutoNum type="arabicParenR"/>
+            </a:pPr>
+            <a:r>
+              <a:rPr lang="en-US" dirty="0"/>
+              <a:t>The source is a value of type TIMESTAMP or INTERVAL. If you pass a DATE value, the function will cast it to a TIMESTAMP value</a:t>
+            </a:r>
+          </a:p>
+        </p:txBody>
+      </p:sp>
+      <p:sp>
+        <p:nvSpPr>
+          <p:cNvPr id="8" name="Rectangle 2">
+            <a:extLst>
+              <a:ext uri="{FF2B5EF4-FFF2-40B4-BE49-F238E27FC236}">
+                <a16:creationId xmlns:a16="http://schemas.microsoft.com/office/drawing/2014/main" id="{04552D5C-3104-4D1B-ABCC-25667ACD06BB}"/>
+              </a:ext>
+            </a:extLst>
+          </p:cNvPr>
+          <p:cNvSpPr>
+            <a:spLocks noChangeArrowheads="1"/>
+          </p:cNvSpPr>
+          <p:nvPr/>
+        </p:nvSpPr>
+        <p:spPr bwMode="auto">
+          <a:xfrm>
+            <a:off x="838200" y="2097484"/>
+            <a:ext cx="28854" cy="138499"/>
+          </a:xfrm>
+          <a:prstGeom prst="rect">
+            <a:avLst/>
+          </a:prstGeom>
+          <a:noFill/>
+          <a:ln>
+            <a:noFill/>
+          </a:ln>
+          <a:effectLst/>
+          <a:extLst>
+            <a:ext uri="{909E8E84-426E-40DD-AFC4-6F175D3DCCD1}">
+              <a14:hiddenFill xmlns:a14="http://schemas.microsoft.com/office/drawing/2010/main">
+                <a:solidFill>
+                  <a:schemeClr val="accent1"/>
+                </a:solidFill>
+              </a14:hiddenFill>
+            </a:ext>
+            <a:ext uri="{91240B29-F687-4F45-9708-019B960494DF}">
+              <a14:hiddenLine xmlns:a14="http://schemas.microsoft.com/office/drawing/2010/main" w="9525">
+                <a:solidFill>
+                  <a:schemeClr val="tx1"/>
+                </a:solidFill>
+                <a:miter lim="800000"/>
+                <a:headEnd/>
+                <a:tailEnd/>
+              </a14:hiddenLine>
+            </a:ext>
+            <a:ext uri="{AF507438-7753-43E0-B8FC-AC1667EBCBE1}">
+              <a14:hiddenEffects xmlns:a14="http://schemas.microsoft.com/office/drawing/2010/main">
+                <a:effectLst>
+                  <a:outerShdw dist="35921" dir="2700000" algn="ctr" rotWithShape="0">
+                    <a:schemeClr val="bg2"/>
+                  </a:outerShdw>
+                </a:effectLst>
+              </a14:hiddenEffects>
+            </a:ext>
+          </a:extLst>
+        </p:spPr>
+        <p:txBody>
+          <a:bodyPr vert="horz" wrap="none" lIns="0" tIns="0" rIns="0" bIns="0" numCol="1" anchor="ctr" anchorCtr="0" compatLnSpc="1">
+            <a:prstTxWarp prst="textNoShape">
+              <a:avLst/>
+            </a:prstTxWarp>
+            <a:spAutoFit/>
+          </a:bodyPr>
+          <a:lstStyle/>
+          <a:p>
+            <a:pPr lvl="0" eaLnBrk="0" fontAlgn="base" hangingPunct="0">
+              <a:spcBef>
+                <a:spcPct val="0"/>
+              </a:spcBef>
+              <a:spcAft>
+                <a:spcPct val="0"/>
+              </a:spcAft>
+            </a:pPr>
+            <a:r>
+              <a:rPr lang="en-US" altLang="en-US" sz="900" dirty="0">
+                <a:solidFill>
+                  <a:srgbClr val="242729"/>
+                </a:solidFill>
+                <a:latin typeface="inherit"/>
+              </a:rPr>
+              <a:t>.</a:t>
+            </a:r>
+            <a:endParaRPr kumimoji="0" lang="en-US" altLang="en-US" sz="1800" b="0" i="0" u="none" strike="noStrike" cap="none" normalizeH="0" baseline="0" dirty="0">
+              <a:ln>
+                <a:noFill/>
+              </a:ln>
+              <a:solidFill>
+                <a:schemeClr val="tx1"/>
+              </a:solidFill>
+              <a:effectLst/>
+              <a:latin typeface="Arial" panose="020B0604020202020204" pitchFamily="34" charset="0"/>
+            </a:endParaRPr>
+          </a:p>
+        </p:txBody>
+      </p:sp>
+    </p:spTree>
+    <p:extLst>
+      <p:ext uri="{BB962C8B-B14F-4D97-AF65-F5344CB8AC3E}">
+        <p14:creationId xmlns:p14="http://schemas.microsoft.com/office/powerpoint/2010/main" val="3170194944"/>
+      </p:ext>
+    </p:extLst>
+  </p:cSld>
+  <p:clrMapOvr>
+    <a:masterClrMapping/>
+  </p:clrMapOvr>
+</p:sld>
+</file>
+
+<file path=ppt/slides/slide32.xml><?xml version="1.0" encoding="utf-8"?>
+<p:sld xmlns:a="http://schemas.openxmlformats.org/drawingml/2006/main" xmlns:r="http://schemas.openxmlformats.org/officeDocument/2006/relationships" xmlns:p="http://schemas.openxmlformats.org/presentationml/2006/main">
+  <p:cSld>
+    <p:spTree>
+      <p:nvGrpSpPr>
+        <p:cNvPr id="1" name=""/>
+        <p:cNvGrpSpPr/>
+        <p:nvPr/>
+      </p:nvGrpSpPr>
+      <p:grpSpPr>
+        <a:xfrm>
+          <a:off x="0" y="0"/>
+          <a:ext cx="0" cy="0"/>
+          <a:chOff x="0" y="0"/>
+          <a:chExt cx="0" cy="0"/>
+        </a:xfrm>
+      </p:grpSpPr>
+      <p:sp>
+        <p:nvSpPr>
+          <p:cNvPr id="2" name="Title 1">
+            <a:extLst>
+              <a:ext uri="{FF2B5EF4-FFF2-40B4-BE49-F238E27FC236}">
+                <a16:creationId xmlns:a16="http://schemas.microsoft.com/office/drawing/2014/main" id="{7097D260-7E94-43BB-BA4C-050E93C96095}"/>
+              </a:ext>
+            </a:extLst>
+          </p:cNvPr>
+          <p:cNvSpPr>
+            <a:spLocks noGrp="1"/>
+          </p:cNvSpPr>
+          <p:nvPr>
+            <p:ph type="title"/>
+          </p:nvPr>
+        </p:nvSpPr>
+        <p:spPr/>
+        <p:txBody>
+          <a:bodyPr/>
+          <a:lstStyle/>
+          <a:p>
+            <a:r>
+              <a:rPr lang="en-US" dirty="0"/>
+              <a:t>Date Part</a:t>
+            </a:r>
+          </a:p>
+        </p:txBody>
+      </p:sp>
+      <p:sp>
+        <p:nvSpPr>
+          <p:cNvPr id="3" name="Content Placeholder 2">
+            <a:extLst>
+              <a:ext uri="{FF2B5EF4-FFF2-40B4-BE49-F238E27FC236}">
+                <a16:creationId xmlns:a16="http://schemas.microsoft.com/office/drawing/2014/main" id="{59A5B6BF-E4C3-4BF4-8A06-291AEFF80240}"/>
+              </a:ext>
+            </a:extLst>
+          </p:cNvPr>
+          <p:cNvSpPr>
+            <a:spLocks noGrp="1"/>
+          </p:cNvSpPr>
+          <p:nvPr>
+            <p:ph idx="1"/>
+          </p:nvPr>
+        </p:nvSpPr>
+        <p:spPr/>
+        <p:txBody>
+          <a:bodyPr>
+            <a:normAutofit fontScale="92500" lnSpcReduction="20000"/>
+          </a:bodyPr>
+          <a:lstStyle/>
+          <a:p>
+            <a:r>
+              <a:rPr lang="en-US" dirty="0"/>
+              <a:t>DATE_PART() function extracts a subfield from a date or time value. The following illustrates the DATE_PART() function:</a:t>
+            </a:r>
+          </a:p>
+          <a:p>
+            <a:r>
+              <a:rPr lang="en-US" dirty="0"/>
+              <a:t>DATE_PART(</a:t>
+            </a:r>
+            <a:r>
+              <a:rPr lang="en-US" dirty="0" err="1"/>
+              <a:t>field,source</a:t>
+            </a:r>
+            <a:r>
+              <a:rPr lang="en-US" dirty="0"/>
+              <a:t>)</a:t>
+            </a:r>
+          </a:p>
+          <a:p>
+            <a:r>
+              <a:rPr lang="en-US" dirty="0"/>
+              <a:t>EXTRACT(year FROM timestamp) = DATE_PART('</a:t>
+            </a:r>
+            <a:r>
+              <a:rPr lang="en-US" dirty="0" err="1"/>
+              <a:t>year',timestamp</a:t>
+            </a:r>
+            <a:r>
+              <a:rPr lang="en-US" dirty="0"/>
+              <a:t>)</a:t>
+            </a:r>
+          </a:p>
+          <a:p>
+            <a:r>
+              <a:rPr lang="en-US" dirty="0"/>
+              <a:t>extract() gets re-written to </a:t>
+            </a:r>
+            <a:r>
+              <a:rPr lang="en-US" dirty="0" err="1"/>
+              <a:t>date_part</a:t>
+            </a:r>
+            <a:r>
+              <a:rPr lang="en-US" dirty="0"/>
+              <a:t>() - check the execution plan and you will see.</a:t>
+            </a:r>
+          </a:p>
+          <a:p>
+            <a:endParaRPr lang="en-US" dirty="0"/>
+          </a:p>
+          <a:p>
+            <a:r>
+              <a:rPr lang="en-US" dirty="0"/>
+              <a:t>extract() complies with the SQL standard, </a:t>
+            </a:r>
+            <a:r>
+              <a:rPr lang="en-US" dirty="0" err="1"/>
+              <a:t>date_part</a:t>
+            </a:r>
+            <a:r>
+              <a:rPr lang="en-US" dirty="0"/>
+              <a:t>() is a Postgres specific query. As one gets converted to the other, there is absolutely no performance difference. </a:t>
+            </a:r>
+          </a:p>
+          <a:p>
+            <a:endParaRPr lang="en-US" dirty="0"/>
+          </a:p>
+        </p:txBody>
+      </p:sp>
+    </p:spTree>
+    <p:extLst>
+      <p:ext uri="{BB962C8B-B14F-4D97-AF65-F5344CB8AC3E}">
+        <p14:creationId xmlns:p14="http://schemas.microsoft.com/office/powerpoint/2010/main" val="2060091869"/>
+      </p:ext>
+    </p:extLst>
+  </p:cSld>
+  <p:clrMapOvr>
+    <a:masterClrMapping/>
+  </p:clrMapOvr>
+</p:sld>
+</file>
+
+<file path=ppt/slides/slide33.xml><?xml version="1.0" encoding="utf-8"?>
+<p:sld xmlns:a="http://schemas.openxmlformats.org/drawingml/2006/main" xmlns:r="http://schemas.openxmlformats.org/officeDocument/2006/relationships" xmlns:p="http://schemas.openxmlformats.org/presentationml/2006/main">
+  <p:cSld>
+    <p:bg>
+      <p:bgPr>
+        <a:solidFill>
+          <a:schemeClr val="bg1"/>
+        </a:solidFill>
+        <a:effectLst/>
+      </p:bgPr>
+    </p:bg>
+    <p:spTree>
+      <p:nvGrpSpPr>
+        <p:cNvPr id="1" name=""/>
+        <p:cNvGrpSpPr/>
+        <p:nvPr/>
+      </p:nvGrpSpPr>
+      <p:grpSpPr>
+        <a:xfrm>
+          <a:off x="0" y="0"/>
+          <a:ext cx="0" cy="0"/>
+          <a:chOff x="0" y="0"/>
+          <a:chExt cx="0" cy="0"/>
+        </a:xfrm>
+      </p:grpSpPr>
+      <p:graphicFrame>
+        <p:nvGraphicFramePr>
+          <p:cNvPr id="4" name="Content Placeholder 3">
+            <a:extLst>
+              <a:ext uri="{FF2B5EF4-FFF2-40B4-BE49-F238E27FC236}">
+                <a16:creationId xmlns:a16="http://schemas.microsoft.com/office/drawing/2014/main" id="{CF348D5B-BF0D-49B8-A030-84BB21C762E2}"/>
+              </a:ext>
+            </a:extLst>
+          </p:cNvPr>
+          <p:cNvGraphicFramePr>
+            <a:graphicFrameLocks noGrp="1"/>
+          </p:cNvGraphicFramePr>
+          <p:nvPr>
+            <p:ph idx="1"/>
+            <p:extLst>
+              <p:ext uri="{D42A27DB-BD31-4B8C-83A1-F6EECF244321}">
+                <p14:modId xmlns:p14="http://schemas.microsoft.com/office/powerpoint/2010/main" val="756772028"/>
+              </p:ext>
+            </p:extLst>
+          </p:nvPr>
+        </p:nvGraphicFramePr>
+        <p:xfrm>
+          <a:off x="643466" y="428655"/>
+          <a:ext cx="10905067" cy="5594930"/>
+        </p:xfrm>
+        <a:graphic>
+          <a:graphicData uri="http://schemas.openxmlformats.org/drawingml/2006/table">
+            <a:tbl>
+              <a:tblPr firstRow="1" bandRow="1">
+                <a:tableStyleId>{9D7B26C5-4107-4FEC-AEDC-1716B250A1EF}</a:tableStyleId>
+              </a:tblPr>
+              <a:tblGrid>
+                <a:gridCol w="1510435">
+                  <a:extLst>
+                    <a:ext uri="{9D8B030D-6E8A-4147-A177-3AD203B41FA5}">
+                      <a16:colId xmlns:a16="http://schemas.microsoft.com/office/drawing/2014/main" val="577318838"/>
+                    </a:ext>
+                  </a:extLst>
+                </a:gridCol>
+                <a:gridCol w="5720098">
+                  <a:extLst>
+                    <a:ext uri="{9D8B030D-6E8A-4147-A177-3AD203B41FA5}">
+                      <a16:colId xmlns:a16="http://schemas.microsoft.com/office/drawing/2014/main" val="3221101755"/>
+                    </a:ext>
+                  </a:extLst>
+                </a:gridCol>
+                <a:gridCol w="3674534">
+                  <a:extLst>
+                    <a:ext uri="{9D8B030D-6E8A-4147-A177-3AD203B41FA5}">
+                      <a16:colId xmlns:a16="http://schemas.microsoft.com/office/drawing/2014/main" val="532163988"/>
+                    </a:ext>
+                  </a:extLst>
+                </a:gridCol>
+              </a:tblGrid>
+              <a:tr h="233966">
+                <a:tc>
+                  <a:txBody>
+                    <a:bodyPr/>
+                    <a:lstStyle/>
+                    <a:p>
+                      <a:r>
+                        <a:rPr lang="en-US" sz="1200">
+                          <a:effectLst/>
+                        </a:rPr>
+                        <a:t>Field Value</a:t>
+                      </a:r>
+                    </a:p>
+                  </a:txBody>
+                  <a:tcPr marL="17433" marR="17433" marT="8716" marB="8716" anchor="ctr"/>
+                </a:tc>
+                <a:tc>
+                  <a:txBody>
+                    <a:bodyPr/>
+                    <a:lstStyle/>
+                    <a:p>
+                      <a:r>
+                        <a:rPr lang="en-US" sz="1200">
+                          <a:effectLst/>
+                        </a:rPr>
+                        <a:t>TIMESTAMP</a:t>
+                      </a:r>
+                    </a:p>
+                  </a:txBody>
+                  <a:tcPr marL="17433" marR="17433" marT="8716" marB="8716" anchor="ctr"/>
+                </a:tc>
+                <a:tc>
+                  <a:txBody>
+                    <a:bodyPr/>
+                    <a:lstStyle/>
+                    <a:p>
+                      <a:r>
+                        <a:rPr lang="en-US" sz="1200">
+                          <a:effectLst/>
+                        </a:rPr>
+                        <a:t>Interval</a:t>
+                      </a:r>
+                    </a:p>
+                  </a:txBody>
+                  <a:tcPr marL="17433" marR="17433" marT="8716" marB="8716" anchor="ctr"/>
+                </a:tc>
+                <a:extLst>
+                  <a:ext uri="{0D108BD9-81ED-4DB2-BD59-A6C34878D82A}">
+                    <a16:rowId xmlns:a16="http://schemas.microsoft.com/office/drawing/2014/main" val="3615948326"/>
+                  </a:ext>
+                </a:extLst>
+              </a:tr>
+              <a:tr h="233966">
+                <a:tc>
+                  <a:txBody>
+                    <a:bodyPr/>
+                    <a:lstStyle/>
+                    <a:p>
+                      <a:pPr algn="l" fontAlgn="t"/>
+                      <a:r>
+                        <a:rPr lang="en-US" sz="1200">
+                          <a:effectLst/>
+                        </a:rPr>
+                        <a:t>CENTURY</a:t>
+                      </a:r>
+                    </a:p>
+                  </a:txBody>
+                  <a:tcPr marL="17433" marR="17433" marT="8716" marB="8716"/>
+                </a:tc>
+                <a:tc>
+                  <a:txBody>
+                    <a:bodyPr/>
+                    <a:lstStyle/>
+                    <a:p>
+                      <a:pPr algn="l" fontAlgn="t"/>
+                      <a:r>
+                        <a:rPr lang="en-US" sz="1200">
+                          <a:effectLst/>
+                        </a:rPr>
+                        <a:t>The century</a:t>
+                      </a:r>
+                    </a:p>
+                  </a:txBody>
+                  <a:tcPr marL="17433" marR="17433" marT="8716" marB="8716"/>
+                </a:tc>
+                <a:tc>
+                  <a:txBody>
+                    <a:bodyPr/>
+                    <a:lstStyle/>
+                    <a:p>
+                      <a:pPr algn="l" fontAlgn="t"/>
+                      <a:r>
+                        <a:rPr lang="en-US" sz="1200">
+                          <a:effectLst/>
+                        </a:rPr>
+                        <a:t>The number of centuries</a:t>
+                      </a:r>
+                    </a:p>
+                  </a:txBody>
+                  <a:tcPr marL="17433" marR="17433" marT="8716" marB="8716"/>
+                </a:tc>
+                <a:extLst>
+                  <a:ext uri="{0D108BD9-81ED-4DB2-BD59-A6C34878D82A}">
+                    <a16:rowId xmlns:a16="http://schemas.microsoft.com/office/drawing/2014/main" val="1412753289"/>
+                  </a:ext>
+                </a:extLst>
+              </a:tr>
+              <a:tr h="233966">
+                <a:tc>
+                  <a:txBody>
+                    <a:bodyPr/>
+                    <a:lstStyle/>
+                    <a:p>
+                      <a:pPr algn="l" fontAlgn="t"/>
+                      <a:r>
+                        <a:rPr lang="en-US" sz="1200">
+                          <a:effectLst/>
+                        </a:rPr>
+                        <a:t>DAY</a:t>
+                      </a:r>
+                    </a:p>
+                  </a:txBody>
+                  <a:tcPr marL="17433" marR="17433" marT="8716" marB="8716"/>
+                </a:tc>
+                <a:tc>
+                  <a:txBody>
+                    <a:bodyPr/>
+                    <a:lstStyle/>
+                    <a:p>
+                      <a:pPr algn="l" fontAlgn="t"/>
+                      <a:r>
+                        <a:rPr lang="en-US" sz="1200">
+                          <a:effectLst/>
+                        </a:rPr>
+                        <a:t>The day of the month (1-31)</a:t>
+                      </a:r>
+                    </a:p>
+                  </a:txBody>
+                  <a:tcPr marL="17433" marR="17433" marT="8716" marB="8716"/>
+                </a:tc>
+                <a:tc>
+                  <a:txBody>
+                    <a:bodyPr/>
+                    <a:lstStyle/>
+                    <a:p>
+                      <a:pPr algn="l" fontAlgn="t"/>
+                      <a:r>
+                        <a:rPr lang="en-US" sz="1200">
+                          <a:effectLst/>
+                        </a:rPr>
+                        <a:t>The number of days</a:t>
+                      </a:r>
+                    </a:p>
+                  </a:txBody>
+                  <a:tcPr marL="17433" marR="17433" marT="8716" marB="8716"/>
+                </a:tc>
+                <a:extLst>
+                  <a:ext uri="{0D108BD9-81ED-4DB2-BD59-A6C34878D82A}">
+                    <a16:rowId xmlns:a16="http://schemas.microsoft.com/office/drawing/2014/main" val="1221165100"/>
+                  </a:ext>
+                </a:extLst>
+              </a:tr>
+              <a:tr h="233966">
+                <a:tc>
+                  <a:txBody>
+                    <a:bodyPr/>
+                    <a:lstStyle/>
+                    <a:p>
+                      <a:pPr algn="l" fontAlgn="t"/>
+                      <a:r>
+                        <a:rPr lang="en-US" sz="1200">
+                          <a:effectLst/>
+                        </a:rPr>
+                        <a:t>DECADE</a:t>
+                      </a:r>
+                    </a:p>
+                  </a:txBody>
+                  <a:tcPr marL="17433" marR="17433" marT="8716" marB="8716"/>
+                </a:tc>
+                <a:tc>
+                  <a:txBody>
+                    <a:bodyPr/>
+                    <a:lstStyle/>
+                    <a:p>
+                      <a:pPr algn="l" fontAlgn="t"/>
+                      <a:r>
+                        <a:rPr lang="en-US" sz="1200">
+                          <a:effectLst/>
+                        </a:rPr>
+                        <a:t>The decade that is the year divided by 10</a:t>
+                      </a:r>
+                    </a:p>
+                  </a:txBody>
+                  <a:tcPr marL="17433" marR="17433" marT="8716" marB="8716"/>
+                </a:tc>
+                <a:tc>
+                  <a:txBody>
+                    <a:bodyPr/>
+                    <a:lstStyle/>
+                    <a:p>
+                      <a:pPr algn="l" fontAlgn="t"/>
+                      <a:r>
+                        <a:rPr lang="en-US" sz="1200">
+                          <a:effectLst/>
+                        </a:rPr>
+                        <a:t>Sames as TIMESTAMP</a:t>
+                      </a:r>
+                    </a:p>
+                  </a:txBody>
+                  <a:tcPr marL="17433" marR="17433" marT="8716" marB="8716"/>
+                </a:tc>
+                <a:extLst>
+                  <a:ext uri="{0D108BD9-81ED-4DB2-BD59-A6C34878D82A}">
+                    <a16:rowId xmlns:a16="http://schemas.microsoft.com/office/drawing/2014/main" val="2135996139"/>
+                  </a:ext>
+                </a:extLst>
+              </a:tr>
+              <a:tr h="233966">
+                <a:tc>
+                  <a:txBody>
+                    <a:bodyPr/>
+                    <a:lstStyle/>
+                    <a:p>
+                      <a:pPr algn="l" fontAlgn="t"/>
+                      <a:r>
+                        <a:rPr lang="en-US" sz="1200">
+                          <a:effectLst/>
+                        </a:rPr>
+                        <a:t>DOW</a:t>
+                      </a:r>
+                    </a:p>
+                  </a:txBody>
+                  <a:tcPr marL="17433" marR="17433" marT="8716" marB="8716"/>
+                </a:tc>
+                <a:tc>
+                  <a:txBody>
+                    <a:bodyPr/>
+                    <a:lstStyle/>
+                    <a:p>
+                      <a:pPr algn="l" fontAlgn="t"/>
+                      <a:r>
+                        <a:rPr lang="en-US" sz="1200">
+                          <a:effectLst/>
+                        </a:rPr>
+                        <a:t>The day of week Sunday (0) to Saturday (6)</a:t>
+                      </a:r>
+                    </a:p>
+                  </a:txBody>
+                  <a:tcPr marL="17433" marR="17433" marT="8716" marB="8716"/>
+                </a:tc>
+                <a:tc>
+                  <a:txBody>
+                    <a:bodyPr/>
+                    <a:lstStyle/>
+                    <a:p>
+                      <a:pPr algn="l" fontAlgn="t"/>
+                      <a:r>
+                        <a:rPr lang="en-US" sz="1200">
+                          <a:effectLst/>
+                        </a:rPr>
+                        <a:t>N/A</a:t>
+                      </a:r>
+                    </a:p>
+                  </a:txBody>
+                  <a:tcPr marL="17433" marR="17433" marT="8716" marB="8716"/>
+                </a:tc>
+                <a:extLst>
+                  <a:ext uri="{0D108BD9-81ED-4DB2-BD59-A6C34878D82A}">
+                    <a16:rowId xmlns:a16="http://schemas.microsoft.com/office/drawing/2014/main" val="261391441"/>
+                  </a:ext>
+                </a:extLst>
+              </a:tr>
+              <a:tr h="233966">
+                <a:tc>
+                  <a:txBody>
+                    <a:bodyPr/>
+                    <a:lstStyle/>
+                    <a:p>
+                      <a:pPr algn="l" fontAlgn="t"/>
+                      <a:r>
+                        <a:rPr lang="en-US" sz="1200">
+                          <a:effectLst/>
+                        </a:rPr>
+                        <a:t>DOY</a:t>
+                      </a:r>
+                    </a:p>
+                  </a:txBody>
+                  <a:tcPr marL="17433" marR="17433" marT="8716" marB="8716"/>
+                </a:tc>
+                <a:tc>
+                  <a:txBody>
+                    <a:bodyPr/>
+                    <a:lstStyle/>
+                    <a:p>
+                      <a:pPr algn="l" fontAlgn="t"/>
+                      <a:r>
+                        <a:rPr lang="en-US" sz="1200">
+                          <a:effectLst/>
+                        </a:rPr>
+                        <a:t>The day of year that ranges from 1 to 366</a:t>
+                      </a:r>
+                    </a:p>
+                  </a:txBody>
+                  <a:tcPr marL="17433" marR="17433" marT="8716" marB="8716"/>
+                </a:tc>
+                <a:tc>
+                  <a:txBody>
+                    <a:bodyPr/>
+                    <a:lstStyle/>
+                    <a:p>
+                      <a:pPr algn="l" fontAlgn="t"/>
+                      <a:r>
+                        <a:rPr lang="en-US" sz="1200">
+                          <a:effectLst/>
+                        </a:rPr>
+                        <a:t>N/A</a:t>
+                      </a:r>
+                    </a:p>
+                  </a:txBody>
+                  <a:tcPr marL="17433" marR="17433" marT="8716" marB="8716"/>
+                </a:tc>
+                <a:extLst>
+                  <a:ext uri="{0D108BD9-81ED-4DB2-BD59-A6C34878D82A}">
+                    <a16:rowId xmlns:a16="http://schemas.microsoft.com/office/drawing/2014/main" val="1358763651"/>
+                  </a:ext>
+                </a:extLst>
+              </a:tr>
+              <a:tr h="233966">
+                <a:tc>
+                  <a:txBody>
+                    <a:bodyPr/>
+                    <a:lstStyle/>
+                    <a:p>
+                      <a:pPr algn="l" fontAlgn="t"/>
+                      <a:r>
+                        <a:rPr lang="en-US" sz="1200">
+                          <a:effectLst/>
+                        </a:rPr>
+                        <a:t>EPOCH</a:t>
+                      </a:r>
+                    </a:p>
+                  </a:txBody>
+                  <a:tcPr marL="17433" marR="17433" marT="8716" marB="8716"/>
+                </a:tc>
+                <a:tc>
+                  <a:txBody>
+                    <a:bodyPr/>
+                    <a:lstStyle/>
+                    <a:p>
+                      <a:pPr algn="l" fontAlgn="t"/>
+                      <a:r>
+                        <a:rPr lang="en-US" sz="1200">
+                          <a:effectLst/>
+                        </a:rPr>
+                        <a:t>The number of seconds since 1970-01-01 00:00:00 UTC</a:t>
+                      </a:r>
+                    </a:p>
+                  </a:txBody>
+                  <a:tcPr marL="17433" marR="17433" marT="8716" marB="8716"/>
+                </a:tc>
+                <a:tc>
+                  <a:txBody>
+                    <a:bodyPr/>
+                    <a:lstStyle/>
+                    <a:p>
+                      <a:pPr algn="l" fontAlgn="t"/>
+                      <a:r>
+                        <a:rPr lang="en-US" sz="1200">
+                          <a:effectLst/>
+                        </a:rPr>
+                        <a:t>The total number of seconds in the interval</a:t>
+                      </a:r>
+                    </a:p>
+                  </a:txBody>
+                  <a:tcPr marL="17433" marR="17433" marT="8716" marB="8716"/>
+                </a:tc>
+                <a:extLst>
+                  <a:ext uri="{0D108BD9-81ED-4DB2-BD59-A6C34878D82A}">
+                    <a16:rowId xmlns:a16="http://schemas.microsoft.com/office/drawing/2014/main" val="4080768597"/>
+                  </a:ext>
+                </a:extLst>
+              </a:tr>
+              <a:tr h="233966">
+                <a:tc>
+                  <a:txBody>
+                    <a:bodyPr/>
+                    <a:lstStyle/>
+                    <a:p>
+                      <a:pPr algn="l" fontAlgn="t"/>
+                      <a:r>
+                        <a:rPr lang="en-US" sz="1200">
+                          <a:effectLst/>
+                        </a:rPr>
+                        <a:t>HOUR</a:t>
+                      </a:r>
+                    </a:p>
+                  </a:txBody>
+                  <a:tcPr marL="17433" marR="17433" marT="8716" marB="8716"/>
+                </a:tc>
+                <a:tc>
+                  <a:txBody>
+                    <a:bodyPr/>
+                    <a:lstStyle/>
+                    <a:p>
+                      <a:pPr algn="l" fontAlgn="t"/>
+                      <a:r>
+                        <a:rPr lang="en-US" sz="1200" dirty="0">
+                          <a:effectLst/>
+                        </a:rPr>
+                        <a:t>The hour (0-23)</a:t>
+                      </a:r>
+                    </a:p>
+                  </a:txBody>
+                  <a:tcPr marL="17433" marR="17433" marT="8716" marB="8716"/>
+                </a:tc>
+                <a:tc>
+                  <a:txBody>
+                    <a:bodyPr/>
+                    <a:lstStyle/>
+                    <a:p>
+                      <a:pPr algn="l" fontAlgn="t"/>
+                      <a:r>
+                        <a:rPr lang="en-US" sz="1200">
+                          <a:effectLst/>
+                        </a:rPr>
+                        <a:t>The number of hours</a:t>
+                      </a:r>
+                    </a:p>
+                  </a:txBody>
+                  <a:tcPr marL="17433" marR="17433" marT="8716" marB="8716"/>
+                </a:tc>
+                <a:extLst>
+                  <a:ext uri="{0D108BD9-81ED-4DB2-BD59-A6C34878D82A}">
+                    <a16:rowId xmlns:a16="http://schemas.microsoft.com/office/drawing/2014/main" val="1761223336"/>
+                  </a:ext>
+                </a:extLst>
+              </a:tr>
+              <a:tr h="233966">
+                <a:tc>
+                  <a:txBody>
+                    <a:bodyPr/>
+                    <a:lstStyle/>
+                    <a:p>
+                      <a:pPr algn="l" fontAlgn="t"/>
+                      <a:r>
+                        <a:rPr lang="en-US" sz="1200">
+                          <a:effectLst/>
+                        </a:rPr>
+                        <a:t>ISODOW</a:t>
+                      </a:r>
+                    </a:p>
+                  </a:txBody>
+                  <a:tcPr marL="17433" marR="17433" marT="8716" marB="8716"/>
+                </a:tc>
+                <a:tc>
+                  <a:txBody>
+                    <a:bodyPr/>
+                    <a:lstStyle/>
+                    <a:p>
+                      <a:pPr algn="l" fontAlgn="t"/>
+                      <a:r>
+                        <a:rPr lang="en-US" sz="1200">
+                          <a:effectLst/>
+                        </a:rPr>
+                        <a:t>Day of week based on ISO 8601 Monday (1) to Sunday (7)</a:t>
+                      </a:r>
+                    </a:p>
+                  </a:txBody>
+                  <a:tcPr marL="17433" marR="17433" marT="8716" marB="8716"/>
+                </a:tc>
+                <a:tc>
+                  <a:txBody>
+                    <a:bodyPr/>
+                    <a:lstStyle/>
+                    <a:p>
+                      <a:pPr algn="l" fontAlgn="t"/>
+                      <a:r>
+                        <a:rPr lang="en-US" sz="1200">
+                          <a:effectLst/>
+                        </a:rPr>
+                        <a:t>N/A</a:t>
+                      </a:r>
+                    </a:p>
+                  </a:txBody>
+                  <a:tcPr marL="17433" marR="17433" marT="8716" marB="8716"/>
+                </a:tc>
+                <a:extLst>
+                  <a:ext uri="{0D108BD9-81ED-4DB2-BD59-A6C34878D82A}">
+                    <a16:rowId xmlns:a16="http://schemas.microsoft.com/office/drawing/2014/main" val="2168786404"/>
+                  </a:ext>
+                </a:extLst>
+              </a:tr>
+              <a:tr h="233966">
+                <a:tc>
+                  <a:txBody>
+                    <a:bodyPr/>
+                    <a:lstStyle/>
+                    <a:p>
+                      <a:pPr algn="l" fontAlgn="t"/>
+                      <a:r>
+                        <a:rPr lang="en-US" sz="1200" dirty="0">
+                          <a:effectLst/>
+                        </a:rPr>
+                        <a:t>ISOYEAR*</a:t>
+                      </a:r>
+                    </a:p>
+                  </a:txBody>
+                  <a:tcPr marL="17433" marR="17433" marT="8716" marB="8716"/>
+                </a:tc>
+                <a:tc>
+                  <a:txBody>
+                    <a:bodyPr/>
+                    <a:lstStyle/>
+                    <a:p>
+                      <a:pPr algn="l" fontAlgn="t"/>
+                      <a:r>
+                        <a:rPr lang="en-US" sz="1200" dirty="0">
+                          <a:effectLst/>
+                        </a:rPr>
+                        <a:t>ISO 8601 week number of year</a:t>
+                      </a:r>
+                    </a:p>
+                  </a:txBody>
+                  <a:tcPr marL="17433" marR="17433" marT="8716" marB="8716"/>
+                </a:tc>
+                <a:tc>
+                  <a:txBody>
+                    <a:bodyPr/>
+                    <a:lstStyle/>
+                    <a:p>
+                      <a:pPr algn="l" fontAlgn="t"/>
+                      <a:r>
+                        <a:rPr lang="en-US" sz="1200">
+                          <a:effectLst/>
+                        </a:rPr>
+                        <a:t>N/A</a:t>
+                      </a:r>
+                    </a:p>
+                  </a:txBody>
+                  <a:tcPr marL="17433" marR="17433" marT="8716" marB="8716"/>
+                </a:tc>
+                <a:extLst>
+                  <a:ext uri="{0D108BD9-81ED-4DB2-BD59-A6C34878D82A}">
+                    <a16:rowId xmlns:a16="http://schemas.microsoft.com/office/drawing/2014/main" val="3961958948"/>
+                  </a:ext>
+                </a:extLst>
+              </a:tr>
+              <a:tr h="233966">
+                <a:tc>
+                  <a:txBody>
+                    <a:bodyPr/>
+                    <a:lstStyle/>
+                    <a:p>
+                      <a:pPr algn="l" fontAlgn="t"/>
+                      <a:r>
+                        <a:rPr lang="en-US" sz="1200" dirty="0">
+                          <a:effectLst/>
+                        </a:rPr>
+                        <a:t>MICROSECONDS</a:t>
+                      </a:r>
+                    </a:p>
+                  </a:txBody>
+                  <a:tcPr marL="17433" marR="17433" marT="8716" marB="8716"/>
+                </a:tc>
+                <a:tc>
+                  <a:txBody>
+                    <a:bodyPr/>
+                    <a:lstStyle/>
+                    <a:p>
+                      <a:pPr algn="l" fontAlgn="t"/>
+                      <a:r>
+                        <a:rPr lang="en-US" sz="1200">
+                          <a:effectLst/>
+                        </a:rPr>
+                        <a:t>The seconds field, including fractional parts, multiplied by 1000000</a:t>
+                      </a:r>
+                    </a:p>
+                  </a:txBody>
+                  <a:tcPr marL="17433" marR="17433" marT="8716" marB="8716"/>
+                </a:tc>
+                <a:tc>
+                  <a:txBody>
+                    <a:bodyPr/>
+                    <a:lstStyle/>
+                    <a:p>
+                      <a:pPr algn="l" fontAlgn="t"/>
+                      <a:r>
+                        <a:rPr lang="en-US" sz="1200">
+                          <a:effectLst/>
+                        </a:rPr>
+                        <a:t>Sames as TIMESTAMP</a:t>
+                      </a:r>
+                    </a:p>
+                  </a:txBody>
+                  <a:tcPr marL="17433" marR="17433" marT="8716" marB="8716"/>
+                </a:tc>
+                <a:extLst>
+                  <a:ext uri="{0D108BD9-81ED-4DB2-BD59-A6C34878D82A}">
+                    <a16:rowId xmlns:a16="http://schemas.microsoft.com/office/drawing/2014/main" val="1174617542"/>
+                  </a:ext>
+                </a:extLst>
+              </a:tr>
+              <a:tr h="233966">
+                <a:tc>
+                  <a:txBody>
+                    <a:bodyPr/>
+                    <a:lstStyle/>
+                    <a:p>
+                      <a:pPr algn="l" fontAlgn="t"/>
+                      <a:r>
+                        <a:rPr lang="en-US" sz="1200">
+                          <a:effectLst/>
+                        </a:rPr>
+                        <a:t>MILLENNIUM</a:t>
+                      </a:r>
+                    </a:p>
+                  </a:txBody>
+                  <a:tcPr marL="17433" marR="17433" marT="8716" marB="8716"/>
+                </a:tc>
+                <a:tc>
+                  <a:txBody>
+                    <a:bodyPr/>
+                    <a:lstStyle/>
+                    <a:p>
+                      <a:pPr algn="l" fontAlgn="t"/>
+                      <a:r>
+                        <a:rPr lang="en-US" sz="1200">
+                          <a:effectLst/>
+                        </a:rPr>
+                        <a:t>The millennium</a:t>
+                      </a:r>
+                    </a:p>
+                  </a:txBody>
+                  <a:tcPr marL="17433" marR="17433" marT="8716" marB="8716"/>
+                </a:tc>
+                <a:tc>
+                  <a:txBody>
+                    <a:bodyPr/>
+                    <a:lstStyle/>
+                    <a:p>
+                      <a:pPr algn="l" fontAlgn="t"/>
+                      <a:r>
+                        <a:rPr lang="en-US" sz="1200">
+                          <a:effectLst/>
+                        </a:rPr>
+                        <a:t>The number of millennium</a:t>
+                      </a:r>
+                    </a:p>
+                  </a:txBody>
+                  <a:tcPr marL="17433" marR="17433" marT="8716" marB="8716"/>
+                </a:tc>
+                <a:extLst>
+                  <a:ext uri="{0D108BD9-81ED-4DB2-BD59-A6C34878D82A}">
+                    <a16:rowId xmlns:a16="http://schemas.microsoft.com/office/drawing/2014/main" val="1222177372"/>
+                  </a:ext>
+                </a:extLst>
+              </a:tr>
+              <a:tr h="233966">
+                <a:tc>
+                  <a:txBody>
+                    <a:bodyPr/>
+                    <a:lstStyle/>
+                    <a:p>
+                      <a:pPr algn="l" fontAlgn="t"/>
+                      <a:r>
+                        <a:rPr lang="en-US" sz="1200">
+                          <a:effectLst/>
+                        </a:rPr>
+                        <a:t>MILLISECONDS</a:t>
+                      </a:r>
+                    </a:p>
+                  </a:txBody>
+                  <a:tcPr marL="17433" marR="17433" marT="8716" marB="8716"/>
+                </a:tc>
+                <a:tc>
+                  <a:txBody>
+                    <a:bodyPr/>
+                    <a:lstStyle/>
+                    <a:p>
+                      <a:pPr algn="l" fontAlgn="t"/>
+                      <a:r>
+                        <a:rPr lang="en-US" sz="1200">
+                          <a:effectLst/>
+                        </a:rPr>
+                        <a:t>The seconds field, including fractional parts, multiplied by 1000</a:t>
+                      </a:r>
+                    </a:p>
+                  </a:txBody>
+                  <a:tcPr marL="17433" marR="17433" marT="8716" marB="8716"/>
+                </a:tc>
+                <a:tc>
+                  <a:txBody>
+                    <a:bodyPr/>
+                    <a:lstStyle/>
+                    <a:p>
+                      <a:pPr algn="l" fontAlgn="t"/>
+                      <a:r>
+                        <a:rPr lang="en-US" sz="1200">
+                          <a:effectLst/>
+                        </a:rPr>
+                        <a:t>Sames as TIMESTAMP</a:t>
+                      </a:r>
+                    </a:p>
+                  </a:txBody>
+                  <a:tcPr marL="17433" marR="17433" marT="8716" marB="8716"/>
+                </a:tc>
+                <a:extLst>
+                  <a:ext uri="{0D108BD9-81ED-4DB2-BD59-A6C34878D82A}">
+                    <a16:rowId xmlns:a16="http://schemas.microsoft.com/office/drawing/2014/main" val="1653473352"/>
+                  </a:ext>
+                </a:extLst>
+              </a:tr>
+              <a:tr h="233966">
+                <a:tc>
+                  <a:txBody>
+                    <a:bodyPr/>
+                    <a:lstStyle/>
+                    <a:p>
+                      <a:pPr algn="l" fontAlgn="t"/>
+                      <a:r>
+                        <a:rPr lang="en-US" sz="1200">
+                          <a:effectLst/>
+                        </a:rPr>
+                        <a:t>MINUTE</a:t>
+                      </a:r>
+                    </a:p>
+                  </a:txBody>
+                  <a:tcPr marL="17433" marR="17433" marT="8716" marB="8716"/>
+                </a:tc>
+                <a:tc>
+                  <a:txBody>
+                    <a:bodyPr/>
+                    <a:lstStyle/>
+                    <a:p>
+                      <a:pPr algn="l" fontAlgn="t"/>
+                      <a:r>
+                        <a:rPr lang="en-US" sz="1200">
+                          <a:effectLst/>
+                        </a:rPr>
+                        <a:t>The minute (0-59)</a:t>
+                      </a:r>
+                    </a:p>
+                  </a:txBody>
+                  <a:tcPr marL="17433" marR="17433" marT="8716" marB="8716"/>
+                </a:tc>
+                <a:tc>
+                  <a:txBody>
+                    <a:bodyPr/>
+                    <a:lstStyle/>
+                    <a:p>
+                      <a:pPr algn="l" fontAlgn="t"/>
+                      <a:r>
+                        <a:rPr lang="en-US" sz="1200">
+                          <a:effectLst/>
+                        </a:rPr>
+                        <a:t>The number of minutes</a:t>
+                      </a:r>
+                    </a:p>
+                  </a:txBody>
+                  <a:tcPr marL="17433" marR="17433" marT="8716" marB="8716"/>
+                </a:tc>
+                <a:extLst>
+                  <a:ext uri="{0D108BD9-81ED-4DB2-BD59-A6C34878D82A}">
+                    <a16:rowId xmlns:a16="http://schemas.microsoft.com/office/drawing/2014/main" val="1657483012"/>
+                  </a:ext>
+                </a:extLst>
+              </a:tr>
+              <a:tr h="233966">
+                <a:tc>
+                  <a:txBody>
+                    <a:bodyPr/>
+                    <a:lstStyle/>
+                    <a:p>
+                      <a:pPr algn="l" fontAlgn="t"/>
+                      <a:r>
+                        <a:rPr lang="en-US" sz="1200">
+                          <a:effectLst/>
+                        </a:rPr>
+                        <a:t>MONTH</a:t>
+                      </a:r>
+                    </a:p>
+                  </a:txBody>
+                  <a:tcPr marL="17433" marR="17433" marT="8716" marB="8716"/>
+                </a:tc>
+                <a:tc>
+                  <a:txBody>
+                    <a:bodyPr/>
+                    <a:lstStyle/>
+                    <a:p>
+                      <a:pPr algn="l" fontAlgn="t"/>
+                      <a:r>
+                        <a:rPr lang="en-US" sz="1200" dirty="0">
+                          <a:effectLst/>
+                        </a:rPr>
+                        <a:t>Month, 1-12</a:t>
+                      </a:r>
+                    </a:p>
+                  </a:txBody>
+                  <a:tcPr marL="17433" marR="17433" marT="8716" marB="8716"/>
+                </a:tc>
+                <a:tc>
+                  <a:txBody>
+                    <a:bodyPr/>
+                    <a:lstStyle/>
+                    <a:p>
+                      <a:pPr algn="l" fontAlgn="t"/>
+                      <a:r>
+                        <a:rPr lang="en-US" sz="1200">
+                          <a:effectLst/>
+                        </a:rPr>
+                        <a:t>The number of months, modulo (0-11)</a:t>
+                      </a:r>
+                    </a:p>
+                  </a:txBody>
+                  <a:tcPr marL="17433" marR="17433" marT="8716" marB="8716"/>
+                </a:tc>
+                <a:extLst>
+                  <a:ext uri="{0D108BD9-81ED-4DB2-BD59-A6C34878D82A}">
+                    <a16:rowId xmlns:a16="http://schemas.microsoft.com/office/drawing/2014/main" val="2439863366"/>
+                  </a:ext>
+                </a:extLst>
+              </a:tr>
+              <a:tr h="233966">
+                <a:tc>
+                  <a:txBody>
+                    <a:bodyPr/>
+                    <a:lstStyle/>
+                    <a:p>
+                      <a:pPr algn="l" fontAlgn="t"/>
+                      <a:r>
+                        <a:rPr lang="en-US" sz="1200">
+                          <a:effectLst/>
+                        </a:rPr>
+                        <a:t>QUARTER</a:t>
+                      </a:r>
+                    </a:p>
+                  </a:txBody>
+                  <a:tcPr marL="17433" marR="17433" marT="8716" marB="8716"/>
+                </a:tc>
+                <a:tc>
+                  <a:txBody>
+                    <a:bodyPr/>
+                    <a:lstStyle/>
+                    <a:p>
+                      <a:pPr algn="l" fontAlgn="t"/>
+                      <a:r>
+                        <a:rPr lang="en-US" sz="1200">
+                          <a:effectLst/>
+                        </a:rPr>
+                        <a:t>Quarter of the year</a:t>
+                      </a:r>
+                    </a:p>
+                  </a:txBody>
+                  <a:tcPr marL="17433" marR="17433" marT="8716" marB="8716"/>
+                </a:tc>
+                <a:tc>
+                  <a:txBody>
+                    <a:bodyPr/>
+                    <a:lstStyle/>
+                    <a:p>
+                      <a:pPr algn="l" fontAlgn="t"/>
+                      <a:r>
+                        <a:rPr lang="en-US" sz="1200" dirty="0">
+                          <a:effectLst/>
+                        </a:rPr>
+                        <a:t>The number of quarters</a:t>
+                      </a:r>
+                    </a:p>
+                  </a:txBody>
+                  <a:tcPr marL="17433" marR="17433" marT="8716" marB="8716"/>
+                </a:tc>
+                <a:extLst>
+                  <a:ext uri="{0D108BD9-81ED-4DB2-BD59-A6C34878D82A}">
+                    <a16:rowId xmlns:a16="http://schemas.microsoft.com/office/drawing/2014/main" val="1454754825"/>
+                  </a:ext>
+                </a:extLst>
+              </a:tr>
+              <a:tr h="233966">
+                <a:tc>
+                  <a:txBody>
+                    <a:bodyPr/>
+                    <a:lstStyle/>
+                    <a:p>
+                      <a:pPr algn="l" fontAlgn="t"/>
+                      <a:r>
+                        <a:rPr lang="en-US" sz="1200">
+                          <a:effectLst/>
+                        </a:rPr>
+                        <a:t>SECOND</a:t>
+                      </a:r>
+                    </a:p>
+                  </a:txBody>
+                  <a:tcPr marL="17433" marR="17433" marT="8716" marB="8716"/>
+                </a:tc>
+                <a:tc>
+                  <a:txBody>
+                    <a:bodyPr/>
+                    <a:lstStyle/>
+                    <a:p>
+                      <a:pPr algn="l" fontAlgn="t"/>
+                      <a:r>
+                        <a:rPr lang="en-US" sz="1200">
+                          <a:effectLst/>
+                        </a:rPr>
+                        <a:t>The second</a:t>
+                      </a:r>
+                    </a:p>
+                  </a:txBody>
+                  <a:tcPr marL="17433" marR="17433" marT="8716" marB="8716"/>
+                </a:tc>
+                <a:tc>
+                  <a:txBody>
+                    <a:bodyPr/>
+                    <a:lstStyle/>
+                    <a:p>
+                      <a:pPr algn="l" fontAlgn="t"/>
+                      <a:r>
+                        <a:rPr lang="en-US" sz="1200" dirty="0">
+                          <a:effectLst/>
+                        </a:rPr>
+                        <a:t>The number of seconds in given minute</a:t>
+                      </a:r>
+                    </a:p>
+                  </a:txBody>
+                  <a:tcPr marL="17433" marR="17433" marT="8716" marB="8716"/>
+                </a:tc>
+                <a:extLst>
+                  <a:ext uri="{0D108BD9-81ED-4DB2-BD59-A6C34878D82A}">
+                    <a16:rowId xmlns:a16="http://schemas.microsoft.com/office/drawing/2014/main" val="1021393123"/>
+                  </a:ext>
+                </a:extLst>
+              </a:tr>
+              <a:tr h="233966">
+                <a:tc>
+                  <a:txBody>
+                    <a:bodyPr/>
+                    <a:lstStyle/>
+                    <a:p>
+                      <a:pPr algn="l" fontAlgn="t"/>
+                      <a:r>
+                        <a:rPr lang="en-US" sz="1200">
+                          <a:effectLst/>
+                        </a:rPr>
+                        <a:t>TIMEZONE</a:t>
+                      </a:r>
+                    </a:p>
+                  </a:txBody>
+                  <a:tcPr marL="17433" marR="17433" marT="8716" marB="8716"/>
+                </a:tc>
+                <a:tc>
+                  <a:txBody>
+                    <a:bodyPr/>
+                    <a:lstStyle/>
+                    <a:p>
+                      <a:pPr algn="l" fontAlgn="t"/>
+                      <a:r>
+                        <a:rPr lang="en-US" sz="1200" dirty="0">
+                          <a:effectLst/>
+                        </a:rPr>
+                        <a:t>The </a:t>
+                      </a:r>
+                      <a:r>
+                        <a:rPr lang="en-US" sz="1200" dirty="0" err="1">
+                          <a:effectLst/>
+                        </a:rPr>
+                        <a:t>timezone</a:t>
+                      </a:r>
+                      <a:r>
+                        <a:rPr lang="en-US" sz="1200" dirty="0">
+                          <a:effectLst/>
+                        </a:rPr>
+                        <a:t> offset from UTC, measured in seconds</a:t>
+                      </a:r>
+                    </a:p>
+                  </a:txBody>
+                  <a:tcPr marL="17433" marR="17433" marT="8716" marB="8716"/>
+                </a:tc>
+                <a:tc>
+                  <a:txBody>
+                    <a:bodyPr/>
+                    <a:lstStyle/>
+                    <a:p>
+                      <a:pPr algn="l" fontAlgn="t"/>
+                      <a:r>
+                        <a:rPr lang="en-US" sz="1200">
+                          <a:effectLst/>
+                        </a:rPr>
+                        <a:t>N/A</a:t>
+                      </a:r>
+                    </a:p>
+                  </a:txBody>
+                  <a:tcPr marL="17433" marR="17433" marT="8716" marB="8716"/>
+                </a:tc>
+                <a:extLst>
+                  <a:ext uri="{0D108BD9-81ED-4DB2-BD59-A6C34878D82A}">
+                    <a16:rowId xmlns:a16="http://schemas.microsoft.com/office/drawing/2014/main" val="2292192588"/>
+                  </a:ext>
+                </a:extLst>
+              </a:tr>
+              <a:tr h="233966">
+                <a:tc>
+                  <a:txBody>
+                    <a:bodyPr/>
+                    <a:lstStyle/>
+                    <a:p>
+                      <a:pPr algn="l" fontAlgn="t"/>
+                      <a:r>
+                        <a:rPr lang="en-US" sz="1200">
+                          <a:effectLst/>
+                        </a:rPr>
+                        <a:t>TIMEZONE_HOUR</a:t>
+                      </a:r>
+                    </a:p>
+                  </a:txBody>
+                  <a:tcPr marL="17433" marR="17433" marT="8716" marB="8716"/>
+                </a:tc>
+                <a:tc>
+                  <a:txBody>
+                    <a:bodyPr/>
+                    <a:lstStyle/>
+                    <a:p>
+                      <a:pPr algn="l" fontAlgn="t"/>
+                      <a:r>
+                        <a:rPr lang="en-US" sz="1200">
+                          <a:effectLst/>
+                        </a:rPr>
+                        <a:t>The hour component of the time zone offset</a:t>
+                      </a:r>
+                    </a:p>
+                  </a:txBody>
+                  <a:tcPr marL="17433" marR="17433" marT="8716" marB="8716"/>
+                </a:tc>
+                <a:tc>
+                  <a:txBody>
+                    <a:bodyPr/>
+                    <a:lstStyle/>
+                    <a:p>
+                      <a:pPr algn="l" fontAlgn="t"/>
+                      <a:r>
+                        <a:rPr lang="en-US" sz="1200">
+                          <a:effectLst/>
+                        </a:rPr>
+                        <a:t>N/A</a:t>
+                      </a:r>
+                    </a:p>
+                  </a:txBody>
+                  <a:tcPr marL="17433" marR="17433" marT="8716" marB="8716"/>
+                </a:tc>
+                <a:extLst>
+                  <a:ext uri="{0D108BD9-81ED-4DB2-BD59-A6C34878D82A}">
+                    <a16:rowId xmlns:a16="http://schemas.microsoft.com/office/drawing/2014/main" val="465983057"/>
+                  </a:ext>
+                </a:extLst>
+              </a:tr>
+              <a:tr h="233966">
+                <a:tc>
+                  <a:txBody>
+                    <a:bodyPr/>
+                    <a:lstStyle/>
+                    <a:p>
+                      <a:pPr algn="l" fontAlgn="t"/>
+                      <a:r>
+                        <a:rPr lang="en-US" sz="1200">
+                          <a:effectLst/>
+                        </a:rPr>
+                        <a:t>TIMEZONE_MINUTE</a:t>
+                      </a:r>
+                    </a:p>
+                  </a:txBody>
+                  <a:tcPr marL="17433" marR="17433" marT="8716" marB="8716"/>
+                </a:tc>
+                <a:tc>
+                  <a:txBody>
+                    <a:bodyPr/>
+                    <a:lstStyle/>
+                    <a:p>
+                      <a:pPr algn="l" fontAlgn="t"/>
+                      <a:r>
+                        <a:rPr lang="en-US" sz="1200">
+                          <a:effectLst/>
+                        </a:rPr>
+                        <a:t>The minute component of the time zone offset</a:t>
+                      </a:r>
+                    </a:p>
+                  </a:txBody>
+                  <a:tcPr marL="17433" marR="17433" marT="8716" marB="8716"/>
+                </a:tc>
+                <a:tc>
+                  <a:txBody>
+                    <a:bodyPr/>
+                    <a:lstStyle/>
+                    <a:p>
+                      <a:pPr algn="l" fontAlgn="t"/>
+                      <a:r>
+                        <a:rPr lang="en-US" sz="1200">
+                          <a:effectLst/>
+                        </a:rPr>
+                        <a:t>N/A</a:t>
+                      </a:r>
+                    </a:p>
+                  </a:txBody>
+                  <a:tcPr marL="17433" marR="17433" marT="8716" marB="8716"/>
+                </a:tc>
+                <a:extLst>
+                  <a:ext uri="{0D108BD9-81ED-4DB2-BD59-A6C34878D82A}">
+                    <a16:rowId xmlns:a16="http://schemas.microsoft.com/office/drawing/2014/main" val="3284147774"/>
+                  </a:ext>
+                </a:extLst>
+              </a:tr>
+              <a:tr h="233966">
+                <a:tc>
+                  <a:txBody>
+                    <a:bodyPr/>
+                    <a:lstStyle/>
+                    <a:p>
+                      <a:pPr algn="l" fontAlgn="t"/>
+                      <a:r>
+                        <a:rPr lang="en-US" sz="1200">
+                          <a:effectLst/>
+                        </a:rPr>
+                        <a:t>WEEK</a:t>
+                      </a:r>
+                    </a:p>
+                  </a:txBody>
+                  <a:tcPr marL="17433" marR="17433" marT="8716" marB="8716"/>
+                </a:tc>
+                <a:tc>
+                  <a:txBody>
+                    <a:bodyPr/>
+                    <a:lstStyle/>
+                    <a:p>
+                      <a:pPr algn="l" fontAlgn="t"/>
+                      <a:r>
+                        <a:rPr lang="en-US" sz="1200">
+                          <a:effectLst/>
+                        </a:rPr>
+                        <a:t>The number of the ISO 8601 week-numbering week of the year</a:t>
+                      </a:r>
+                    </a:p>
+                  </a:txBody>
+                  <a:tcPr marL="17433" marR="17433" marT="8716" marB="8716"/>
+                </a:tc>
+                <a:tc>
+                  <a:txBody>
+                    <a:bodyPr/>
+                    <a:lstStyle/>
+                    <a:p>
+                      <a:pPr algn="l" fontAlgn="t"/>
+                      <a:r>
+                        <a:rPr lang="en-US" sz="1200">
+                          <a:effectLst/>
+                        </a:rPr>
+                        <a:t>N/A</a:t>
+                      </a:r>
+                    </a:p>
+                  </a:txBody>
+                  <a:tcPr marL="17433" marR="17433" marT="8716" marB="8716"/>
+                </a:tc>
+                <a:extLst>
+                  <a:ext uri="{0D108BD9-81ED-4DB2-BD59-A6C34878D82A}">
+                    <a16:rowId xmlns:a16="http://schemas.microsoft.com/office/drawing/2014/main" val="2026681727"/>
+                  </a:ext>
+                </a:extLst>
+              </a:tr>
+              <a:tr h="233966">
+                <a:tc>
+                  <a:txBody>
+                    <a:bodyPr/>
+                    <a:lstStyle/>
+                    <a:p>
+                      <a:pPr algn="l" fontAlgn="t"/>
+                      <a:r>
+                        <a:rPr lang="en-US" sz="1200">
+                          <a:effectLst/>
+                        </a:rPr>
+                        <a:t>YEAR</a:t>
+                      </a:r>
+                    </a:p>
+                  </a:txBody>
+                  <a:tcPr marL="17433" marR="17433" marT="8716" marB="8716"/>
+                </a:tc>
+                <a:tc>
+                  <a:txBody>
+                    <a:bodyPr/>
+                    <a:lstStyle/>
+                    <a:p>
+                      <a:pPr algn="l" fontAlgn="t"/>
+                      <a:r>
+                        <a:rPr lang="en-US" sz="1200">
+                          <a:effectLst/>
+                        </a:rPr>
+                        <a:t>The year</a:t>
+                      </a:r>
+                    </a:p>
+                  </a:txBody>
+                  <a:tcPr marL="17433" marR="17433" marT="8716" marB="8716"/>
+                </a:tc>
+                <a:tc>
+                  <a:txBody>
+                    <a:bodyPr/>
+                    <a:lstStyle/>
+                    <a:p>
+                      <a:pPr algn="l" fontAlgn="t"/>
+                      <a:r>
+                        <a:rPr lang="en-US" sz="1200" dirty="0">
+                          <a:effectLst/>
+                        </a:rPr>
+                        <a:t>Same as TIMESTAMP</a:t>
+                      </a:r>
+                    </a:p>
+                  </a:txBody>
+                  <a:tcPr marL="17433" marR="17433" marT="8716" marB="8716"/>
+                </a:tc>
+                <a:extLst>
+                  <a:ext uri="{0D108BD9-81ED-4DB2-BD59-A6C34878D82A}">
+                    <a16:rowId xmlns:a16="http://schemas.microsoft.com/office/drawing/2014/main" val="3022873429"/>
+                  </a:ext>
+                </a:extLst>
+              </a:tr>
+            </a:tbl>
+          </a:graphicData>
+        </a:graphic>
+      </p:graphicFrame>
+      <p:sp>
+        <p:nvSpPr>
+          <p:cNvPr id="5" name="TextBox 4">
+            <a:extLst>
+              <a:ext uri="{FF2B5EF4-FFF2-40B4-BE49-F238E27FC236}">
+                <a16:creationId xmlns:a16="http://schemas.microsoft.com/office/drawing/2014/main" id="{7B77241C-BB41-40F3-8E6E-3F02CED0F180}"/>
+              </a:ext>
+            </a:extLst>
+          </p:cNvPr>
+          <p:cNvSpPr txBox="1"/>
+          <p:nvPr/>
+        </p:nvSpPr>
+        <p:spPr>
+          <a:xfrm>
+            <a:off x="643466" y="6187440"/>
+            <a:ext cx="7725192" cy="553998"/>
+          </a:xfrm>
+          <a:prstGeom prst="rect">
+            <a:avLst/>
+          </a:prstGeom>
+          <a:noFill/>
+        </p:spPr>
+        <p:txBody>
+          <a:bodyPr wrap="none" rtlCol="0">
+            <a:spAutoFit/>
+          </a:bodyPr>
+          <a:lstStyle/>
+          <a:p>
+            <a:r>
+              <a:rPr lang="en-US" sz="1000" dirty="0"/>
+              <a:t>ISOYEAR* -&gt; An </a:t>
+            </a:r>
+            <a:r>
+              <a:rPr lang="en-US" sz="1000" b="1" dirty="0"/>
+              <a:t>ISO</a:t>
+            </a:r>
+            <a:r>
+              <a:rPr lang="en-US" sz="1000" dirty="0"/>
+              <a:t> week-numbering </a:t>
+            </a:r>
+            <a:r>
+              <a:rPr lang="en-US" sz="1000" b="1" dirty="0"/>
+              <a:t>year</a:t>
+            </a:r>
+            <a:r>
+              <a:rPr lang="en-US" sz="1000" dirty="0"/>
+              <a:t> (also called </a:t>
+            </a:r>
+            <a:r>
+              <a:rPr lang="en-US" sz="1000" b="1" dirty="0"/>
+              <a:t>ISO year</a:t>
+            </a:r>
+            <a:r>
+              <a:rPr lang="en-US" sz="1000" dirty="0"/>
+              <a:t> informally) has 52 or 53 full weeks. </a:t>
+            </a:r>
+          </a:p>
+          <a:p>
+            <a:r>
+              <a:rPr lang="en-US" sz="1000" dirty="0"/>
+              <a:t>That is 364 or 371 days instead of the usual 365 or 366 days.</a:t>
+            </a:r>
+          </a:p>
+          <a:p>
+            <a:r>
+              <a:rPr lang="en-US" sz="1000" dirty="0"/>
+              <a:t>The extra week is sometimes referred to as a leap week, although </a:t>
+            </a:r>
+            <a:r>
+              <a:rPr lang="en-US" sz="1000" b="1" dirty="0"/>
+              <a:t>ISO</a:t>
+            </a:r>
+            <a:r>
+              <a:rPr lang="en-US" sz="1000" dirty="0"/>
+              <a:t> 8601 does not use this term</a:t>
+            </a:r>
+          </a:p>
+        </p:txBody>
+      </p:sp>
+    </p:spTree>
+    <p:extLst>
+      <p:ext uri="{BB962C8B-B14F-4D97-AF65-F5344CB8AC3E}">
+        <p14:creationId xmlns:p14="http://schemas.microsoft.com/office/powerpoint/2010/main" val="1749982271"/>
+      </p:ext>
+    </p:extLst>
+  </p:cSld>
+  <p:clrMapOvr>
+    <a:masterClrMapping/>
+  </p:clrMapOvr>
+</p:sld>
+</file>
+
+<file path=ppt/slides/slide34.xml><?xml version="1.0" encoding="utf-8"?>
+<p:sld xmlns:a="http://schemas.openxmlformats.org/drawingml/2006/main" xmlns:r="http://schemas.openxmlformats.org/officeDocument/2006/relationships" xmlns:p="http://schemas.openxmlformats.org/presentationml/2006/main">
+  <p:cSld>
+    <p:spTree>
+      <p:nvGrpSpPr>
+        <p:cNvPr id="1" name=""/>
+        <p:cNvGrpSpPr/>
+        <p:nvPr/>
+      </p:nvGrpSpPr>
+      <p:grpSpPr>
+        <a:xfrm>
+          <a:off x="0" y="0"/>
+          <a:ext cx="0" cy="0"/>
+          <a:chOff x="0" y="0"/>
+          <a:chExt cx="0" cy="0"/>
+        </a:xfrm>
+      </p:grpSpPr>
+      <p:sp>
+        <p:nvSpPr>
+          <p:cNvPr id="2" name="Title 1">
+            <a:extLst>
+              <a:ext uri="{FF2B5EF4-FFF2-40B4-BE49-F238E27FC236}">
+                <a16:creationId xmlns:a16="http://schemas.microsoft.com/office/drawing/2014/main" id="{28677F6D-93C0-4A95-A536-490459BE7015}"/>
+              </a:ext>
+            </a:extLst>
+          </p:cNvPr>
+          <p:cNvSpPr>
+            <a:spLocks noGrp="1"/>
+          </p:cNvSpPr>
+          <p:nvPr>
+            <p:ph type="title"/>
+          </p:nvPr>
+        </p:nvSpPr>
+        <p:spPr/>
+        <p:txBody>
+          <a:bodyPr/>
+          <a:lstStyle/>
+          <a:p>
+            <a:endParaRPr lang="en-US"/>
+          </a:p>
+        </p:txBody>
+      </p:sp>
+      <p:sp>
+        <p:nvSpPr>
+          <p:cNvPr id="3" name="Content Placeholder 2">
+            <a:extLst>
+              <a:ext uri="{FF2B5EF4-FFF2-40B4-BE49-F238E27FC236}">
+                <a16:creationId xmlns:a16="http://schemas.microsoft.com/office/drawing/2014/main" id="{478D1D10-3276-4D4B-86F4-5FA0716F4C33}"/>
+              </a:ext>
+            </a:extLst>
+          </p:cNvPr>
+          <p:cNvSpPr>
+            <a:spLocks noGrp="1"/>
+          </p:cNvSpPr>
+          <p:nvPr>
+            <p:ph idx="1"/>
+          </p:nvPr>
+        </p:nvSpPr>
+        <p:spPr/>
+        <p:txBody>
+          <a:bodyPr/>
+          <a:lstStyle/>
+          <a:p>
+            <a:pPr marL="0" indent="0">
+              <a:buNone/>
+            </a:pPr>
+            <a:endParaRPr lang="en-US" dirty="0"/>
+          </a:p>
+        </p:txBody>
+      </p:sp>
+    </p:spTree>
+    <p:extLst>
+      <p:ext uri="{BB962C8B-B14F-4D97-AF65-F5344CB8AC3E}">
+        <p14:creationId xmlns:p14="http://schemas.microsoft.com/office/powerpoint/2010/main" val="1641250896"/>
       </p:ext>
     </p:extLst>
   </p:cSld>

</xml_diff>

<commit_message>
The mk2 represents the presentation I would go to class with if I had to teach today
</commit_message>
<xml_diff>
--- a/times_and_dates.pptx
+++ b/times_and_dates.pptx
@@ -39,24 +39,22 @@
     <p:sldId id="259" r:id="rId33"/>
     <p:sldId id="280" r:id="rId34"/>
     <p:sldId id="288" r:id="rId35"/>
-    <p:sldId id="322" r:id="rId36"/>
-    <p:sldId id="290" r:id="rId37"/>
-    <p:sldId id="283" r:id="rId38"/>
-    <p:sldId id="284" r:id="rId39"/>
-    <p:sldId id="316" r:id="rId40"/>
-    <p:sldId id="317" r:id="rId41"/>
-    <p:sldId id="318" r:id="rId42"/>
-    <p:sldId id="319" r:id="rId43"/>
-    <p:sldId id="320" r:id="rId44"/>
-    <p:sldId id="321" r:id="rId45"/>
+    <p:sldId id="323" r:id="rId36"/>
+    <p:sldId id="324" r:id="rId37"/>
+    <p:sldId id="322" r:id="rId38"/>
+    <p:sldId id="290" r:id="rId39"/>
+    <p:sldId id="283" r:id="rId40"/>
+    <p:sldId id="284" r:id="rId41"/>
+    <p:sldId id="316" r:id="rId42"/>
+    <p:sldId id="318" r:id="rId43"/>
+    <p:sldId id="319" r:id="rId44"/>
+    <p:sldId id="320" r:id="rId45"/>
     <p:sldId id="276" r:id="rId46"/>
-    <p:sldId id="260" r:id="rId47"/>
-    <p:sldId id="261" r:id="rId48"/>
-    <p:sldId id="292" r:id="rId49"/>
-    <p:sldId id="293" r:id="rId50"/>
-    <p:sldId id="294" r:id="rId51"/>
-    <p:sldId id="296" r:id="rId52"/>
-    <p:sldId id="286" r:id="rId53"/>
+    <p:sldId id="292" r:id="rId47"/>
+    <p:sldId id="293" r:id="rId48"/>
+    <p:sldId id="294" r:id="rId49"/>
+    <p:sldId id="296" r:id="rId50"/>
+    <p:sldId id="286" r:id="rId51"/>
   </p:sldIdLst>
   <p:sldSz cx="12192000" cy="6858000"/>
   <p:notesSz cx="6858000" cy="9144000"/>
@@ -7694,9 +7692,7 @@
             <a:off x="841249" y="365760"/>
             <a:ext cx="9912072" cy="1188404"/>
           </a:xfrm>
-          <a:solidFill>
-            <a:schemeClr val="accent6"/>
-          </a:solidFill>
+          <a:noFill/>
         </p:spPr>
         <p:txBody>
           <a:bodyPr>
@@ -10043,7 +10039,14 @@
             <p:ph type="title"/>
           </p:nvPr>
         </p:nvSpPr>
-        <p:spPr/>
+        <p:spPr>
+          <a:solidFill>
+            <a:schemeClr val="accent6">
+              <a:lumMod val="60000"/>
+              <a:lumOff val="40000"/>
+            </a:schemeClr>
+          </a:solidFill>
+        </p:spPr>
         <p:txBody>
           <a:bodyPr/>
           <a:lstStyle/>
@@ -12328,7 +12331,14 @@
             <p:ph type="title"/>
           </p:nvPr>
         </p:nvSpPr>
-        <p:spPr/>
+        <p:spPr>
+          <a:solidFill>
+            <a:schemeClr val="accent6">
+              <a:lumMod val="60000"/>
+              <a:lumOff val="40000"/>
+            </a:schemeClr>
+          </a:solidFill>
+        </p:spPr>
         <p:txBody>
           <a:bodyPr/>
           <a:lstStyle/>
@@ -12419,7 +12429,7 @@
         </p:nvSpPr>
         <p:spPr>
           <a:solidFill>
-            <a:schemeClr val="accent2">
+            <a:schemeClr val="accent6">
               <a:lumMod val="60000"/>
               <a:lumOff val="40000"/>
             </a:schemeClr>
@@ -12487,6 +12497,397 @@
 </file>
 
 <file path=ppt/slides/slide35.xml><?xml version="1.0" encoding="utf-8"?>
+<p:sld xmlns:a="http://schemas.openxmlformats.org/drawingml/2006/main" xmlns:r="http://schemas.openxmlformats.org/officeDocument/2006/relationships" xmlns:p="http://schemas.openxmlformats.org/presentationml/2006/main">
+  <p:cSld>
+    <p:bg>
+      <p:bgPr>
+        <a:solidFill>
+          <a:schemeClr val="bg1"/>
+        </a:solidFill>
+        <a:effectLst/>
+      </p:bgPr>
+    </p:bg>
+    <p:spTree>
+      <p:nvGrpSpPr>
+        <p:cNvPr id="1" name=""/>
+        <p:cNvGrpSpPr/>
+        <p:nvPr/>
+      </p:nvGrpSpPr>
+      <p:grpSpPr>
+        <a:xfrm>
+          <a:off x="0" y="0"/>
+          <a:ext cx="0" cy="0"/>
+          <a:chOff x="0" y="0"/>
+          <a:chExt cx="0" cy="0"/>
+        </a:xfrm>
+      </p:grpSpPr>
+      <p:sp>
+        <p:nvSpPr>
+          <p:cNvPr id="8" name="Rectangle 7">
+            <a:extLst>
+              <a:ext uri="{FF2B5EF4-FFF2-40B4-BE49-F238E27FC236}">
+                <a16:creationId xmlns:a16="http://schemas.microsoft.com/office/drawing/2014/main" id="{179F7551-E956-43CB-8F36-268A5DA443BE}"/>
+              </a:ext>
+              <a:ext uri="{C183D7F6-B498-43B3-948B-1728B52AA6E4}">
+                <adec:decorative xmlns:adec="http://schemas.microsoft.com/office/drawing/2017/decorative" val="1"/>
+              </a:ext>
+            </a:extLst>
+          </p:cNvPr>
+          <p:cNvSpPr>
+            <a:spLocks noGrp="1" noRot="1" noChangeAspect="1" noMove="1" noResize="1" noEditPoints="1" noAdjustHandles="1" noChangeArrowheads="1" noChangeShapeType="1" noTextEdit="1"/>
+          </p:cNvSpPr>
+          <p:nvPr>
+            <p:extLst>
+              <p:ext uri="{386F3935-93C4-4BCD-93E2-E3B085C9AB24}">
+                <p16:designElem xmlns:p16="http://schemas.microsoft.com/office/powerpoint/2015/main" val="1"/>
+              </p:ext>
+            </p:extLst>
+          </p:nvPr>
+        </p:nvSpPr>
+        <p:spPr>
+          <a:xfrm>
+            <a:off x="1524" y="0"/>
+            <a:ext cx="12188952" cy="6858000"/>
+          </a:xfrm>
+          <a:prstGeom prst="rect">
+            <a:avLst/>
+          </a:prstGeom>
+          <a:solidFill>
+            <a:schemeClr val="tx1"/>
+          </a:solidFill>
+          <a:ln>
+            <a:noFill/>
+          </a:ln>
+        </p:spPr>
+        <p:style>
+          <a:lnRef idx="2">
+            <a:schemeClr val="accent1">
+              <a:shade val="50000"/>
+            </a:schemeClr>
+          </a:lnRef>
+          <a:fillRef idx="1">
+            <a:schemeClr val="accent1"/>
+          </a:fillRef>
+          <a:effectRef idx="0">
+            <a:schemeClr val="accent1"/>
+          </a:effectRef>
+          <a:fontRef idx="minor">
+            <a:schemeClr val="lt1"/>
+          </a:fontRef>
+        </p:style>
+        <p:txBody>
+          <a:bodyPr rtlCol="0" anchor="ctr"/>
+          <a:lstStyle/>
+          <a:p>
+            <a:pPr marL="0" marR="0" lvl="0" indent="0" algn="ctr" defTabSz="914400" rtl="0" eaLnBrk="1" fontAlgn="auto" latinLnBrk="0" hangingPunct="1">
+              <a:lnSpc>
+                <a:spcPct val="100000"/>
+              </a:lnSpc>
+              <a:spcBef>
+                <a:spcPts val="0"/>
+              </a:spcBef>
+              <a:spcAft>
+                <a:spcPts val="0"/>
+              </a:spcAft>
+              <a:buClrTx/>
+              <a:buSzTx/>
+              <a:buFontTx/>
+              <a:buNone/>
+              <a:tabLst/>
+              <a:defRPr/>
+            </a:pPr>
+            <a:endParaRPr kumimoji="0" lang="en-US" sz="1800" b="0" i="0" u="none" strike="noStrike" kern="1200" cap="none" spc="0" normalizeH="0" baseline="0" noProof="0">
+              <a:ln>
+                <a:noFill/>
+              </a:ln>
+              <a:solidFill>
+                <a:prstClr val="white"/>
+              </a:solidFill>
+              <a:effectLst/>
+              <a:uLnTx/>
+              <a:uFillTx/>
+              <a:latin typeface="Calibri" panose="020F0502020204030204"/>
+              <a:ea typeface="+mn-ea"/>
+              <a:cs typeface="+mn-cs"/>
+            </a:endParaRPr>
+          </a:p>
+        </p:txBody>
+      </p:sp>
+      <p:sp>
+        <p:nvSpPr>
+          <p:cNvPr id="10" name="Freeform: Shape 9">
+            <a:extLst>
+              <a:ext uri="{FF2B5EF4-FFF2-40B4-BE49-F238E27FC236}">
+                <a16:creationId xmlns:a16="http://schemas.microsoft.com/office/drawing/2014/main" id="{53E68D9A-86E1-4C0E-BBF2-8769D05233F6}"/>
+              </a:ext>
+              <a:ext uri="{C183D7F6-B498-43B3-948B-1728B52AA6E4}">
+                <adec:decorative xmlns:adec="http://schemas.microsoft.com/office/drawing/2017/decorative" val="1"/>
+              </a:ext>
+            </a:extLst>
+          </p:cNvPr>
+          <p:cNvSpPr>
+            <a:spLocks noGrp="1" noRot="1" noChangeAspect="1" noMove="1" noResize="1" noEditPoints="1" noAdjustHandles="1" noChangeArrowheads="1" noChangeShapeType="1" noTextEdit="1"/>
+          </p:cNvSpPr>
+          <p:nvPr>
+            <p:extLst>
+              <p:ext uri="{386F3935-93C4-4BCD-93E2-E3B085C9AB24}">
+                <p16:designElem xmlns:p16="http://schemas.microsoft.com/office/powerpoint/2015/main" val="1"/>
+              </p:ext>
+            </p:extLst>
+          </p:nvPr>
+        </p:nvSpPr>
+        <p:spPr>
+          <a:xfrm>
+            <a:off x="0" y="523805"/>
+            <a:ext cx="6313655" cy="5696020"/>
+          </a:xfrm>
+          <a:custGeom>
+            <a:avLst/>
+            <a:gdLst>
+              <a:gd name="connsiteX0" fmla="*/ 0 w 6313655"/>
+              <a:gd name="connsiteY0" fmla="*/ 0 h 5696020"/>
+              <a:gd name="connsiteX1" fmla="*/ 6313655 w 6313655"/>
+              <a:gd name="connsiteY1" fmla="*/ 0 h 5696020"/>
+              <a:gd name="connsiteX2" fmla="*/ 3550375 w 6313655"/>
+              <a:gd name="connsiteY2" fmla="*/ 5696020 h 5696020"/>
+              <a:gd name="connsiteX3" fmla="*/ 0 w 6313655"/>
+              <a:gd name="connsiteY3" fmla="*/ 5696020 h 5696020"/>
+            </a:gdLst>
+            <a:ahLst/>
+            <a:cxnLst>
+              <a:cxn ang="0">
+                <a:pos x="connsiteX0" y="connsiteY0"/>
+              </a:cxn>
+              <a:cxn ang="0">
+                <a:pos x="connsiteX1" y="connsiteY1"/>
+              </a:cxn>
+              <a:cxn ang="0">
+                <a:pos x="connsiteX2" y="connsiteY2"/>
+              </a:cxn>
+              <a:cxn ang="0">
+                <a:pos x="connsiteX3" y="connsiteY3"/>
+              </a:cxn>
+            </a:cxnLst>
+            <a:rect l="l" t="t" r="r" b="b"/>
+            <a:pathLst>
+              <a:path w="6313655" h="5696020">
+                <a:moveTo>
+                  <a:pt x="0" y="0"/>
+                </a:moveTo>
+                <a:lnTo>
+                  <a:pt x="6313655" y="0"/>
+                </a:lnTo>
+                <a:lnTo>
+                  <a:pt x="3550375" y="5696020"/>
+                </a:lnTo>
+                <a:lnTo>
+                  <a:pt x="0" y="5696020"/>
+                </a:lnTo>
+                <a:close/>
+              </a:path>
+            </a:pathLst>
+          </a:custGeom>
+          <a:solidFill>
+            <a:srgbClr val="303030"/>
+          </a:solidFill>
+          <a:ln>
+            <a:noFill/>
+          </a:ln>
+        </p:spPr>
+        <p:style>
+          <a:lnRef idx="2">
+            <a:schemeClr val="accent1">
+              <a:shade val="50000"/>
+            </a:schemeClr>
+          </a:lnRef>
+          <a:fillRef idx="1">
+            <a:schemeClr val="accent1"/>
+          </a:fillRef>
+          <a:effectRef idx="0">
+            <a:schemeClr val="accent1"/>
+          </a:effectRef>
+          <a:fontRef idx="minor">
+            <a:schemeClr val="lt1"/>
+          </a:fontRef>
+        </p:style>
+        <p:txBody>
+          <a:bodyPr wrap="square" rtlCol="0" anchor="ctr">
+            <a:noAutofit/>
+          </a:bodyPr>
+          <a:lstStyle/>
+          <a:p>
+            <a:pPr marL="0" marR="0" lvl="0" indent="0" algn="ctr" defTabSz="914400" rtl="0" eaLnBrk="1" fontAlgn="auto" latinLnBrk="0" hangingPunct="1">
+              <a:lnSpc>
+                <a:spcPct val="100000"/>
+              </a:lnSpc>
+              <a:spcBef>
+                <a:spcPts val="0"/>
+              </a:spcBef>
+              <a:spcAft>
+                <a:spcPts val="0"/>
+              </a:spcAft>
+              <a:buClrTx/>
+              <a:buSzTx/>
+              <a:buFontTx/>
+              <a:buNone/>
+              <a:tabLst/>
+              <a:defRPr/>
+            </a:pPr>
+            <a:endParaRPr kumimoji="0" lang="en-US" sz="1800" b="0" i="0" u="none" strike="noStrike" kern="1200" cap="none" spc="0" normalizeH="0" baseline="0" noProof="0" dirty="0">
+              <a:ln>
+                <a:noFill/>
+              </a:ln>
+              <a:solidFill>
+                <a:prstClr val="black">
+                  <a:lumMod val="95000"/>
+                </a:prstClr>
+              </a:solidFill>
+              <a:effectLst/>
+              <a:uLnTx/>
+              <a:uFillTx/>
+              <a:latin typeface="Calibri" panose="020F0502020204030204"/>
+              <a:ea typeface="+mn-ea"/>
+              <a:cs typeface="+mn-cs"/>
+            </a:endParaRPr>
+          </a:p>
+        </p:txBody>
+      </p:sp>
+      <p:sp>
+        <p:nvSpPr>
+          <p:cNvPr id="2" name="Title 1">
+            <a:extLst>
+              <a:ext uri="{FF2B5EF4-FFF2-40B4-BE49-F238E27FC236}">
+                <a16:creationId xmlns:a16="http://schemas.microsoft.com/office/drawing/2014/main" id="{8E04E64B-9C02-4BD2-80EE-BD66BB72616C}"/>
+              </a:ext>
+            </a:extLst>
+          </p:cNvPr>
+          <p:cNvSpPr>
+            <a:spLocks noGrp="1"/>
+          </p:cNvSpPr>
+          <p:nvPr>
+            <p:ph type="title"/>
+          </p:nvPr>
+        </p:nvSpPr>
+        <p:spPr>
+          <a:xfrm>
+            <a:off x="838200" y="926351"/>
+            <a:ext cx="3805518" cy="2892625"/>
+          </a:xfrm>
+        </p:spPr>
+        <p:txBody>
+          <a:bodyPr anchor="b">
+            <a:normAutofit/>
+          </a:bodyPr>
+          <a:lstStyle/>
+          <a:p>
+            <a:r>
+              <a:rPr lang="en-US">
+                <a:solidFill>
+                  <a:srgbClr val="FFFFFF"/>
+                </a:solidFill>
+              </a:rPr>
+              <a:t>age()</a:t>
+            </a:r>
+          </a:p>
+        </p:txBody>
+      </p:sp>
+      <p:sp>
+        <p:nvSpPr>
+          <p:cNvPr id="3" name="Content Placeholder 2">
+            <a:extLst>
+              <a:ext uri="{FF2B5EF4-FFF2-40B4-BE49-F238E27FC236}">
+                <a16:creationId xmlns:a16="http://schemas.microsoft.com/office/drawing/2014/main" id="{A8B187DE-ECD7-4855-8EE8-1CCDD27C7171}"/>
+              </a:ext>
+            </a:extLst>
+          </p:cNvPr>
+          <p:cNvSpPr>
+            <a:spLocks noGrp="1"/>
+          </p:cNvSpPr>
+          <p:nvPr>
+            <p:ph idx="1"/>
+          </p:nvPr>
+        </p:nvSpPr>
+        <p:spPr>
+          <a:xfrm>
+            <a:off x="6313655" y="926351"/>
+            <a:ext cx="5040144" cy="5091953"/>
+          </a:xfrm>
+        </p:spPr>
+        <p:txBody>
+          <a:bodyPr anchor="ctr">
+            <a:normAutofit/>
+          </a:bodyPr>
+          <a:lstStyle/>
+          <a:p>
+            <a:r>
+              <a:rPr lang="en-US" sz="2000">
+                <a:solidFill>
+                  <a:schemeClr val="bg1"/>
+                </a:solidFill>
+              </a:rPr>
+              <a:t>The age() function accepts two TIMESTAMP values. It subtracts the second argument from the first one and returns an interval as the result.</a:t>
+            </a:r>
+          </a:p>
+          <a:p>
+            <a:r>
+              <a:rPr lang="en-US" sz="2000">
+                <a:solidFill>
+                  <a:schemeClr val="bg1"/>
+                </a:solidFill>
+              </a:rPr>
+              <a:t>age([timestamp value],timestamp value)</a:t>
+            </a:r>
+          </a:p>
+          <a:p>
+            <a:endParaRPr lang="en-US" sz="2000">
+              <a:solidFill>
+                <a:schemeClr val="bg1"/>
+              </a:solidFill>
+            </a:endParaRPr>
+          </a:p>
+          <a:p>
+            <a:r>
+              <a:rPr lang="en-US" sz="2000">
+                <a:solidFill>
+                  <a:schemeClr val="bg1"/>
+                </a:solidFill>
+              </a:rPr>
+              <a:t>If you want to take the current date as the first argument, you can use the following form of the age() function:</a:t>
+            </a:r>
+          </a:p>
+          <a:p>
+            <a:r>
+              <a:rPr lang="en-US" sz="2000">
+                <a:solidFill>
+                  <a:schemeClr val="bg1"/>
+                </a:solidFill>
+              </a:rPr>
+              <a:t>age(timestamp)</a:t>
+            </a:r>
+          </a:p>
+          <a:p>
+            <a:endParaRPr lang="en-US" sz="2000">
+              <a:solidFill>
+                <a:schemeClr val="bg1"/>
+              </a:solidFill>
+            </a:endParaRPr>
+          </a:p>
+        </p:txBody>
+      </p:sp>
+    </p:spTree>
+    <p:extLst>
+      <p:ext uri="{BB962C8B-B14F-4D97-AF65-F5344CB8AC3E}">
+        <p14:creationId xmlns:p14="http://schemas.microsoft.com/office/powerpoint/2010/main" val="2079425010"/>
+      </p:ext>
+    </p:extLst>
+  </p:cSld>
+  <p:clrMapOvr>
+    <a:overrideClrMapping bg1="dk1" tx1="lt1" bg2="dk2" tx2="lt2" accent1="accent1" accent2="accent2" accent3="accent3" accent4="accent4" accent5="accent5" accent6="accent6" hlink="hlink" folHlink="folHlink"/>
+  </p:clrMapOvr>
+</p:sld>
+</file>
+
+<file path=ppt/slides/slide36.xml><?xml version="1.0" encoding="utf-8"?>
 <p:sld xmlns:a="http://schemas.openxmlformats.org/drawingml/2006/main" xmlns:r="http://schemas.openxmlformats.org/officeDocument/2006/relationships" xmlns:p="http://schemas.openxmlformats.org/presentationml/2006/main">
   <p:cSld>
     <p:bg>
@@ -12513,7 +12914,7 @@
       </p:grpSpPr>
       <p:sp>
         <p:nvSpPr>
-          <p:cNvPr id="9" name="Rectangle 8">
+          <p:cNvPr id="10" name="Rectangle 9">
             <a:extLst>
               <a:ext uri="{FF2B5EF4-FFF2-40B4-BE49-F238E27FC236}">
                 <a16:creationId xmlns:a16="http://schemas.microsoft.com/office/drawing/2014/main" id="{867D4867-5BA7-4462-B2F6-A23F4A622AA7}"/>
@@ -12577,6 +12978,230 @@
           <p:cNvPr id="2" name="Title 1">
             <a:extLst>
               <a:ext uri="{FF2B5EF4-FFF2-40B4-BE49-F238E27FC236}">
+                <a16:creationId xmlns:a16="http://schemas.microsoft.com/office/drawing/2014/main" id="{DEC832D8-0303-4154-9D4C-D5D1FC18F637}"/>
+              </a:ext>
+            </a:extLst>
+          </p:cNvPr>
+          <p:cNvSpPr>
+            <a:spLocks noGrp="1"/>
+          </p:cNvSpPr>
+          <p:nvPr>
+            <p:ph type="title"/>
+          </p:nvPr>
+        </p:nvSpPr>
+        <p:spPr>
+          <a:xfrm>
+            <a:off x="643468" y="623392"/>
+            <a:ext cx="3363974" cy="1607060"/>
+          </a:xfrm>
+          <a:noFill/>
+          <a:ln w="19050">
+            <a:solidFill>
+              <a:schemeClr val="tx1"/>
+            </a:solidFill>
+          </a:ln>
+        </p:spPr>
+        <p:txBody>
+          <a:bodyPr wrap="square" anchor="ctr">
+            <a:normAutofit/>
+          </a:bodyPr>
+          <a:lstStyle/>
+          <a:p>
+            <a:pPr algn="ctr"/>
+            <a:r>
+              <a:rPr lang="en-US" sz="2800" dirty="0"/>
+              <a:t>Odd detail</a:t>
+            </a:r>
+          </a:p>
+        </p:txBody>
+      </p:sp>
+      <p:sp>
+        <p:nvSpPr>
+          <p:cNvPr id="3" name="Content Placeholder 2">
+            <a:extLst>
+              <a:ext uri="{FF2B5EF4-FFF2-40B4-BE49-F238E27FC236}">
+                <a16:creationId xmlns:a16="http://schemas.microsoft.com/office/drawing/2014/main" id="{7CF52484-6A27-4E5D-A38E-7D9A98A89732}"/>
+              </a:ext>
+            </a:extLst>
+          </p:cNvPr>
+          <p:cNvSpPr>
+            <a:spLocks noGrp="1"/>
+          </p:cNvSpPr>
+          <p:nvPr>
+            <p:ph idx="1"/>
+          </p:nvPr>
+        </p:nvSpPr>
+        <p:spPr>
+          <a:xfrm>
+            <a:off x="643468" y="2638043"/>
+            <a:ext cx="3363974" cy="3415623"/>
+          </a:xfrm>
+        </p:spPr>
+        <p:txBody>
+          <a:bodyPr>
+            <a:normAutofit/>
+          </a:bodyPr>
+          <a:lstStyle/>
+          <a:p>
+            <a:r>
+              <a:rPr lang="en-US" sz="1700"/>
+              <a:t>When the age() function takes two arguments they are written in as strings</a:t>
+            </a:r>
+          </a:p>
+          <a:p>
+            <a:r>
+              <a:rPr lang="en-US" sz="1700"/>
+              <a:t>When the age() function takes one argument the word “timestamp” must be written before the timestamp input </a:t>
+            </a:r>
+          </a:p>
+          <a:p>
+            <a:r>
+              <a:rPr lang="en-US" sz="1700"/>
+              <a:t>Ex: SELECT AGE(timestamp '2000-01-01');</a:t>
+            </a:r>
+          </a:p>
+          <a:p>
+            <a:pPr marL="0" indent="0">
+              <a:buNone/>
+            </a:pPr>
+            <a:endParaRPr lang="en-US" sz="1700"/>
+          </a:p>
+        </p:txBody>
+      </p:sp>
+      <p:pic>
+        <p:nvPicPr>
+          <p:cNvPr id="5" name="Picture 4">
+            <a:extLst>
+              <a:ext uri="{FF2B5EF4-FFF2-40B4-BE49-F238E27FC236}">
+                <a16:creationId xmlns:a16="http://schemas.microsoft.com/office/drawing/2014/main" id="{46EE0789-901C-4989-8FB2-3CBC93A13F8E}"/>
+              </a:ext>
+            </a:extLst>
+          </p:cNvPr>
+          <p:cNvPicPr>
+            <a:picLocks noChangeAspect="1"/>
+          </p:cNvPicPr>
+          <p:nvPr/>
+        </p:nvPicPr>
+        <p:blipFill>
+          <a:blip r:embed="rId2"/>
+          <a:stretch>
+            <a:fillRect/>
+          </a:stretch>
+        </p:blipFill>
+        <p:spPr>
+          <a:xfrm>
+            <a:off x="4650910" y="1328737"/>
+            <a:ext cx="7544145" cy="4200525"/>
+          </a:xfrm>
+          <a:prstGeom prst="rect">
+            <a:avLst/>
+          </a:prstGeom>
+        </p:spPr>
+      </p:pic>
+    </p:spTree>
+    <p:extLst>
+      <p:ext uri="{BB962C8B-B14F-4D97-AF65-F5344CB8AC3E}">
+        <p14:creationId xmlns:p14="http://schemas.microsoft.com/office/powerpoint/2010/main" val="4065123876"/>
+      </p:ext>
+    </p:extLst>
+  </p:cSld>
+  <p:clrMapOvr>
+    <a:overrideClrMapping bg1="dk1" tx1="lt1" bg2="dk2" tx2="lt2" accent1="accent1" accent2="accent2" accent3="accent3" accent4="accent4" accent5="accent5" accent6="accent6" hlink="hlink" folHlink="folHlink"/>
+  </p:clrMapOvr>
+</p:sld>
+</file>
+
+<file path=ppt/slides/slide37.xml><?xml version="1.0" encoding="utf-8"?>
+<p:sld xmlns:a="http://schemas.openxmlformats.org/drawingml/2006/main" xmlns:r="http://schemas.openxmlformats.org/officeDocument/2006/relationships" xmlns:p="http://schemas.openxmlformats.org/presentationml/2006/main">
+  <p:cSld>
+    <p:bg>
+      <p:bgPr>
+        <a:solidFill>
+          <a:schemeClr val="tx1"/>
+        </a:solidFill>
+        <a:effectLst/>
+      </p:bgPr>
+    </p:bg>
+    <p:spTree>
+      <p:nvGrpSpPr>
+        <p:cNvPr id="1" name=""/>
+        <p:cNvGrpSpPr/>
+        <p:nvPr/>
+      </p:nvGrpSpPr>
+      <p:grpSpPr>
+        <a:xfrm>
+          <a:off x="0" y="0"/>
+          <a:ext cx="0" cy="0"/>
+          <a:chOff x="0" y="0"/>
+          <a:chExt cx="0" cy="0"/>
+        </a:xfrm>
+      </p:grpSpPr>
+      <p:sp>
+        <p:nvSpPr>
+          <p:cNvPr id="9" name="Rectangle 8">
+            <a:extLst>
+              <a:ext uri="{FF2B5EF4-FFF2-40B4-BE49-F238E27FC236}">
+                <a16:creationId xmlns:a16="http://schemas.microsoft.com/office/drawing/2014/main" id="{867D4867-5BA7-4462-B2F6-A23F4A622AA7}"/>
+              </a:ext>
+              <a:ext uri="{C183D7F6-B498-43B3-948B-1728B52AA6E4}">
+                <adec:decorative xmlns:adec="http://schemas.microsoft.com/office/drawing/2017/decorative" val="1"/>
+              </a:ext>
+            </a:extLst>
+          </p:cNvPr>
+          <p:cNvSpPr>
+            <a:spLocks noGrp="1" noRot="1" noChangeAspect="1" noMove="1" noResize="1" noEditPoints="1" noAdjustHandles="1" noChangeArrowheads="1" noChangeShapeType="1" noTextEdit="1"/>
+          </p:cNvSpPr>
+          <p:nvPr>
+            <p:extLst>
+              <p:ext uri="{386F3935-93C4-4BCD-93E2-E3B085C9AB24}">
+                <p16:designElem xmlns:p16="http://schemas.microsoft.com/office/powerpoint/2015/main" val="1"/>
+              </p:ext>
+            </p:extLst>
+          </p:nvPr>
+        </p:nvSpPr>
+        <p:spPr>
+          <a:xfrm>
+            <a:off x="0" y="0"/>
+            <a:ext cx="4654296" cy="6858000"/>
+          </a:xfrm>
+          <a:prstGeom prst="rect">
+            <a:avLst/>
+          </a:prstGeom>
+          <a:solidFill>
+            <a:srgbClr val="3F3F3F"/>
+          </a:solidFill>
+          <a:ln>
+            <a:noFill/>
+          </a:ln>
+        </p:spPr>
+        <p:style>
+          <a:lnRef idx="0">
+            <a:scrgbClr r="0" g="0" b="0"/>
+          </a:lnRef>
+          <a:fillRef idx="0">
+            <a:scrgbClr r="0" g="0" b="0"/>
+          </a:fillRef>
+          <a:effectRef idx="0">
+            <a:scrgbClr r="0" g="0" b="0"/>
+          </a:effectRef>
+          <a:fontRef idx="minor">
+            <a:schemeClr val="lt1"/>
+          </a:fontRef>
+        </p:style>
+        <p:txBody>
+          <a:bodyPr rtlCol="0" anchor="ctr"/>
+          <a:lstStyle/>
+          <a:p>
+            <a:pPr algn="ctr"/>
+            <a:endParaRPr lang="en-US" dirty="0"/>
+          </a:p>
+        </p:txBody>
+      </p:sp>
+      <p:sp>
+        <p:nvSpPr>
+          <p:cNvPr id="2" name="Title 1">
+            <a:extLst>
+              <a:ext uri="{FF2B5EF4-FFF2-40B4-BE49-F238E27FC236}">
                 <a16:creationId xmlns:a16="http://schemas.microsoft.com/office/drawing/2014/main" id="{6F4C49C8-1C01-4DC6-95C1-5C3DD4BD79F0}"/>
               </a:ext>
             </a:extLst>
@@ -12704,268 +13329,6 @@
 </p:sld>
 </file>
 
-<file path=ppt/slides/slide36.xml><?xml version="1.0" encoding="utf-8"?>
-<p:sld xmlns:a="http://schemas.openxmlformats.org/drawingml/2006/main" xmlns:r="http://schemas.openxmlformats.org/officeDocument/2006/relationships" xmlns:p="http://schemas.openxmlformats.org/presentationml/2006/main">
-  <p:cSld>
-    <p:spTree>
-      <p:nvGrpSpPr>
-        <p:cNvPr id="1" name=""/>
-        <p:cNvGrpSpPr/>
-        <p:nvPr/>
-      </p:nvGrpSpPr>
-      <p:grpSpPr>
-        <a:xfrm>
-          <a:off x="0" y="0"/>
-          <a:ext cx="0" cy="0"/>
-          <a:chOff x="0" y="0"/>
-          <a:chExt cx="0" cy="0"/>
-        </a:xfrm>
-      </p:grpSpPr>
-      <p:sp>
-        <p:nvSpPr>
-          <p:cNvPr id="2" name="Title 1">
-            <a:extLst>
-              <a:ext uri="{FF2B5EF4-FFF2-40B4-BE49-F238E27FC236}">
-                <a16:creationId xmlns:a16="http://schemas.microsoft.com/office/drawing/2014/main" id="{20288032-0A35-4119-9DC7-22FA6B8E9797}"/>
-              </a:ext>
-            </a:extLst>
-          </p:cNvPr>
-          <p:cNvSpPr>
-            <a:spLocks noGrp="1"/>
-          </p:cNvSpPr>
-          <p:nvPr>
-            <p:ph type="title"/>
-          </p:nvPr>
-        </p:nvSpPr>
-        <p:spPr>
-          <a:solidFill>
-            <a:schemeClr val="accent2">
-              <a:lumMod val="60000"/>
-              <a:lumOff val="40000"/>
-            </a:schemeClr>
-          </a:solidFill>
-        </p:spPr>
-        <p:txBody>
-          <a:bodyPr/>
-          <a:lstStyle/>
-          <a:p>
-            <a:r>
-              <a:rPr lang="en-US" dirty="0"/>
-              <a:t>Edit selection</a:t>
-            </a:r>
-          </a:p>
-        </p:txBody>
-      </p:sp>
-      <p:sp>
-        <p:nvSpPr>
-          <p:cNvPr id="3" name="Content Placeholder 2">
-            <a:extLst>
-              <a:ext uri="{FF2B5EF4-FFF2-40B4-BE49-F238E27FC236}">
-                <a16:creationId xmlns:a16="http://schemas.microsoft.com/office/drawing/2014/main" id="{8656073D-84FA-4E86-8A41-365BD88E422A}"/>
-              </a:ext>
-            </a:extLst>
-          </p:cNvPr>
-          <p:cNvSpPr>
-            <a:spLocks noGrp="1"/>
-          </p:cNvSpPr>
-          <p:nvPr>
-            <p:ph idx="1"/>
-          </p:nvPr>
-        </p:nvSpPr>
-        <p:spPr/>
-        <p:txBody>
-          <a:bodyPr>
-            <a:normAutofit/>
-          </a:bodyPr>
-          <a:lstStyle/>
-          <a:p>
-            <a:r>
-              <a:rPr lang="en-US" dirty="0" err="1"/>
-              <a:t>date_part</a:t>
-            </a:r>
-            <a:r>
-              <a:rPr lang="en-US" dirty="0"/>
-              <a:t>(text, timestamp)</a:t>
-            </a:r>
-          </a:p>
-          <a:p>
-            <a:r>
-              <a:rPr lang="en-US" dirty="0" err="1"/>
-              <a:t>date_part</a:t>
-            </a:r>
-            <a:r>
-              <a:rPr lang="en-US" dirty="0"/>
-              <a:t>(text, interval)</a:t>
-            </a:r>
-          </a:p>
-          <a:p>
-            <a:r>
-              <a:rPr lang="en-US" dirty="0" err="1"/>
-              <a:t>date_trunc</a:t>
-            </a:r>
-            <a:r>
-              <a:rPr lang="en-US" dirty="0"/>
-              <a:t>(text, timestamp)</a:t>
-            </a:r>
-          </a:p>
-          <a:p>
-            <a:r>
-              <a:rPr lang="en-US" dirty="0" err="1"/>
-              <a:t>date_trunc</a:t>
-            </a:r>
-            <a:r>
-              <a:rPr lang="en-US" dirty="0"/>
-              <a:t>(text, interval)</a:t>
-            </a:r>
-          </a:p>
-        </p:txBody>
-      </p:sp>
-    </p:spTree>
-    <p:extLst>
-      <p:ext uri="{BB962C8B-B14F-4D97-AF65-F5344CB8AC3E}">
-        <p14:creationId xmlns:p14="http://schemas.microsoft.com/office/powerpoint/2010/main" val="986528449"/>
-      </p:ext>
-    </p:extLst>
-  </p:cSld>
-  <p:clrMapOvr>
-    <a:masterClrMapping/>
-  </p:clrMapOvr>
-</p:sld>
-</file>
-
-<file path=ppt/slides/slide37.xml><?xml version="1.0" encoding="utf-8"?>
-<p:sld xmlns:a="http://schemas.openxmlformats.org/drawingml/2006/main" xmlns:r="http://schemas.openxmlformats.org/officeDocument/2006/relationships" xmlns:p="http://schemas.openxmlformats.org/presentationml/2006/main">
-  <p:cSld>
-    <p:spTree>
-      <p:nvGrpSpPr>
-        <p:cNvPr id="1" name=""/>
-        <p:cNvGrpSpPr/>
-        <p:nvPr/>
-      </p:nvGrpSpPr>
-      <p:grpSpPr>
-        <a:xfrm>
-          <a:off x="0" y="0"/>
-          <a:ext cx="0" cy="0"/>
-          <a:chOff x="0" y="0"/>
-          <a:chExt cx="0" cy="0"/>
-        </a:xfrm>
-      </p:grpSpPr>
-      <p:sp>
-        <p:nvSpPr>
-          <p:cNvPr id="2" name="Title 1">
-            <a:extLst>
-              <a:ext uri="{FF2B5EF4-FFF2-40B4-BE49-F238E27FC236}">
-                <a16:creationId xmlns:a16="http://schemas.microsoft.com/office/drawing/2014/main" id="{7097D260-7E94-43BB-BA4C-050E93C96095}"/>
-              </a:ext>
-            </a:extLst>
-          </p:cNvPr>
-          <p:cNvSpPr>
-            <a:spLocks noGrp="1"/>
-          </p:cNvSpPr>
-          <p:nvPr>
-            <p:ph type="title"/>
-          </p:nvPr>
-        </p:nvSpPr>
-        <p:spPr/>
-        <p:txBody>
-          <a:bodyPr/>
-          <a:lstStyle/>
-          <a:p>
-            <a:r>
-              <a:rPr lang="en-US" dirty="0"/>
-              <a:t>Date Part</a:t>
-            </a:r>
-          </a:p>
-        </p:txBody>
-      </p:sp>
-      <p:sp>
-        <p:nvSpPr>
-          <p:cNvPr id="3" name="Content Placeholder 2">
-            <a:extLst>
-              <a:ext uri="{FF2B5EF4-FFF2-40B4-BE49-F238E27FC236}">
-                <a16:creationId xmlns:a16="http://schemas.microsoft.com/office/drawing/2014/main" id="{59A5B6BF-E4C3-4BF4-8A06-291AEFF80240}"/>
-              </a:ext>
-            </a:extLst>
-          </p:cNvPr>
-          <p:cNvSpPr>
-            <a:spLocks noGrp="1"/>
-          </p:cNvSpPr>
-          <p:nvPr>
-            <p:ph idx="1"/>
-          </p:nvPr>
-        </p:nvSpPr>
-        <p:spPr/>
-        <p:txBody>
-          <a:bodyPr>
-            <a:normAutofit/>
-          </a:bodyPr>
-          <a:lstStyle/>
-          <a:p>
-            <a:r>
-              <a:rPr lang="en-US" dirty="0"/>
-              <a:t>DATE_PART() function extracts a subfield from a date or time value. The following illustrates the DATE_PART() function:</a:t>
-            </a:r>
-          </a:p>
-          <a:p>
-            <a:r>
-              <a:rPr lang="en-US" dirty="0"/>
-              <a:t>DATE_PART(</a:t>
-            </a:r>
-            <a:r>
-              <a:rPr lang="en-US" dirty="0" err="1"/>
-              <a:t>field,source</a:t>
-            </a:r>
-            <a:r>
-              <a:rPr lang="en-US" dirty="0"/>
-              <a:t>)</a:t>
-            </a:r>
-          </a:p>
-          <a:p>
-            <a:r>
-              <a:rPr lang="en-US" dirty="0"/>
-              <a:t>The field is an identifier that determines what field to </a:t>
-            </a:r>
-            <a:r>
-              <a:rPr lang="en-US" b="1" dirty="0"/>
-              <a:t>extract</a:t>
-            </a:r>
-            <a:r>
-              <a:rPr lang="en-US" dirty="0"/>
-              <a:t> from the source, full list on </a:t>
-            </a:r>
-            <a:r>
-              <a:rPr lang="en-US" b="1" dirty="0"/>
-              <a:t>slide 9</a:t>
-            </a:r>
-            <a:r>
-              <a:rPr lang="en-US" dirty="0"/>
-              <a:t>. </a:t>
-            </a:r>
-          </a:p>
-          <a:p>
-            <a:r>
-              <a:rPr lang="en-US" dirty="0"/>
-              <a:t>The source is a value of type TIMESTAMP or INTERVAL. If you pass a DATE value, the function will cast it to a TIMESTAMP value</a:t>
-            </a:r>
-          </a:p>
-          <a:p>
-            <a:endParaRPr lang="en-US" dirty="0"/>
-          </a:p>
-        </p:txBody>
-      </p:sp>
-    </p:spTree>
-    <p:extLst>
-      <p:ext uri="{BB962C8B-B14F-4D97-AF65-F5344CB8AC3E}">
-        <p14:creationId xmlns:p14="http://schemas.microsoft.com/office/powerpoint/2010/main" val="2060091869"/>
-      </p:ext>
-    </p:extLst>
-  </p:cSld>
-  <p:clrMapOvr>
-    <a:masterClrMapping/>
-  </p:clrMapOvr>
-</p:sld>
-</file>
-
 <file path=ppt/slides/slide38.xml><?xml version="1.0" encoding="utf-8"?>
 <p:sld xmlns:a="http://schemas.openxmlformats.org/drawingml/2006/main" xmlns:r="http://schemas.openxmlformats.org/officeDocument/2006/relationships" xmlns:p="http://schemas.openxmlformats.org/presentationml/2006/main">
   <p:cSld>
@@ -12988,7 +13351,136 @@
           <p:cNvPr id="2" name="Title 1">
             <a:extLst>
               <a:ext uri="{FF2B5EF4-FFF2-40B4-BE49-F238E27FC236}">
-                <a16:creationId xmlns:a16="http://schemas.microsoft.com/office/drawing/2014/main" id="{FC21EBD1-43B3-4D3D-9FC3-42E2C7DC3319}"/>
+                <a16:creationId xmlns:a16="http://schemas.microsoft.com/office/drawing/2014/main" id="{20288032-0A35-4119-9DC7-22FA6B8E9797}"/>
+              </a:ext>
+            </a:extLst>
+          </p:cNvPr>
+          <p:cNvSpPr>
+            <a:spLocks noGrp="1"/>
+          </p:cNvSpPr>
+          <p:nvPr>
+            <p:ph type="title"/>
+          </p:nvPr>
+        </p:nvSpPr>
+        <p:spPr>
+          <a:solidFill>
+            <a:schemeClr val="accent2">
+              <a:lumMod val="60000"/>
+              <a:lumOff val="40000"/>
+            </a:schemeClr>
+          </a:solidFill>
+        </p:spPr>
+        <p:txBody>
+          <a:bodyPr/>
+          <a:lstStyle/>
+          <a:p>
+            <a:r>
+              <a:rPr lang="en-US" dirty="0"/>
+              <a:t>Edit selection</a:t>
+            </a:r>
+          </a:p>
+        </p:txBody>
+      </p:sp>
+      <p:sp>
+        <p:nvSpPr>
+          <p:cNvPr id="3" name="Content Placeholder 2">
+            <a:extLst>
+              <a:ext uri="{FF2B5EF4-FFF2-40B4-BE49-F238E27FC236}">
+                <a16:creationId xmlns:a16="http://schemas.microsoft.com/office/drawing/2014/main" id="{8656073D-84FA-4E86-8A41-365BD88E422A}"/>
+              </a:ext>
+            </a:extLst>
+          </p:cNvPr>
+          <p:cNvSpPr>
+            <a:spLocks noGrp="1"/>
+          </p:cNvSpPr>
+          <p:nvPr>
+            <p:ph idx="1"/>
+          </p:nvPr>
+        </p:nvSpPr>
+        <p:spPr/>
+        <p:txBody>
+          <a:bodyPr>
+            <a:normAutofit/>
+          </a:bodyPr>
+          <a:lstStyle/>
+          <a:p>
+            <a:r>
+              <a:rPr lang="en-US" dirty="0" err="1"/>
+              <a:t>date_part</a:t>
+            </a:r>
+            <a:r>
+              <a:rPr lang="en-US" dirty="0"/>
+              <a:t>(text, timestamp)</a:t>
+            </a:r>
+          </a:p>
+          <a:p>
+            <a:r>
+              <a:rPr lang="en-US" dirty="0" err="1"/>
+              <a:t>date_part</a:t>
+            </a:r>
+            <a:r>
+              <a:rPr lang="en-US" dirty="0"/>
+              <a:t>(text, interval)</a:t>
+            </a:r>
+          </a:p>
+          <a:p>
+            <a:r>
+              <a:rPr lang="en-US" dirty="0" err="1"/>
+              <a:t>date_trunc</a:t>
+            </a:r>
+            <a:r>
+              <a:rPr lang="en-US" dirty="0"/>
+              <a:t>(text, timestamp)</a:t>
+            </a:r>
+          </a:p>
+          <a:p>
+            <a:r>
+              <a:rPr lang="en-US" dirty="0" err="1"/>
+              <a:t>date_trunc</a:t>
+            </a:r>
+            <a:r>
+              <a:rPr lang="en-US" dirty="0"/>
+              <a:t>(text, interval)</a:t>
+            </a:r>
+          </a:p>
+        </p:txBody>
+      </p:sp>
+    </p:spTree>
+    <p:extLst>
+      <p:ext uri="{BB962C8B-B14F-4D97-AF65-F5344CB8AC3E}">
+        <p14:creationId xmlns:p14="http://schemas.microsoft.com/office/powerpoint/2010/main" val="986528449"/>
+      </p:ext>
+    </p:extLst>
+  </p:cSld>
+  <p:clrMapOvr>
+    <a:masterClrMapping/>
+  </p:clrMapOvr>
+</p:sld>
+</file>
+
+<file path=ppt/slides/slide39.xml><?xml version="1.0" encoding="utf-8"?>
+<p:sld xmlns:a="http://schemas.openxmlformats.org/drawingml/2006/main" xmlns:r="http://schemas.openxmlformats.org/officeDocument/2006/relationships" xmlns:p="http://schemas.openxmlformats.org/presentationml/2006/main">
+  <p:cSld>
+    <p:spTree>
+      <p:nvGrpSpPr>
+        <p:cNvPr id="1" name=""/>
+        <p:cNvGrpSpPr/>
+        <p:nvPr/>
+      </p:nvGrpSpPr>
+      <p:grpSpPr>
+        <a:xfrm>
+          <a:off x="0" y="0"/>
+          <a:ext cx="0" cy="0"/>
+          <a:chOff x="0" y="0"/>
+          <a:chExt cx="0" cy="0"/>
+        </a:xfrm>
+      </p:grpSpPr>
+      <p:sp>
+        <p:nvSpPr>
+          <p:cNvPr id="2" name="Title 1">
+            <a:extLst>
+              <a:ext uri="{FF2B5EF4-FFF2-40B4-BE49-F238E27FC236}">
+                <a16:creationId xmlns:a16="http://schemas.microsoft.com/office/drawing/2014/main" id="{7097D260-7E94-43BB-BA4C-050E93C96095}"/>
               </a:ext>
             </a:extLst>
           </p:cNvPr>
@@ -13005,8 +13497,56 @@
           <a:lstStyle/>
           <a:p>
             <a:r>
+              <a:rPr lang="en-US" dirty="0" err="1"/>
+              <a:t>date_part</a:t>
+            </a:r>
+            <a:r>
               <a:rPr lang="en-US" dirty="0"/>
-              <a:t>DATE_PART(</a:t>
+              <a:t>()</a:t>
+            </a:r>
+          </a:p>
+        </p:txBody>
+      </p:sp>
+      <p:sp>
+        <p:nvSpPr>
+          <p:cNvPr id="3" name="Content Placeholder 2">
+            <a:extLst>
+              <a:ext uri="{FF2B5EF4-FFF2-40B4-BE49-F238E27FC236}">
+                <a16:creationId xmlns:a16="http://schemas.microsoft.com/office/drawing/2014/main" id="{59A5B6BF-E4C3-4BF4-8A06-291AEFF80240}"/>
+              </a:ext>
+            </a:extLst>
+          </p:cNvPr>
+          <p:cNvSpPr>
+            <a:spLocks noGrp="1"/>
+          </p:cNvSpPr>
+          <p:nvPr>
+            <p:ph idx="1"/>
+          </p:nvPr>
+        </p:nvSpPr>
+        <p:spPr/>
+        <p:txBody>
+          <a:bodyPr>
+            <a:normAutofit/>
+          </a:bodyPr>
+          <a:lstStyle/>
+          <a:p>
+            <a:r>
+              <a:rPr lang="en-US" dirty="0" err="1"/>
+              <a:t>date_part</a:t>
+            </a:r>
+            <a:r>
+              <a:rPr lang="en-US" dirty="0"/>
+              <a:t>() function extracts a subfield from a date or time value. </a:t>
+            </a:r>
+          </a:p>
+          <a:p>
+            <a:r>
+              <a:rPr lang="en-US" dirty="0" err="1"/>
+              <a:t>date_part</a:t>
+            </a:r>
+            <a:r>
+              <a:rPr lang="en-US" dirty="0"/>
+              <a:t>(</a:t>
             </a:r>
             <a:r>
               <a:rPr lang="en-US" dirty="0" err="1"/>
@@ -13016,8 +13556,395 @@
               <a:rPr lang="en-US" dirty="0"/>
               <a:t>)</a:t>
             </a:r>
+          </a:p>
+          <a:p>
+            <a:r>
+              <a:rPr lang="en-US" dirty="0"/>
+              <a:t>The field is an identifier that determines what </a:t>
+            </a:r>
+            <a:r>
+              <a:rPr lang="en-US" b="1" dirty="0"/>
+              <a:t>field</a:t>
+            </a:r>
+            <a:r>
+              <a:rPr lang="en-US" dirty="0"/>
+              <a:t> to extract from the source, full list on </a:t>
+            </a:r>
+            <a:r>
+              <a:rPr lang="en-US" b="1" dirty="0"/>
+              <a:t>slide 9</a:t>
+            </a:r>
+            <a:r>
+              <a:rPr lang="en-US" dirty="0"/>
+              <a:t>. </a:t>
+            </a:r>
+          </a:p>
+          <a:p>
+            <a:r>
+              <a:rPr lang="en-US" dirty="0"/>
+              <a:t>The source is a value of type TIMESTAMP or INTERVAL. If you pass a DATE value, the function will cast it to a TIMESTAMP value</a:t>
+            </a:r>
+          </a:p>
+          <a:p>
+            <a:endParaRPr lang="en-US" dirty="0"/>
+          </a:p>
+        </p:txBody>
+      </p:sp>
+    </p:spTree>
+    <p:extLst>
+      <p:ext uri="{BB962C8B-B14F-4D97-AF65-F5344CB8AC3E}">
+        <p14:creationId xmlns:p14="http://schemas.microsoft.com/office/powerpoint/2010/main" val="2060091869"/>
+      </p:ext>
+    </p:extLst>
+  </p:cSld>
+  <p:clrMapOvr>
+    <a:masterClrMapping/>
+  </p:clrMapOvr>
+</p:sld>
+</file>
+
+<file path=ppt/slides/slide4.xml><?xml version="1.0" encoding="utf-8"?>
+<p:sld xmlns:a="http://schemas.openxmlformats.org/drawingml/2006/main" xmlns:r="http://schemas.openxmlformats.org/officeDocument/2006/relationships" xmlns:p="http://schemas.openxmlformats.org/presentationml/2006/main">
+  <p:cSld>
+    <p:bg>
+      <p:bgPr>
+        <a:solidFill>
+          <a:schemeClr val="bg1"/>
+        </a:solidFill>
+        <a:effectLst/>
+      </p:bgPr>
+    </p:bg>
+    <p:spTree>
+      <p:nvGrpSpPr>
+        <p:cNvPr id="1" name=""/>
+        <p:cNvGrpSpPr/>
+        <p:nvPr/>
+      </p:nvGrpSpPr>
+      <p:grpSpPr>
+        <a:xfrm>
+          <a:off x="0" y="0"/>
+          <a:ext cx="0" cy="0"/>
+          <a:chOff x="0" y="0"/>
+          <a:chExt cx="0" cy="0"/>
+        </a:xfrm>
+      </p:grpSpPr>
+      <p:sp>
+        <p:nvSpPr>
+          <p:cNvPr id="8" name="Rectangle 7">
+            <a:extLst>
+              <a:ext uri="{FF2B5EF4-FFF2-40B4-BE49-F238E27FC236}">
+                <a16:creationId xmlns:a16="http://schemas.microsoft.com/office/drawing/2014/main" id="{F98ED85F-DCEE-4B50-802E-71A6E3E12B04}"/>
+              </a:ext>
+              <a:ext uri="{C183D7F6-B498-43B3-948B-1728B52AA6E4}">
+                <adec:decorative xmlns:adec="http://schemas.microsoft.com/office/drawing/2017/decorative" val="1"/>
+              </a:ext>
+            </a:extLst>
+          </p:cNvPr>
+          <p:cNvSpPr>
+            <a:spLocks noGrp="1" noRot="1" noChangeAspect="1" noMove="1" noResize="1" noEditPoints="1" noAdjustHandles="1" noChangeArrowheads="1" noChangeShapeType="1" noTextEdit="1"/>
+          </p:cNvSpPr>
+          <p:nvPr>
+            <p:extLst>
+              <p:ext uri="{386F3935-93C4-4BCD-93E2-E3B085C9AB24}">
+                <p16:designElem xmlns:p16="http://schemas.microsoft.com/office/powerpoint/2015/main" val="1"/>
+              </p:ext>
+            </p:extLst>
+          </p:nvPr>
+        </p:nvSpPr>
+        <p:spPr bwMode="ltGray">
+          <a:xfrm>
+            <a:off x="321564" y="320040"/>
+            <a:ext cx="11548872" cy="6217920"/>
+          </a:xfrm>
+          <a:prstGeom prst="rect">
+            <a:avLst/>
+          </a:prstGeom>
+          <a:solidFill>
+            <a:schemeClr val="tx1">
+              <a:lumMod val="75000"/>
+              <a:lumOff val="25000"/>
+            </a:schemeClr>
+          </a:solidFill>
+          <a:ln w="127000" cap="sq" cmpd="thinThick">
+            <a:solidFill>
+              <a:schemeClr val="tx1">
+                <a:lumMod val="75000"/>
+                <a:lumOff val="25000"/>
+              </a:schemeClr>
+            </a:solidFill>
+          </a:ln>
+        </p:spPr>
+        <p:style>
+          <a:lnRef idx="2">
+            <a:schemeClr val="accent1">
+              <a:shade val="50000"/>
+            </a:schemeClr>
+          </a:lnRef>
+          <a:fillRef idx="1">
+            <a:schemeClr val="accent1"/>
+          </a:fillRef>
+          <a:effectRef idx="0">
+            <a:schemeClr val="accent1"/>
+          </a:effectRef>
+          <a:fontRef idx="minor">
+            <a:schemeClr val="lt1"/>
+          </a:fontRef>
+        </p:style>
+        <p:txBody>
+          <a:bodyPr rtlCol="0" anchor="ctr"/>
+          <a:lstStyle/>
+          <a:p>
+            <a:pPr algn="ctr"/>
+            <a:endParaRPr lang="en-US"/>
+          </a:p>
+        </p:txBody>
+      </p:sp>
+      <p:sp>
+        <p:nvSpPr>
+          <p:cNvPr id="2" name="Title 1">
+            <a:extLst>
+              <a:ext uri="{FF2B5EF4-FFF2-40B4-BE49-F238E27FC236}">
+                <a16:creationId xmlns:a16="http://schemas.microsoft.com/office/drawing/2014/main" id="{3804E11A-783B-4DBF-A651-13A3F9410667}"/>
+              </a:ext>
+            </a:extLst>
+          </p:cNvPr>
+          <p:cNvSpPr>
+            <a:spLocks noGrp="1"/>
+          </p:cNvSpPr>
+          <p:nvPr>
+            <p:ph type="title"/>
+          </p:nvPr>
+        </p:nvSpPr>
+        <p:spPr>
+          <a:xfrm>
+            <a:off x="838200" y="631825"/>
+            <a:ext cx="10515600" cy="1325563"/>
+          </a:xfrm>
+        </p:spPr>
+        <p:txBody>
+          <a:bodyPr>
+            <a:normAutofit/>
+          </a:bodyPr>
+          <a:lstStyle/>
+          <a:p>
+            <a:r>
+              <a:rPr lang="en-US">
+                <a:solidFill>
+                  <a:schemeClr val="bg1"/>
+                </a:solidFill>
+              </a:rPr>
+              <a:t>DATE YYYY-MM-DD IOS</a:t>
+            </a:r>
+          </a:p>
+        </p:txBody>
+      </p:sp>
+      <p:cxnSp>
+        <p:nvCxnSpPr>
+          <p:cNvPr id="10" name="Straight Connector 9">
+            <a:extLst>
+              <a:ext uri="{FF2B5EF4-FFF2-40B4-BE49-F238E27FC236}">
+                <a16:creationId xmlns:a16="http://schemas.microsoft.com/office/drawing/2014/main" id="{E8E35B83-1EC3-4F87-9D54-D863463351B9}"/>
+              </a:ext>
+              <a:ext uri="{C183D7F6-B498-43B3-948B-1728B52AA6E4}">
+                <adec:decorative xmlns:adec="http://schemas.microsoft.com/office/drawing/2017/decorative" val="1"/>
+              </a:ext>
+            </a:extLst>
+          </p:cNvPr>
+          <p:cNvCxnSpPr>
+            <a:cxnSpLocks noGrp="1" noRot="1" noChangeAspect="1" noMove="1" noResize="1" noEditPoints="1" noAdjustHandles="1" noChangeArrowheads="1" noChangeShapeType="1"/>
+          </p:cNvCxnSpPr>
+          <p:nvPr>
+            <p:extLst>
+              <p:ext uri="{386F3935-93C4-4BCD-93E2-E3B085C9AB24}">
+                <p16:designElem xmlns:p16="http://schemas.microsoft.com/office/powerpoint/2015/main" val="1"/>
+              </p:ext>
+            </p:extLst>
+          </p:nvPr>
+        </p:nvCxnSpPr>
+        <p:spPr>
+          <a:xfrm>
+            <a:off x="897636" y="1957388"/>
+            <a:ext cx="10396728" cy="0"/>
+          </a:xfrm>
+          <a:prstGeom prst="line">
+            <a:avLst/>
+          </a:prstGeom>
+          <a:ln w="22225">
+            <a:solidFill>
+              <a:schemeClr val="bg1"/>
+            </a:solidFill>
+          </a:ln>
+        </p:spPr>
+        <p:style>
+          <a:lnRef idx="1">
+            <a:schemeClr val="accent1"/>
+          </a:lnRef>
+          <a:fillRef idx="0">
+            <a:schemeClr val="accent1"/>
+          </a:fillRef>
+          <a:effectRef idx="0">
+            <a:schemeClr val="accent1"/>
+          </a:effectRef>
+          <a:fontRef idx="minor">
+            <a:schemeClr val="tx1"/>
+          </a:fontRef>
+        </p:style>
+      </p:cxnSp>
+      <p:sp>
+        <p:nvSpPr>
+          <p:cNvPr id="3" name="Content Placeholder 2">
+            <a:extLst>
+              <a:ext uri="{FF2B5EF4-FFF2-40B4-BE49-F238E27FC236}">
+                <a16:creationId xmlns:a16="http://schemas.microsoft.com/office/drawing/2014/main" id="{205CAA97-126D-498B-ACE9-2C9D9DC996AF}"/>
+              </a:ext>
+            </a:extLst>
+          </p:cNvPr>
+          <p:cNvSpPr>
+            <a:spLocks noGrp="1"/>
+          </p:cNvSpPr>
+          <p:nvPr>
+            <p:ph idx="1"/>
+          </p:nvPr>
+        </p:nvSpPr>
+        <p:spPr>
+          <a:xfrm>
+            <a:off x="838200" y="2269173"/>
+            <a:ext cx="10515600" cy="3659988"/>
+          </a:xfrm>
+        </p:spPr>
+        <p:txBody>
+          <a:bodyPr>
+            <a:normAutofit/>
+          </a:bodyPr>
+          <a:lstStyle/>
+          <a:p>
+            <a:r>
+              <a:rPr lang="en-US" sz="2200">
+                <a:solidFill>
+                  <a:schemeClr val="bg1"/>
+                </a:solidFill>
+                <a:latin typeface="Courier New" panose="02070309020205020404" pitchFamily="49" charset="0"/>
+                <a:cs typeface="Courier New" panose="02070309020205020404" pitchFamily="49" charset="0"/>
+              </a:rPr>
+              <a:t>The </a:t>
+            </a:r>
+            <a:r>
+              <a:rPr lang="en-US" sz="2200" u="sng">
+                <a:solidFill>
+                  <a:schemeClr val="bg1"/>
+                </a:solidFill>
+                <a:latin typeface="Courier New" panose="02070309020205020404" pitchFamily="49" charset="0"/>
+                <a:cs typeface="Courier New" panose="02070309020205020404" pitchFamily="49" charset="0"/>
+                <a:hlinkClick r:id="rId2"/>
+              </a:rPr>
+              <a:t>International Organization for Standardization</a:t>
+            </a:r>
+            <a:r>
+              <a:rPr lang="en-US" sz="2200">
+                <a:solidFill>
+                  <a:schemeClr val="bg1"/>
+                </a:solidFill>
+                <a:latin typeface="Courier New" panose="02070309020205020404" pitchFamily="49" charset="0"/>
+                <a:cs typeface="Courier New" panose="02070309020205020404" pitchFamily="49" charset="0"/>
+              </a:rPr>
+              <a:t> (ISO) date format is a standard way to express a numeric calendar date that eliminates ambiguity. </a:t>
+            </a:r>
+          </a:p>
+          <a:p>
+            <a:r>
+              <a:rPr lang="en-US" sz="2200">
+                <a:solidFill>
+                  <a:schemeClr val="bg1"/>
+                </a:solidFill>
+                <a:latin typeface="Courier New" panose="02070309020205020404" pitchFamily="49" charset="0"/>
+                <a:cs typeface="Courier New" panose="02070309020205020404" pitchFamily="49" charset="0"/>
+              </a:rPr>
+              <a:t>ISO 8601 provides a standard cross-national approach that says: A general-to-specific approach, forming a date that is easier to process - thus, the year first, followed by month, then day</a:t>
+            </a:r>
+          </a:p>
+          <a:p>
+            <a:r>
+              <a:rPr lang="en-US" sz="2200">
+                <a:solidFill>
+                  <a:schemeClr val="bg1"/>
+                </a:solidFill>
+                <a:latin typeface="Courier New" panose="02070309020205020404" pitchFamily="49" charset="0"/>
+                <a:cs typeface="Courier New" panose="02070309020205020404" pitchFamily="49" charset="0"/>
+              </a:rPr>
+              <a:t>With each separated by a hyphen ("-")</a:t>
+            </a:r>
+          </a:p>
+          <a:p>
+            <a:r>
+              <a:rPr lang="en-US" sz="2200">
+                <a:solidFill>
+                  <a:schemeClr val="bg1"/>
+                </a:solidFill>
+                <a:latin typeface="Courier New" panose="02070309020205020404" pitchFamily="49" charset="0"/>
+                <a:cs typeface="Courier New" panose="02070309020205020404" pitchFamily="49" charset="0"/>
+              </a:rPr>
+              <a:t>Numbers less than 10 preceded by a leading zero</a:t>
+            </a:r>
+          </a:p>
+        </p:txBody>
+      </p:sp>
+    </p:spTree>
+    <p:extLst>
+      <p:ext uri="{BB962C8B-B14F-4D97-AF65-F5344CB8AC3E}">
+        <p14:creationId xmlns:p14="http://schemas.microsoft.com/office/powerpoint/2010/main" val="53601909"/>
+      </p:ext>
+    </p:extLst>
+  </p:cSld>
+  <p:clrMapOvr>
+    <a:masterClrMapping/>
+  </p:clrMapOvr>
+</p:sld>
+</file>
+
+<file path=ppt/slides/slide40.xml><?xml version="1.0" encoding="utf-8"?>
+<p:sld xmlns:a="http://schemas.openxmlformats.org/drawingml/2006/main" xmlns:r="http://schemas.openxmlformats.org/officeDocument/2006/relationships" xmlns:p="http://schemas.openxmlformats.org/presentationml/2006/main">
+  <p:cSld>
+    <p:spTree>
+      <p:nvGrpSpPr>
+        <p:cNvPr id="1" name=""/>
+        <p:cNvGrpSpPr/>
+        <p:nvPr/>
+      </p:nvGrpSpPr>
+      <p:grpSpPr>
+        <a:xfrm>
+          <a:off x="0" y="0"/>
+          <a:ext cx="0" cy="0"/>
+          <a:chOff x="0" y="0"/>
+          <a:chExt cx="0" cy="0"/>
+        </a:xfrm>
+      </p:grpSpPr>
+      <p:sp>
+        <p:nvSpPr>
+          <p:cNvPr id="2" name="Title 1">
+            <a:extLst>
+              <a:ext uri="{FF2B5EF4-FFF2-40B4-BE49-F238E27FC236}">
+                <a16:creationId xmlns:a16="http://schemas.microsoft.com/office/drawing/2014/main" id="{FC21EBD1-43B3-4D3D-9FC3-42E2C7DC3319}"/>
+              </a:ext>
+            </a:extLst>
+          </p:cNvPr>
+          <p:cNvSpPr>
+            <a:spLocks noGrp="1"/>
+          </p:cNvSpPr>
+          <p:nvPr>
+            <p:ph type="title"/>
+          </p:nvPr>
+        </p:nvSpPr>
+        <p:spPr/>
+        <p:txBody>
+          <a:bodyPr/>
+          <a:lstStyle/>
+          <a:p>
+            <a:r>
+              <a:rPr lang="en-US"/>
+              <a:t>DATE_PART(field,source)</a:t>
+            </a:r>
             <a:br>
-              <a:rPr lang="en-US" dirty="0"/>
+              <a:rPr lang="en-US"/>
             </a:br>
             <a:endParaRPr lang="en-US" dirty="0"/>
           </a:p>
@@ -13051,7 +13978,7 @@
           <a:lstStyle/>
           <a:p>
             <a:r>
-              <a:rPr lang="en-US" dirty="0"/>
+              <a:rPr lang="en-US"/>
               <a:t> </a:t>
             </a:r>
           </a:p>
@@ -13060,23 +13987,23 @@
               <a:buAutoNum type="arabicParenR"/>
             </a:pPr>
             <a:r>
-              <a:rPr lang="en-US" dirty="0"/>
+              <a:rPr lang="en-US"/>
               <a:t>The field is an identifier that determines what field to </a:t>
             </a:r>
             <a:r>
-              <a:rPr lang="en-US" b="1" dirty="0"/>
+              <a:rPr lang="en-US" b="1"/>
               <a:t>extract</a:t>
             </a:r>
             <a:r>
-              <a:rPr lang="en-US" dirty="0"/>
+              <a:rPr lang="en-US"/>
               <a:t> from the source, full list on </a:t>
             </a:r>
             <a:r>
-              <a:rPr lang="en-US" b="1" dirty="0"/>
+              <a:rPr lang="en-US" b="1"/>
               <a:t>slide 9</a:t>
             </a:r>
             <a:r>
-              <a:rPr lang="en-US" dirty="0"/>
+              <a:rPr lang="en-US"/>
               <a:t>. </a:t>
             </a:r>
           </a:p>
@@ -13085,9 +14012,10 @@
               <a:buAutoNum type="arabicParenR"/>
             </a:pPr>
             <a:r>
-              <a:rPr lang="en-US" dirty="0"/>
+              <a:rPr lang="en-US"/>
               <a:t>The source is a value of type TIMESTAMP or INTERVAL. If you pass a DATE value, the function will cast it to a TIMESTAMP value</a:t>
             </a:r>
+            <a:endParaRPr lang="en-US" dirty="0"/>
           </a:p>
         </p:txBody>
       </p:sp>
@@ -13165,7 +14093,7 @@
               </a:spcAft>
             </a:pPr>
             <a:r>
-              <a:rPr lang="en-US" altLang="en-US" sz="900" dirty="0">
+              <a:rPr lang="en-US" altLang="en-US" sz="900">
                 <a:solidFill>
                   <a:srgbClr val="242729"/>
                 </a:solidFill>
@@ -13199,7 +14127,7 @@
 </p:sld>
 </file>
 
-<file path=ppt/slides/slide39.xml><?xml version="1.0" encoding="utf-8"?>
+<file path=ppt/slides/slide41.xml><?xml version="1.0" encoding="utf-8"?>
 <p:sld xmlns:a="http://schemas.openxmlformats.org/drawingml/2006/main" xmlns:r="http://schemas.openxmlformats.org/officeDocument/2006/relationships" xmlns:p="http://schemas.openxmlformats.org/presentationml/2006/main">
   <p:cSld>
     <p:bg>
@@ -13417,305 +14345,7 @@
 </p:sld>
 </file>
 
-<file path=ppt/slides/slide4.xml><?xml version="1.0" encoding="utf-8"?>
-<p:sld xmlns:a="http://schemas.openxmlformats.org/drawingml/2006/main" xmlns:r="http://schemas.openxmlformats.org/officeDocument/2006/relationships" xmlns:p="http://schemas.openxmlformats.org/presentationml/2006/main">
-  <p:cSld>
-    <p:bg>
-      <p:bgPr>
-        <a:solidFill>
-          <a:schemeClr val="bg1"/>
-        </a:solidFill>
-        <a:effectLst/>
-      </p:bgPr>
-    </p:bg>
-    <p:spTree>
-      <p:nvGrpSpPr>
-        <p:cNvPr id="1" name=""/>
-        <p:cNvGrpSpPr/>
-        <p:nvPr/>
-      </p:nvGrpSpPr>
-      <p:grpSpPr>
-        <a:xfrm>
-          <a:off x="0" y="0"/>
-          <a:ext cx="0" cy="0"/>
-          <a:chOff x="0" y="0"/>
-          <a:chExt cx="0" cy="0"/>
-        </a:xfrm>
-      </p:grpSpPr>
-      <p:sp>
-        <p:nvSpPr>
-          <p:cNvPr id="8" name="Rectangle 7">
-            <a:extLst>
-              <a:ext uri="{FF2B5EF4-FFF2-40B4-BE49-F238E27FC236}">
-                <a16:creationId xmlns:a16="http://schemas.microsoft.com/office/drawing/2014/main" id="{F98ED85F-DCEE-4B50-802E-71A6E3E12B04}"/>
-              </a:ext>
-              <a:ext uri="{C183D7F6-B498-43B3-948B-1728B52AA6E4}">
-                <adec:decorative xmlns:adec="http://schemas.microsoft.com/office/drawing/2017/decorative" val="1"/>
-              </a:ext>
-            </a:extLst>
-          </p:cNvPr>
-          <p:cNvSpPr>
-            <a:spLocks noGrp="1" noRot="1" noChangeAspect="1" noMove="1" noResize="1" noEditPoints="1" noAdjustHandles="1" noChangeArrowheads="1" noChangeShapeType="1" noTextEdit="1"/>
-          </p:cNvSpPr>
-          <p:nvPr>
-            <p:extLst>
-              <p:ext uri="{386F3935-93C4-4BCD-93E2-E3B085C9AB24}">
-                <p16:designElem xmlns:p16="http://schemas.microsoft.com/office/powerpoint/2015/main" val="1"/>
-              </p:ext>
-            </p:extLst>
-          </p:nvPr>
-        </p:nvSpPr>
-        <p:spPr bwMode="ltGray">
-          <a:xfrm>
-            <a:off x="321564" y="320040"/>
-            <a:ext cx="11548872" cy="6217920"/>
-          </a:xfrm>
-          <a:prstGeom prst="rect">
-            <a:avLst/>
-          </a:prstGeom>
-          <a:solidFill>
-            <a:schemeClr val="tx1">
-              <a:lumMod val="75000"/>
-              <a:lumOff val="25000"/>
-            </a:schemeClr>
-          </a:solidFill>
-          <a:ln w="127000" cap="sq" cmpd="thinThick">
-            <a:solidFill>
-              <a:schemeClr val="tx1">
-                <a:lumMod val="75000"/>
-                <a:lumOff val="25000"/>
-              </a:schemeClr>
-            </a:solidFill>
-          </a:ln>
-        </p:spPr>
-        <p:style>
-          <a:lnRef idx="2">
-            <a:schemeClr val="accent1">
-              <a:shade val="50000"/>
-            </a:schemeClr>
-          </a:lnRef>
-          <a:fillRef idx="1">
-            <a:schemeClr val="accent1"/>
-          </a:fillRef>
-          <a:effectRef idx="0">
-            <a:schemeClr val="accent1"/>
-          </a:effectRef>
-          <a:fontRef idx="minor">
-            <a:schemeClr val="lt1"/>
-          </a:fontRef>
-        </p:style>
-        <p:txBody>
-          <a:bodyPr rtlCol="0" anchor="ctr"/>
-          <a:lstStyle/>
-          <a:p>
-            <a:pPr algn="ctr"/>
-            <a:endParaRPr lang="en-US"/>
-          </a:p>
-        </p:txBody>
-      </p:sp>
-      <p:sp>
-        <p:nvSpPr>
-          <p:cNvPr id="2" name="Title 1">
-            <a:extLst>
-              <a:ext uri="{FF2B5EF4-FFF2-40B4-BE49-F238E27FC236}">
-                <a16:creationId xmlns:a16="http://schemas.microsoft.com/office/drawing/2014/main" id="{3804E11A-783B-4DBF-A651-13A3F9410667}"/>
-              </a:ext>
-            </a:extLst>
-          </p:cNvPr>
-          <p:cNvSpPr>
-            <a:spLocks noGrp="1"/>
-          </p:cNvSpPr>
-          <p:nvPr>
-            <p:ph type="title"/>
-          </p:nvPr>
-        </p:nvSpPr>
-        <p:spPr>
-          <a:xfrm>
-            <a:off x="838200" y="631825"/>
-            <a:ext cx="10515600" cy="1325563"/>
-          </a:xfrm>
-        </p:spPr>
-        <p:txBody>
-          <a:bodyPr>
-            <a:normAutofit/>
-          </a:bodyPr>
-          <a:lstStyle/>
-          <a:p>
-            <a:r>
-              <a:rPr lang="en-US">
-                <a:solidFill>
-                  <a:schemeClr val="bg1"/>
-                </a:solidFill>
-              </a:rPr>
-              <a:t>DATE YYYY-MM-DD IOS</a:t>
-            </a:r>
-          </a:p>
-        </p:txBody>
-      </p:sp>
-      <p:cxnSp>
-        <p:nvCxnSpPr>
-          <p:cNvPr id="10" name="Straight Connector 9">
-            <a:extLst>
-              <a:ext uri="{FF2B5EF4-FFF2-40B4-BE49-F238E27FC236}">
-                <a16:creationId xmlns:a16="http://schemas.microsoft.com/office/drawing/2014/main" id="{E8E35B83-1EC3-4F87-9D54-D863463351B9}"/>
-              </a:ext>
-              <a:ext uri="{C183D7F6-B498-43B3-948B-1728B52AA6E4}">
-                <adec:decorative xmlns:adec="http://schemas.microsoft.com/office/drawing/2017/decorative" val="1"/>
-              </a:ext>
-            </a:extLst>
-          </p:cNvPr>
-          <p:cNvCxnSpPr>
-            <a:cxnSpLocks noGrp="1" noRot="1" noChangeAspect="1" noMove="1" noResize="1" noEditPoints="1" noAdjustHandles="1" noChangeArrowheads="1" noChangeShapeType="1"/>
-          </p:cNvCxnSpPr>
-          <p:nvPr>
-            <p:extLst>
-              <p:ext uri="{386F3935-93C4-4BCD-93E2-E3B085C9AB24}">
-                <p16:designElem xmlns:p16="http://schemas.microsoft.com/office/powerpoint/2015/main" val="1"/>
-              </p:ext>
-            </p:extLst>
-          </p:nvPr>
-        </p:nvCxnSpPr>
-        <p:spPr>
-          <a:xfrm>
-            <a:off x="897636" y="1957388"/>
-            <a:ext cx="10396728" cy="0"/>
-          </a:xfrm>
-          <a:prstGeom prst="line">
-            <a:avLst/>
-          </a:prstGeom>
-          <a:ln w="22225">
-            <a:solidFill>
-              <a:schemeClr val="bg1"/>
-            </a:solidFill>
-          </a:ln>
-        </p:spPr>
-        <p:style>
-          <a:lnRef idx="1">
-            <a:schemeClr val="accent1"/>
-          </a:lnRef>
-          <a:fillRef idx="0">
-            <a:schemeClr val="accent1"/>
-          </a:fillRef>
-          <a:effectRef idx="0">
-            <a:schemeClr val="accent1"/>
-          </a:effectRef>
-          <a:fontRef idx="minor">
-            <a:schemeClr val="tx1"/>
-          </a:fontRef>
-        </p:style>
-      </p:cxnSp>
-      <p:sp>
-        <p:nvSpPr>
-          <p:cNvPr id="3" name="Content Placeholder 2">
-            <a:extLst>
-              <a:ext uri="{FF2B5EF4-FFF2-40B4-BE49-F238E27FC236}">
-                <a16:creationId xmlns:a16="http://schemas.microsoft.com/office/drawing/2014/main" id="{205CAA97-126D-498B-ACE9-2C9D9DC996AF}"/>
-              </a:ext>
-            </a:extLst>
-          </p:cNvPr>
-          <p:cNvSpPr>
-            <a:spLocks noGrp="1"/>
-          </p:cNvSpPr>
-          <p:nvPr>
-            <p:ph idx="1"/>
-          </p:nvPr>
-        </p:nvSpPr>
-        <p:spPr>
-          <a:xfrm>
-            <a:off x="838200" y="2269173"/>
-            <a:ext cx="10515600" cy="3659988"/>
-          </a:xfrm>
-        </p:spPr>
-        <p:txBody>
-          <a:bodyPr>
-            <a:normAutofit/>
-          </a:bodyPr>
-          <a:lstStyle/>
-          <a:p>
-            <a:r>
-              <a:rPr lang="en-US" sz="2200">
-                <a:solidFill>
-                  <a:schemeClr val="bg1"/>
-                </a:solidFill>
-                <a:latin typeface="Courier New" panose="02070309020205020404" pitchFamily="49" charset="0"/>
-                <a:cs typeface="Courier New" panose="02070309020205020404" pitchFamily="49" charset="0"/>
-              </a:rPr>
-              <a:t>The </a:t>
-            </a:r>
-            <a:r>
-              <a:rPr lang="en-US" sz="2200" u="sng">
-                <a:solidFill>
-                  <a:schemeClr val="bg1"/>
-                </a:solidFill>
-                <a:latin typeface="Courier New" panose="02070309020205020404" pitchFamily="49" charset="0"/>
-                <a:cs typeface="Courier New" panose="02070309020205020404" pitchFamily="49" charset="0"/>
-                <a:hlinkClick r:id="rId2"/>
-              </a:rPr>
-              <a:t>International Organization for Standardization</a:t>
-            </a:r>
-            <a:r>
-              <a:rPr lang="en-US" sz="2200">
-                <a:solidFill>
-                  <a:schemeClr val="bg1"/>
-                </a:solidFill>
-                <a:latin typeface="Courier New" panose="02070309020205020404" pitchFamily="49" charset="0"/>
-                <a:cs typeface="Courier New" panose="02070309020205020404" pitchFamily="49" charset="0"/>
-              </a:rPr>
-              <a:t> (ISO) date format is a standard way to express a numeric calendar date that eliminates ambiguity. </a:t>
-            </a:r>
-          </a:p>
-          <a:p>
-            <a:r>
-              <a:rPr lang="en-US" sz="2200">
-                <a:solidFill>
-                  <a:schemeClr val="bg1"/>
-                </a:solidFill>
-                <a:latin typeface="Courier New" panose="02070309020205020404" pitchFamily="49" charset="0"/>
-                <a:cs typeface="Courier New" panose="02070309020205020404" pitchFamily="49" charset="0"/>
-              </a:rPr>
-              <a:t>ISO 8601 provides a standard cross-national approach that says: A general-to-specific approach, forming a date that is easier to process - thus, the year first, followed by month, then day</a:t>
-            </a:r>
-          </a:p>
-          <a:p>
-            <a:r>
-              <a:rPr lang="en-US" sz="2200">
-                <a:solidFill>
-                  <a:schemeClr val="bg1"/>
-                </a:solidFill>
-                <a:latin typeface="Courier New" panose="02070309020205020404" pitchFamily="49" charset="0"/>
-                <a:cs typeface="Courier New" panose="02070309020205020404" pitchFamily="49" charset="0"/>
-              </a:rPr>
-              <a:t>With each separated by a hyphen ("-")</a:t>
-            </a:r>
-          </a:p>
-          <a:p>
-            <a:r>
-              <a:rPr lang="en-US" sz="2200">
-                <a:solidFill>
-                  <a:schemeClr val="bg1"/>
-                </a:solidFill>
-                <a:latin typeface="Courier New" panose="02070309020205020404" pitchFamily="49" charset="0"/>
-                <a:cs typeface="Courier New" panose="02070309020205020404" pitchFamily="49" charset="0"/>
-              </a:rPr>
-              <a:t>Numbers less than 10 preceded by a leading zero</a:t>
-            </a:r>
-          </a:p>
-        </p:txBody>
-      </p:sp>
-    </p:spTree>
-    <p:extLst>
-      <p:ext uri="{BB962C8B-B14F-4D97-AF65-F5344CB8AC3E}">
-        <p14:creationId xmlns:p14="http://schemas.microsoft.com/office/powerpoint/2010/main" val="53601909"/>
-      </p:ext>
-    </p:extLst>
-  </p:cSld>
-  <p:clrMapOvr>
-    <a:masterClrMapping/>
-  </p:clrMapOvr>
-</p:sld>
-</file>
-
-<file path=ppt/slides/slide40.xml><?xml version="1.0" encoding="utf-8"?>
+<file path=ppt/slides/slide42.xml><?xml version="1.0" encoding="utf-8"?>
 <p:sld xmlns:a="http://schemas.openxmlformats.org/drawingml/2006/main" xmlns:r="http://schemas.openxmlformats.org/officeDocument/2006/relationships" xmlns:p="http://schemas.openxmlformats.org/presentationml/2006/main">
   <p:cSld>
     <p:spTree>
@@ -13737,98 +14367,6 @@
           <p:cNvPr id="2" name="Title 1">
             <a:extLst>
               <a:ext uri="{FF2B5EF4-FFF2-40B4-BE49-F238E27FC236}">
-                <a16:creationId xmlns:a16="http://schemas.microsoft.com/office/drawing/2014/main" id="{302002FC-FB2F-4BAC-9B5C-B4298F9103F7}"/>
-              </a:ext>
-            </a:extLst>
-          </p:cNvPr>
-          <p:cNvSpPr>
-            <a:spLocks noGrp="1"/>
-          </p:cNvSpPr>
-          <p:nvPr>
-            <p:ph type="title"/>
-          </p:nvPr>
-        </p:nvSpPr>
-        <p:spPr/>
-        <p:txBody>
-          <a:bodyPr>
-            <a:normAutofit/>
-          </a:bodyPr>
-          <a:lstStyle/>
-          <a:p>
-            <a:r>
-              <a:rPr lang="en-US" dirty="0" err="1"/>
-              <a:t>date_trunc</a:t>
-            </a:r>
-            <a:r>
-              <a:rPr lang="en-US" dirty="0"/>
-              <a:t>()</a:t>
-            </a:r>
-          </a:p>
-        </p:txBody>
-      </p:sp>
-      <p:sp>
-        <p:nvSpPr>
-          <p:cNvPr id="3" name="Content Placeholder 2">
-            <a:extLst>
-              <a:ext uri="{FF2B5EF4-FFF2-40B4-BE49-F238E27FC236}">
-                <a16:creationId xmlns:a16="http://schemas.microsoft.com/office/drawing/2014/main" id="{09D65C79-5B4C-4B78-976D-D4EFC4796C4F}"/>
-              </a:ext>
-            </a:extLst>
-          </p:cNvPr>
-          <p:cNvSpPr>
-            <a:spLocks noGrp="1"/>
-          </p:cNvSpPr>
-          <p:nvPr>
-            <p:ph idx="1"/>
-          </p:nvPr>
-        </p:nvSpPr>
-        <p:spPr/>
-        <p:txBody>
-          <a:bodyPr/>
-          <a:lstStyle/>
-          <a:p>
-            <a:r>
-              <a:rPr lang="en-US" dirty="0"/>
-              <a:t>function to truncate a timestamp or interval to a specified level of precision.</a:t>
-            </a:r>
-          </a:p>
-        </p:txBody>
-      </p:sp>
-    </p:spTree>
-    <p:extLst>
-      <p:ext uri="{BB962C8B-B14F-4D97-AF65-F5344CB8AC3E}">
-        <p14:creationId xmlns:p14="http://schemas.microsoft.com/office/powerpoint/2010/main" val="2535521995"/>
-      </p:ext>
-    </p:extLst>
-  </p:cSld>
-  <p:clrMapOvr>
-    <a:masterClrMapping/>
-  </p:clrMapOvr>
-</p:sld>
-</file>
-
-<file path=ppt/slides/slide41.xml><?xml version="1.0" encoding="utf-8"?>
-<p:sld xmlns:a="http://schemas.openxmlformats.org/drawingml/2006/main" xmlns:r="http://schemas.openxmlformats.org/officeDocument/2006/relationships" xmlns:p="http://schemas.openxmlformats.org/presentationml/2006/main">
-  <p:cSld>
-    <p:spTree>
-      <p:nvGrpSpPr>
-        <p:cNvPr id="1" name=""/>
-        <p:cNvGrpSpPr/>
-        <p:nvPr/>
-      </p:nvGrpSpPr>
-      <p:grpSpPr>
-        <a:xfrm>
-          <a:off x="0" y="0"/>
-          <a:ext cx="0" cy="0"/>
-          <a:chOff x="0" y="0"/>
-          <a:chExt cx="0" cy="0"/>
-        </a:xfrm>
-      </p:grpSpPr>
-      <p:sp>
-        <p:nvSpPr>
-          <p:cNvPr id="2" name="Title 1">
-            <a:extLst>
-              <a:ext uri="{FF2B5EF4-FFF2-40B4-BE49-F238E27FC236}">
                 <a16:creationId xmlns:a16="http://schemas.microsoft.com/office/drawing/2014/main" id="{FC21EBD1-43B3-4D3D-9FC3-42E2C7DC3319}"/>
               </a:ext>
             </a:extLst>
@@ -13846,8 +14384,12 @@
           <a:lstStyle/>
           <a:p>
             <a:r>
+              <a:rPr lang="en-US" dirty="0" err="1"/>
+              <a:t>date_trunc</a:t>
+            </a:r>
+            <a:r>
               <a:rPr lang="en-US" dirty="0"/>
-              <a:t>DATE_TRUNC('</a:t>
+              <a:t>('</a:t>
             </a:r>
             <a:r>
               <a:rPr lang="en-US" dirty="0" err="1"/>
@@ -13878,8 +14420,8 @@
         </p:nvSpPr>
         <p:spPr>
           <a:xfrm>
-            <a:off x="838200" y="1497319"/>
-            <a:ext cx="10515599" cy="1754326"/>
+            <a:off x="867054" y="1506895"/>
+            <a:ext cx="10515599" cy="2031325"/>
           </a:xfrm>
           <a:prstGeom prst="rect">
             <a:avLst/>
@@ -13898,19 +14440,29 @@
           </a:p>
           <a:p>
             <a:pPr marL="342900" indent="-342900">
+              <a:buFontTx/>
               <a:buAutoNum type="arabicParenR"/>
             </a:pPr>
             <a:r>
               <a:rPr lang="en-US" dirty="0"/>
-              <a:t>The field is an identifier that determines what field to </a:t>
+              <a:t>Truncates a timestamp or interval to a specified level of precision.</a:t>
+            </a:r>
+          </a:p>
+          <a:p>
+            <a:pPr marL="342900" indent="-342900">
+              <a:buAutoNum type="arabicParenR"/>
+            </a:pPr>
+            <a:r>
+              <a:rPr lang="en-US" dirty="0"/>
+              <a:t>The field is an identifier that determines what </a:t>
             </a:r>
             <a:r>
               <a:rPr lang="en-US" b="1" dirty="0"/>
-              <a:t>extract</a:t>
+              <a:t>field</a:t>
             </a:r>
             <a:r>
               <a:rPr lang="en-US" dirty="0"/>
-              <a:t> from the source, full list on </a:t>
+              <a:t> to extract from the source, full list on </a:t>
             </a:r>
             <a:r>
               <a:rPr lang="en-US" b="1" dirty="0"/>
@@ -14055,7 +14607,7 @@
         </p:nvSpPr>
         <p:spPr>
           <a:xfrm>
-            <a:off x="2296160" y="3374755"/>
+            <a:off x="2791460" y="3815219"/>
             <a:ext cx="3108960" cy="2677656"/>
           </a:xfrm>
           <a:prstGeom prst="rect">
@@ -14151,7 +14703,7 @@
         </p:nvSpPr>
         <p:spPr>
           <a:xfrm>
-            <a:off x="6786882" y="3374755"/>
+            <a:off x="7282182" y="3815219"/>
             <a:ext cx="2589170" cy="2923877"/>
           </a:xfrm>
           <a:prstGeom prst="rect">
@@ -14256,7 +14808,7 @@
 </p:sld>
 </file>
 
-<file path=ppt/slides/slide42.xml><?xml version="1.0" encoding="utf-8"?>
+<file path=ppt/slides/slide43.xml><?xml version="1.0" encoding="utf-8"?>
 <p:sld xmlns:a="http://schemas.openxmlformats.org/drawingml/2006/main" xmlns:r="http://schemas.openxmlformats.org/officeDocument/2006/relationships" xmlns:p="http://schemas.openxmlformats.org/presentationml/2006/main">
   <p:cSld>
     <p:bg>
@@ -14638,7 +15190,7 @@
 </p:sld>
 </file>
 
-<file path=ppt/slides/slide43.xml><?xml version="1.0" encoding="utf-8"?>
+<file path=ppt/slides/slide44.xml><?xml version="1.0" encoding="utf-8"?>
 <p:sld xmlns:a="http://schemas.openxmlformats.org/drawingml/2006/main" xmlns:r="http://schemas.openxmlformats.org/officeDocument/2006/relationships" xmlns:p="http://schemas.openxmlformats.org/presentationml/2006/main">
   <p:cSld>
     <p:bg>
@@ -14856,86 +15408,6 @@
 </p:sld>
 </file>
 
-<file path=ppt/slides/slide44.xml><?xml version="1.0" encoding="utf-8"?>
-<p:sld xmlns:a="http://schemas.openxmlformats.org/drawingml/2006/main" xmlns:r="http://schemas.openxmlformats.org/officeDocument/2006/relationships" xmlns:p="http://schemas.openxmlformats.org/presentationml/2006/main">
-  <p:cSld>
-    <p:spTree>
-      <p:nvGrpSpPr>
-        <p:cNvPr id="1" name=""/>
-        <p:cNvGrpSpPr/>
-        <p:nvPr/>
-      </p:nvGrpSpPr>
-      <p:grpSpPr>
-        <a:xfrm>
-          <a:off x="0" y="0"/>
-          <a:ext cx="0" cy="0"/>
-          <a:chOff x="0" y="0"/>
-          <a:chExt cx="0" cy="0"/>
-        </a:xfrm>
-      </p:grpSpPr>
-      <p:sp>
-        <p:nvSpPr>
-          <p:cNvPr id="2" name="Title 1">
-            <a:extLst>
-              <a:ext uri="{FF2B5EF4-FFF2-40B4-BE49-F238E27FC236}">
-                <a16:creationId xmlns:a16="http://schemas.microsoft.com/office/drawing/2014/main" id="{1E963E69-AE1D-454B-B136-FEF2084254A6}"/>
-              </a:ext>
-            </a:extLst>
-          </p:cNvPr>
-          <p:cNvSpPr>
-            <a:spLocks noGrp="1"/>
-          </p:cNvSpPr>
-          <p:nvPr>
-            <p:ph type="title"/>
-          </p:nvPr>
-        </p:nvSpPr>
-        <p:spPr/>
-        <p:txBody>
-          <a:bodyPr/>
-          <a:lstStyle/>
-          <a:p>
-            <a:endParaRPr lang="en-US"/>
-          </a:p>
-        </p:txBody>
-      </p:sp>
-      <p:sp>
-        <p:nvSpPr>
-          <p:cNvPr id="3" name="Content Placeholder 2">
-            <a:extLst>
-              <a:ext uri="{FF2B5EF4-FFF2-40B4-BE49-F238E27FC236}">
-                <a16:creationId xmlns:a16="http://schemas.microsoft.com/office/drawing/2014/main" id="{F0B0100F-4394-405E-A339-8E66B73DBBF4}"/>
-              </a:ext>
-            </a:extLst>
-          </p:cNvPr>
-          <p:cNvSpPr>
-            <a:spLocks noGrp="1"/>
-          </p:cNvSpPr>
-          <p:nvPr>
-            <p:ph idx="1"/>
-          </p:nvPr>
-        </p:nvSpPr>
-        <p:spPr/>
-        <p:txBody>
-          <a:bodyPr/>
-          <a:lstStyle/>
-          <a:p>
-            <a:endParaRPr lang="en-US"/>
-          </a:p>
-        </p:txBody>
-      </p:sp>
-    </p:spTree>
-    <p:extLst>
-      <p:ext uri="{BB962C8B-B14F-4D97-AF65-F5344CB8AC3E}">
-        <p14:creationId xmlns:p14="http://schemas.microsoft.com/office/powerpoint/2010/main" val="1504891247"/>
-      </p:ext>
-    </p:extLst>
-  </p:cSld>
-  <p:clrMapOvr>
-    <a:masterClrMapping/>
-  </p:clrMapOvr>
-</p:sld>
-</file>
-
 <file path=ppt/slides/slide45.xml><?xml version="1.0" encoding="utf-8"?>
 <p:sld xmlns:a="http://schemas.openxmlformats.org/drawingml/2006/main" xmlns:r="http://schemas.openxmlformats.org/officeDocument/2006/relationships" xmlns:p="http://schemas.openxmlformats.org/presentationml/2006/main">
   <p:cSld>
@@ -15127,7 +15599,7 @@
           <p:cNvPr id="2" name="Title 1">
             <a:extLst>
               <a:ext uri="{FF2B5EF4-FFF2-40B4-BE49-F238E27FC236}">
-                <a16:creationId xmlns:a16="http://schemas.microsoft.com/office/drawing/2014/main" id="{BA8D3534-B43F-4916-8BEC-854D97E9EFAB}"/>
+                <a16:creationId xmlns:a16="http://schemas.microsoft.com/office/drawing/2014/main" id="{20288032-0A35-4119-9DC7-22FA6B8E9797}"/>
               </a:ext>
             </a:extLst>
           </p:cNvPr>
@@ -15138,12 +15610,22 @@
             <p:ph type="title"/>
           </p:nvPr>
         </p:nvSpPr>
-        <p:spPr/>
+        <p:spPr>
+          <a:solidFill>
+            <a:schemeClr val="accent6">
+              <a:lumMod val="60000"/>
+              <a:lumOff val="40000"/>
+            </a:schemeClr>
+          </a:solidFill>
+        </p:spPr>
         <p:txBody>
           <a:bodyPr/>
           <a:lstStyle/>
           <a:p>
-            <a:endParaRPr lang="en-US"/>
+            <a:r>
+              <a:rPr lang="en-US" dirty="0"/>
+              <a:t>What time is it?</a:t>
+            </a:r>
           </a:p>
         </p:txBody>
       </p:sp>
@@ -15152,7 +15634,7 @@
           <p:cNvPr id="3" name="Content Placeholder 2">
             <a:extLst>
               <a:ext uri="{FF2B5EF4-FFF2-40B4-BE49-F238E27FC236}">
-                <a16:creationId xmlns:a16="http://schemas.microsoft.com/office/drawing/2014/main" id="{648CA31F-23A0-426E-A0F1-3D716C7F5916}"/>
+                <a16:creationId xmlns:a16="http://schemas.microsoft.com/office/drawing/2014/main" id="{8656073D-84FA-4E86-8A41-365BD88E422A}"/>
               </a:ext>
             </a:extLst>
           </p:cNvPr>
@@ -15165,62 +15647,112 @@
         </p:nvSpPr>
         <p:spPr/>
         <p:txBody>
-          <a:bodyPr/>
+          <a:bodyPr>
+            <a:normAutofit fontScale="92500" lnSpcReduction="20000"/>
+          </a:bodyPr>
           <a:lstStyle/>
           <a:p>
             <a:r>
+              <a:rPr lang="en-US" dirty="0" err="1"/>
+              <a:t>clock_timestamp</a:t>
+            </a:r>
+            <a:r>
+              <a:rPr lang="en-US" dirty="0"/>
+              <a:t>() </a:t>
+            </a:r>
+          </a:p>
+          <a:p>
+            <a:r>
+              <a:rPr lang="en-US" dirty="0" err="1"/>
+              <a:t>current_date</a:t>
+            </a:r>
+            <a:endParaRPr lang="en-US" dirty="0"/>
+          </a:p>
+          <a:p>
+            <a:r>
+              <a:rPr lang="en-US" dirty="0" err="1"/>
+              <a:t>current_time</a:t>
+            </a:r>
+            <a:endParaRPr lang="en-US" dirty="0"/>
+          </a:p>
+          <a:p>
+            <a:r>
+              <a:rPr lang="en-US" dirty="0" err="1"/>
+              <a:t>current_timestamp</a:t>
+            </a:r>
+            <a:endParaRPr lang="en-US" dirty="0"/>
+          </a:p>
+          <a:p>
+            <a:r>
+              <a:rPr lang="en-US" dirty="0" err="1"/>
+              <a:t>Localtime</a:t>
+            </a:r>
+            <a:endParaRPr lang="en-US" dirty="0"/>
+          </a:p>
+          <a:p>
+            <a:r>
+              <a:rPr lang="en-US" dirty="0" err="1"/>
+              <a:t>Localtimestamp</a:t>
+            </a:r>
+            <a:endParaRPr lang="en-US" dirty="0"/>
+          </a:p>
+          <a:p>
+            <a:r>
+              <a:rPr lang="en-US" dirty="0"/>
+              <a:t>now()</a:t>
+            </a:r>
+          </a:p>
+          <a:p>
+            <a:r>
+              <a:rPr lang="en-US" dirty="0" err="1"/>
+              <a:t>statement_timestamp</a:t>
+            </a:r>
+            <a:r>
+              <a:rPr lang="en-US" dirty="0"/>
+              <a:t>()</a:t>
+            </a:r>
+          </a:p>
+          <a:p>
+            <a:r>
+              <a:rPr lang="en-US" dirty="0" err="1"/>
+              <a:t>timeofday</a:t>
+            </a:r>
+            <a:r>
+              <a:rPr lang="en-US" dirty="0"/>
+              <a:t>()</a:t>
+            </a:r>
+          </a:p>
+          <a:p>
+            <a:r>
+              <a:rPr lang="en-US" dirty="0" err="1">
+                <a:highlight>
+                  <a:srgbClr val="FF0000"/>
+                </a:highlight>
+              </a:rPr>
+              <a:t>transaction_timestamp</a:t>
+            </a:r>
+            <a:r>
               <a:rPr lang="en-US" dirty="0">
-                <a:latin typeface="Courier New" panose="02070309020205020404" pitchFamily="49" charset="0"/>
-                <a:cs typeface="Courier New" panose="02070309020205020404" pitchFamily="49" charset="0"/>
+                <a:highlight>
+                  <a:srgbClr val="FF0000"/>
+                </a:highlight>
               </a:rPr>
-              <a:t>2) </a:t>
-            </a:r>
-          </a:p>
-          <a:p>
-            <a:endParaRPr lang="en-US" dirty="0">
-              <a:latin typeface="Courier New" panose="02070309020205020404" pitchFamily="49" charset="0"/>
-              <a:cs typeface="Courier New" panose="02070309020205020404" pitchFamily="49" charset="0"/>
-            </a:endParaRPr>
-          </a:p>
-          <a:p>
-            <a:r>
-              <a:rPr lang="en-US" dirty="0">
-                <a:latin typeface="Courier New" panose="02070309020205020404" pitchFamily="49" charset="0"/>
-                <a:cs typeface="Courier New" panose="02070309020205020404" pitchFamily="49" charset="0"/>
-              </a:rPr>
-              <a:t>SELECT NOW() :: DATE;</a:t>
-            </a:r>
-          </a:p>
-          <a:p>
-            <a:r>
-              <a:rPr lang="en-US" dirty="0">
-                <a:latin typeface="Courier New" panose="02070309020205020404" pitchFamily="49" charset="0"/>
-                <a:cs typeface="Courier New" panose="02070309020205020404" pitchFamily="49" charset="0"/>
-              </a:rPr>
-              <a:t>SELECT NOW() :: TIME;</a:t>
-            </a:r>
-          </a:p>
-          <a:p>
-            <a:endParaRPr lang="en-US" dirty="0">
-              <a:latin typeface="Courier New" panose="02070309020205020404" pitchFamily="49" charset="0"/>
-              <a:cs typeface="Courier New" panose="02070309020205020404" pitchFamily="49" charset="0"/>
-            </a:endParaRPr>
-          </a:p>
-          <a:p>
-            <a:r>
-              <a:rPr lang="en-US" dirty="0">
-                <a:latin typeface="Courier New" panose="02070309020205020404" pitchFamily="49" charset="0"/>
-                <a:cs typeface="Courier New" panose="02070309020205020404" pitchFamily="49" charset="0"/>
-              </a:rPr>
-              <a:t>- Using the :: (double colon) you can cast (format) the timestamp as a date or time </a:t>
-            </a:r>
+              <a:t>()</a:t>
+            </a:r>
+            <a:r>
+              <a:rPr lang="en-US" dirty="0"/>
+              <a:t>	</a:t>
+            </a:r>
+          </a:p>
+          <a:p>
+            <a:endParaRPr lang="en-US" dirty="0"/>
           </a:p>
         </p:txBody>
       </p:sp>
     </p:spTree>
     <p:extLst>
       <p:ext uri="{BB962C8B-B14F-4D97-AF65-F5344CB8AC3E}">
-        <p14:creationId xmlns:p14="http://schemas.microsoft.com/office/powerpoint/2010/main" val="215803295"/>
+        <p14:creationId xmlns:p14="http://schemas.microsoft.com/office/powerpoint/2010/main" val="3327343980"/>
       </p:ext>
     </p:extLst>
   </p:cSld>
@@ -15252,7 +15784,7 @@
           <p:cNvPr id="2" name="Title 1">
             <a:extLst>
               <a:ext uri="{FF2B5EF4-FFF2-40B4-BE49-F238E27FC236}">
-                <a16:creationId xmlns:a16="http://schemas.microsoft.com/office/drawing/2014/main" id="{C662B513-408F-4526-A2DC-27228DD074DD}"/>
+                <a16:creationId xmlns:a16="http://schemas.microsoft.com/office/drawing/2014/main" id="{20288032-0A35-4119-9DC7-22FA6B8E9797}"/>
               </a:ext>
             </a:extLst>
           </p:cNvPr>
@@ -15263,12 +15795,22 @@
             <p:ph type="title"/>
           </p:nvPr>
         </p:nvSpPr>
-        <p:spPr/>
+        <p:spPr>
+          <a:solidFill>
+            <a:schemeClr val="accent2">
+              <a:lumMod val="60000"/>
+              <a:lumOff val="40000"/>
+            </a:schemeClr>
+          </a:solidFill>
+        </p:spPr>
         <p:txBody>
           <a:bodyPr/>
           <a:lstStyle/>
           <a:p>
-            <a:endParaRPr lang="en-US"/>
+            <a:r>
+              <a:rPr lang="en-US" dirty="0"/>
+              <a:t>Age and interval</a:t>
+            </a:r>
           </a:p>
         </p:txBody>
       </p:sp>
@@ -15277,7 +15819,7 @@
           <p:cNvPr id="3" name="Content Placeholder 2">
             <a:extLst>
               <a:ext uri="{FF2B5EF4-FFF2-40B4-BE49-F238E27FC236}">
-                <a16:creationId xmlns:a16="http://schemas.microsoft.com/office/drawing/2014/main" id="{95DEE2D4-DB30-4A39-86AE-D6C20B4BB097}"/>
+                <a16:creationId xmlns:a16="http://schemas.microsoft.com/office/drawing/2014/main" id="{8656073D-84FA-4E86-8A41-365BD88E422A}"/>
               </a:ext>
             </a:extLst>
           </p:cNvPr>
@@ -15293,49 +15835,26 @@
           <a:bodyPr/>
           <a:lstStyle/>
           <a:p>
+            <a:r>
+              <a:rPr lang="en-US" dirty="0"/>
+              <a:t>age(timestamp)</a:t>
+            </a:r>
+          </a:p>
+          <a:p>
+            <a:r>
+              <a:rPr lang="en-US" dirty="0"/>
+              <a:t>age(timestamp, timestamp)</a:t>
+            </a:r>
+          </a:p>
+          <a:p>
             <a:endParaRPr lang="en-US" dirty="0"/>
-          </a:p>
-          <a:p>
-            <a:r>
-              <a:rPr lang="en-US" dirty="0"/>
-              <a:t>3)</a:t>
-            </a:r>
-          </a:p>
-          <a:p>
-            <a:endParaRPr lang="en-US" dirty="0"/>
-          </a:p>
-          <a:p>
-            <a:r>
-              <a:rPr lang="en-US" dirty="0"/>
-              <a:t>INTERVAL –</a:t>
-            </a:r>
-          </a:p>
-          <a:p>
-            <a:r>
-              <a:rPr lang="en-US" dirty="0"/>
-              <a:t> DATE_PART() function extracts a subfield from a date or time value. The following illustrates the DATE_PART() function:</a:t>
-            </a:r>
-          </a:p>
-          <a:p>
-            <a:r>
-              <a:rPr lang="en-US" dirty="0"/>
-              <a:t>DATE_PART(</a:t>
-            </a:r>
-            <a:r>
-              <a:rPr lang="en-US" dirty="0" err="1"/>
-              <a:t>field,source</a:t>
-            </a:r>
-            <a:r>
-              <a:rPr lang="en-US" dirty="0"/>
-              <a:t>)</a:t>
-            </a:r>
           </a:p>
         </p:txBody>
       </p:sp>
     </p:spTree>
     <p:extLst>
       <p:ext uri="{BB962C8B-B14F-4D97-AF65-F5344CB8AC3E}">
-        <p14:creationId xmlns:p14="http://schemas.microsoft.com/office/powerpoint/2010/main" val="2528630659"/>
+        <p14:creationId xmlns:p14="http://schemas.microsoft.com/office/powerpoint/2010/main" val="2168450629"/>
       </p:ext>
     </p:extLst>
   </p:cSld>
@@ -15380,7 +15899,7 @@
         </p:nvSpPr>
         <p:spPr>
           <a:solidFill>
-            <a:schemeClr val="accent2">
+            <a:schemeClr val="accent6">
               <a:lumMod val="60000"/>
               <a:lumOff val="40000"/>
             </a:schemeClr>
@@ -15392,7 +15911,7 @@
           <a:p>
             <a:r>
               <a:rPr lang="en-US" dirty="0"/>
-              <a:t>What time is it?</a:t>
+              <a:t>Edit selection</a:t>
             </a:r>
           </a:p>
         </p:txBody>
@@ -15416,78 +15935,71 @@
         <p:spPr/>
         <p:txBody>
           <a:bodyPr>
-            <a:normAutofit fontScale="92500" lnSpcReduction="20000"/>
+            <a:normAutofit lnSpcReduction="10000"/>
           </a:bodyPr>
           <a:lstStyle/>
           <a:p>
             <a:r>
               <a:rPr lang="en-US" dirty="0" err="1"/>
-              <a:t>clock_timestamp</a:t>
+              <a:t>date_part</a:t>
             </a:r>
             <a:r>
               <a:rPr lang="en-US" dirty="0"/>
-              <a:t>() </a:t>
+              <a:t>(text, timestamp)</a:t>
             </a:r>
           </a:p>
           <a:p>
             <a:r>
               <a:rPr lang="en-US" dirty="0" err="1"/>
-              <a:t>current_date</a:t>
-            </a:r>
-            <a:endParaRPr lang="en-US" dirty="0"/>
+              <a:t>date_part</a:t>
+            </a:r>
+            <a:r>
+              <a:rPr lang="en-US" dirty="0"/>
+              <a:t>(text, interval)</a:t>
+            </a:r>
           </a:p>
           <a:p>
             <a:r>
               <a:rPr lang="en-US" dirty="0" err="1"/>
-              <a:t>current_time</a:t>
-            </a:r>
-            <a:endParaRPr lang="en-US" dirty="0"/>
+              <a:t>date_trunc</a:t>
+            </a:r>
+            <a:r>
+              <a:rPr lang="en-US" dirty="0"/>
+              <a:t>(text, timestamp)</a:t>
+            </a:r>
           </a:p>
           <a:p>
             <a:r>
               <a:rPr lang="en-US" dirty="0" err="1"/>
-              <a:t>current_timestamp</a:t>
-            </a:r>
-            <a:endParaRPr lang="en-US" dirty="0"/>
-          </a:p>
-          <a:p>
-            <a:r>
-              <a:rPr lang="en-US" dirty="0" err="1"/>
-              <a:t>Localtime</a:t>
-            </a:r>
-            <a:endParaRPr lang="en-US" dirty="0"/>
-          </a:p>
-          <a:p>
-            <a:r>
-              <a:rPr lang="en-US" dirty="0" err="1"/>
-              <a:t>Localtimestamp</a:t>
-            </a:r>
-            <a:endParaRPr lang="en-US" dirty="0"/>
-          </a:p>
-          <a:p>
+              <a:t>date_trunc</a:t>
+            </a:r>
             <a:r>
               <a:rPr lang="en-US" dirty="0"/>
-              <a:t>now()</a:t>
-            </a:r>
-          </a:p>
-          <a:p>
-            <a:r>
-              <a:rPr lang="en-US" dirty="0" err="1"/>
-              <a:t>statement_timestamp</a:t>
+              <a:t>(text, interval)</a:t>
+            </a:r>
+          </a:p>
+          <a:p>
+            <a:r>
+              <a:rPr lang="en-US" dirty="0">
+                <a:highlight>
+                  <a:srgbClr val="FF0000"/>
+                </a:highlight>
+              </a:rPr>
+              <a:t>extract(field from timestamp)</a:t>
+            </a:r>
+          </a:p>
+          <a:p>
+            <a:r>
+              <a:rPr lang="en-US" dirty="0">
+                <a:highlight>
+                  <a:srgbClr val="FF0000"/>
+                </a:highlight>
+              </a:rPr>
+              <a:t>extract(field from interval</a:t>
             </a:r>
             <a:r>
               <a:rPr lang="en-US" dirty="0"/>
-              <a:t>()</a:t>
-            </a:r>
-          </a:p>
-          <a:p>
-            <a:r>
-              <a:rPr lang="en-US" dirty="0" err="1"/>
-              <a:t>timeofday</a:t>
-            </a:r>
-            <a:r>
-              <a:rPr lang="en-US" dirty="0"/>
-              <a:t>()</a:t>
+              <a:t>)</a:t>
             </a:r>
           </a:p>
           <a:p>
@@ -15497,7 +16009,7 @@
                   <a:srgbClr val="FF0000"/>
                 </a:highlight>
               </a:rPr>
-              <a:t>transaction_timestamp</a:t>
+              <a:t>justify_days</a:t>
             </a:r>
             <a:r>
               <a:rPr lang="en-US" dirty="0">
@@ -15505,22 +16017,51 @@
                   <a:srgbClr val="FF0000"/>
                 </a:highlight>
               </a:rPr>
-              <a:t>()</a:t>
-            </a:r>
-            <a:r>
-              <a:rPr lang="en-US" dirty="0"/>
-              <a:t>	</a:t>
-            </a:r>
-          </a:p>
-          <a:p>
-            <a:endParaRPr lang="en-US" dirty="0"/>
+              <a:t>(interval)</a:t>
+            </a:r>
+          </a:p>
+          <a:p>
+            <a:r>
+              <a:rPr lang="en-US" dirty="0" err="1">
+                <a:highlight>
+                  <a:srgbClr val="FF0000"/>
+                </a:highlight>
+              </a:rPr>
+              <a:t>justify_hours</a:t>
+            </a:r>
+            <a:r>
+              <a:rPr lang="en-US" dirty="0">
+                <a:highlight>
+                  <a:srgbClr val="FF0000"/>
+                </a:highlight>
+              </a:rPr>
+              <a:t>(interval)</a:t>
+            </a:r>
+          </a:p>
+          <a:p>
+            <a:r>
+              <a:rPr lang="en-US" dirty="0" err="1">
+                <a:highlight>
+                  <a:srgbClr val="FF0000"/>
+                </a:highlight>
+              </a:rPr>
+              <a:t>justify_interval</a:t>
+            </a:r>
+            <a:r>
+              <a:rPr lang="en-US" dirty="0">
+                <a:highlight>
+                  <a:srgbClr val="FF0000"/>
+                </a:highlight>
+              </a:rPr>
+              <a:t>(interval)</a:t>
+            </a:r>
           </a:p>
         </p:txBody>
       </p:sp>
     </p:spTree>
     <p:extLst>
       <p:ext uri="{BB962C8B-B14F-4D97-AF65-F5344CB8AC3E}">
-        <p14:creationId xmlns:p14="http://schemas.microsoft.com/office/powerpoint/2010/main" val="3327343980"/>
+        <p14:creationId xmlns:p14="http://schemas.microsoft.com/office/powerpoint/2010/main" val="70856588"/>
       </p:ext>
     </p:extLst>
   </p:cSld>
@@ -15552,7 +16093,7 @@
           <p:cNvPr id="2" name="Title 1">
             <a:extLst>
               <a:ext uri="{FF2B5EF4-FFF2-40B4-BE49-F238E27FC236}">
-                <a16:creationId xmlns:a16="http://schemas.microsoft.com/office/drawing/2014/main" id="{20288032-0A35-4119-9DC7-22FA6B8E9797}"/>
+                <a16:creationId xmlns:a16="http://schemas.microsoft.com/office/drawing/2014/main" id="{86552A4B-67D6-4AEF-B487-CE5E107CF63C}"/>
               </a:ext>
             </a:extLst>
           </p:cNvPr>
@@ -15565,7 +16106,7 @@
         </p:nvSpPr>
         <p:spPr>
           <a:solidFill>
-            <a:schemeClr val="accent2">
+            <a:schemeClr val="accent6">
               <a:lumMod val="60000"/>
               <a:lumOff val="40000"/>
             </a:schemeClr>
@@ -15577,7 +16118,7 @@
           <a:p>
             <a:r>
               <a:rPr lang="en-US" dirty="0"/>
-              <a:t>Age and interval</a:t>
+              <a:t>Make it so</a:t>
             </a:r>
           </a:p>
         </p:txBody>
@@ -15587,7 +16128,7 @@
           <p:cNvPr id="3" name="Content Placeholder 2">
             <a:extLst>
               <a:ext uri="{FF2B5EF4-FFF2-40B4-BE49-F238E27FC236}">
-                <a16:creationId xmlns:a16="http://schemas.microsoft.com/office/drawing/2014/main" id="{8656073D-84FA-4E86-8A41-365BD88E422A}"/>
+                <a16:creationId xmlns:a16="http://schemas.microsoft.com/office/drawing/2014/main" id="{EA2561B4-DD47-4A30-9988-F1B56987E0DA}"/>
               </a:ext>
             </a:extLst>
           </p:cNvPr>
@@ -15604,25 +16145,66 @@
           <a:lstStyle/>
           <a:p>
             <a:r>
+              <a:rPr lang="en-US" dirty="0" err="1"/>
+              <a:t>make_date</a:t>
+            </a:r>
+            <a:r>
               <a:rPr lang="en-US" dirty="0"/>
-              <a:t>age(timestamp)</a:t>
-            </a:r>
-          </a:p>
-          <a:p>
+              <a:t>(year int, month int, day int)</a:t>
+            </a:r>
+          </a:p>
+          <a:p>
+            <a:r>
+              <a:rPr lang="en-US" dirty="0" err="1"/>
+              <a:t>make_interval</a:t>
+            </a:r>
             <a:r>
               <a:rPr lang="en-US" dirty="0"/>
-              <a:t>age(timestamp, timestamp)</a:t>
-            </a:r>
-          </a:p>
-          <a:p>
-            <a:endParaRPr lang="en-US" dirty="0"/>
+              <a:t>(years int DEFAULT 0, months int DEFAULT 0, weeks int DEFAULT 0, days int DEFAULT 0, hours int DEFAULT 0, mins int DEFAULT 0, secs double precision DEFAULT 0.0)</a:t>
+            </a:r>
+          </a:p>
+          <a:p>
+            <a:r>
+              <a:rPr lang="en-US" dirty="0" err="1">
+                <a:highlight>
+                  <a:srgbClr val="FF0000"/>
+                </a:highlight>
+              </a:rPr>
+              <a:t>make_time</a:t>
+            </a:r>
+            <a:r>
+              <a:rPr lang="en-US" dirty="0">
+                <a:highlight>
+                  <a:srgbClr val="FF0000"/>
+                </a:highlight>
+              </a:rPr>
+              <a:t>(hour int, min int, sec double precision)</a:t>
+            </a:r>
+          </a:p>
+          <a:p>
+            <a:r>
+              <a:rPr lang="en-US" dirty="0" err="1"/>
+              <a:t>make_timestamptz</a:t>
+            </a:r>
+            <a:r>
+              <a:rPr lang="en-US" dirty="0"/>
+              <a:t>(year int, month int, day int, hour int, min int, sec double precision, [ </a:t>
+            </a:r>
+            <a:r>
+              <a:rPr lang="en-US" dirty="0" err="1"/>
+              <a:t>timezone</a:t>
+            </a:r>
+            <a:r>
+              <a:rPr lang="en-US" dirty="0"/>
+              <a:t> text ])</a:t>
+            </a:r>
           </a:p>
         </p:txBody>
       </p:sp>
     </p:spTree>
     <p:extLst>
       <p:ext uri="{BB962C8B-B14F-4D97-AF65-F5344CB8AC3E}">
-        <p14:creationId xmlns:p14="http://schemas.microsoft.com/office/powerpoint/2010/main" val="2168450629"/>
+        <p14:creationId xmlns:p14="http://schemas.microsoft.com/office/powerpoint/2010/main" val="500948338"/>
       </p:ext>
     </p:extLst>
   </p:cSld>
@@ -18735,353 +19317,6 @@
           <p:cNvPr id="2" name="Title 1">
             <a:extLst>
               <a:ext uri="{FF2B5EF4-FFF2-40B4-BE49-F238E27FC236}">
-                <a16:creationId xmlns:a16="http://schemas.microsoft.com/office/drawing/2014/main" id="{20288032-0A35-4119-9DC7-22FA6B8E9797}"/>
-              </a:ext>
-            </a:extLst>
-          </p:cNvPr>
-          <p:cNvSpPr>
-            <a:spLocks noGrp="1"/>
-          </p:cNvSpPr>
-          <p:nvPr>
-            <p:ph type="title"/>
-          </p:nvPr>
-        </p:nvSpPr>
-        <p:spPr>
-          <a:solidFill>
-            <a:schemeClr val="accent2">
-              <a:lumMod val="60000"/>
-              <a:lumOff val="40000"/>
-            </a:schemeClr>
-          </a:solidFill>
-        </p:spPr>
-        <p:txBody>
-          <a:bodyPr/>
-          <a:lstStyle/>
-          <a:p>
-            <a:r>
-              <a:rPr lang="en-US" dirty="0"/>
-              <a:t>Edit selection</a:t>
-            </a:r>
-          </a:p>
-        </p:txBody>
-      </p:sp>
-      <p:sp>
-        <p:nvSpPr>
-          <p:cNvPr id="3" name="Content Placeholder 2">
-            <a:extLst>
-              <a:ext uri="{FF2B5EF4-FFF2-40B4-BE49-F238E27FC236}">
-                <a16:creationId xmlns:a16="http://schemas.microsoft.com/office/drawing/2014/main" id="{8656073D-84FA-4E86-8A41-365BD88E422A}"/>
-              </a:ext>
-            </a:extLst>
-          </p:cNvPr>
-          <p:cNvSpPr>
-            <a:spLocks noGrp="1"/>
-          </p:cNvSpPr>
-          <p:nvPr>
-            <p:ph idx="1"/>
-          </p:nvPr>
-        </p:nvSpPr>
-        <p:spPr/>
-        <p:txBody>
-          <a:bodyPr>
-            <a:normAutofit lnSpcReduction="10000"/>
-          </a:bodyPr>
-          <a:lstStyle/>
-          <a:p>
-            <a:r>
-              <a:rPr lang="en-US" dirty="0" err="1"/>
-              <a:t>date_part</a:t>
-            </a:r>
-            <a:r>
-              <a:rPr lang="en-US" dirty="0"/>
-              <a:t>(text, timestamp)</a:t>
-            </a:r>
-          </a:p>
-          <a:p>
-            <a:r>
-              <a:rPr lang="en-US" dirty="0" err="1"/>
-              <a:t>date_part</a:t>
-            </a:r>
-            <a:r>
-              <a:rPr lang="en-US" dirty="0"/>
-              <a:t>(text, interval)</a:t>
-            </a:r>
-          </a:p>
-          <a:p>
-            <a:r>
-              <a:rPr lang="en-US" dirty="0" err="1"/>
-              <a:t>date_trunc</a:t>
-            </a:r>
-            <a:r>
-              <a:rPr lang="en-US" dirty="0"/>
-              <a:t>(text, timestamp)</a:t>
-            </a:r>
-          </a:p>
-          <a:p>
-            <a:r>
-              <a:rPr lang="en-US" dirty="0" err="1"/>
-              <a:t>date_trunc</a:t>
-            </a:r>
-            <a:r>
-              <a:rPr lang="en-US" dirty="0"/>
-              <a:t>(text, interval)</a:t>
-            </a:r>
-          </a:p>
-          <a:p>
-            <a:r>
-              <a:rPr lang="en-US" dirty="0">
-                <a:highlight>
-                  <a:srgbClr val="FF0000"/>
-                </a:highlight>
-              </a:rPr>
-              <a:t>extract(field from timestamp)</a:t>
-            </a:r>
-          </a:p>
-          <a:p>
-            <a:r>
-              <a:rPr lang="en-US" dirty="0">
-                <a:highlight>
-                  <a:srgbClr val="FF0000"/>
-                </a:highlight>
-              </a:rPr>
-              <a:t>extract(field from interval</a:t>
-            </a:r>
-            <a:r>
-              <a:rPr lang="en-US" dirty="0"/>
-              <a:t>)</a:t>
-            </a:r>
-          </a:p>
-          <a:p>
-            <a:r>
-              <a:rPr lang="en-US" dirty="0" err="1">
-                <a:highlight>
-                  <a:srgbClr val="FF0000"/>
-                </a:highlight>
-              </a:rPr>
-              <a:t>justify_days</a:t>
-            </a:r>
-            <a:r>
-              <a:rPr lang="en-US" dirty="0">
-                <a:highlight>
-                  <a:srgbClr val="FF0000"/>
-                </a:highlight>
-              </a:rPr>
-              <a:t>(interval)</a:t>
-            </a:r>
-          </a:p>
-          <a:p>
-            <a:r>
-              <a:rPr lang="en-US" dirty="0" err="1">
-                <a:highlight>
-                  <a:srgbClr val="FF0000"/>
-                </a:highlight>
-              </a:rPr>
-              <a:t>justify_hours</a:t>
-            </a:r>
-            <a:r>
-              <a:rPr lang="en-US" dirty="0">
-                <a:highlight>
-                  <a:srgbClr val="FF0000"/>
-                </a:highlight>
-              </a:rPr>
-              <a:t>(interval)</a:t>
-            </a:r>
-          </a:p>
-          <a:p>
-            <a:r>
-              <a:rPr lang="en-US" dirty="0" err="1">
-                <a:highlight>
-                  <a:srgbClr val="FF0000"/>
-                </a:highlight>
-              </a:rPr>
-              <a:t>justify_interval</a:t>
-            </a:r>
-            <a:r>
-              <a:rPr lang="en-US" dirty="0">
-                <a:highlight>
-                  <a:srgbClr val="FF0000"/>
-                </a:highlight>
-              </a:rPr>
-              <a:t>(interval)</a:t>
-            </a:r>
-          </a:p>
-        </p:txBody>
-      </p:sp>
-    </p:spTree>
-    <p:extLst>
-      <p:ext uri="{BB962C8B-B14F-4D97-AF65-F5344CB8AC3E}">
-        <p14:creationId xmlns:p14="http://schemas.microsoft.com/office/powerpoint/2010/main" val="70856588"/>
-      </p:ext>
-    </p:extLst>
-  </p:cSld>
-  <p:clrMapOvr>
-    <a:masterClrMapping/>
-  </p:clrMapOvr>
-</p:sld>
-</file>
-
-<file path=ppt/slides/slide51.xml><?xml version="1.0" encoding="utf-8"?>
-<p:sld xmlns:a="http://schemas.openxmlformats.org/drawingml/2006/main" xmlns:r="http://schemas.openxmlformats.org/officeDocument/2006/relationships" xmlns:p="http://schemas.openxmlformats.org/presentationml/2006/main">
-  <p:cSld>
-    <p:spTree>
-      <p:nvGrpSpPr>
-        <p:cNvPr id="1" name=""/>
-        <p:cNvGrpSpPr/>
-        <p:nvPr/>
-      </p:nvGrpSpPr>
-      <p:grpSpPr>
-        <a:xfrm>
-          <a:off x="0" y="0"/>
-          <a:ext cx="0" cy="0"/>
-          <a:chOff x="0" y="0"/>
-          <a:chExt cx="0" cy="0"/>
-        </a:xfrm>
-      </p:grpSpPr>
-      <p:sp>
-        <p:nvSpPr>
-          <p:cNvPr id="2" name="Title 1">
-            <a:extLst>
-              <a:ext uri="{FF2B5EF4-FFF2-40B4-BE49-F238E27FC236}">
-                <a16:creationId xmlns:a16="http://schemas.microsoft.com/office/drawing/2014/main" id="{86552A4B-67D6-4AEF-B487-CE5E107CF63C}"/>
-              </a:ext>
-            </a:extLst>
-          </p:cNvPr>
-          <p:cNvSpPr>
-            <a:spLocks noGrp="1"/>
-          </p:cNvSpPr>
-          <p:nvPr>
-            <p:ph type="title"/>
-          </p:nvPr>
-        </p:nvSpPr>
-        <p:spPr>
-          <a:solidFill>
-            <a:schemeClr val="accent6"/>
-          </a:solidFill>
-        </p:spPr>
-        <p:txBody>
-          <a:bodyPr/>
-          <a:lstStyle/>
-          <a:p>
-            <a:r>
-              <a:rPr lang="en-US" dirty="0"/>
-              <a:t>Make it so</a:t>
-            </a:r>
-          </a:p>
-        </p:txBody>
-      </p:sp>
-      <p:sp>
-        <p:nvSpPr>
-          <p:cNvPr id="3" name="Content Placeholder 2">
-            <a:extLst>
-              <a:ext uri="{FF2B5EF4-FFF2-40B4-BE49-F238E27FC236}">
-                <a16:creationId xmlns:a16="http://schemas.microsoft.com/office/drawing/2014/main" id="{EA2561B4-DD47-4A30-9988-F1B56987E0DA}"/>
-              </a:ext>
-            </a:extLst>
-          </p:cNvPr>
-          <p:cNvSpPr>
-            <a:spLocks noGrp="1"/>
-          </p:cNvSpPr>
-          <p:nvPr>
-            <p:ph idx="1"/>
-          </p:nvPr>
-        </p:nvSpPr>
-        <p:spPr/>
-        <p:txBody>
-          <a:bodyPr/>
-          <a:lstStyle/>
-          <a:p>
-            <a:r>
-              <a:rPr lang="en-US" dirty="0" err="1"/>
-              <a:t>make_date</a:t>
-            </a:r>
-            <a:r>
-              <a:rPr lang="en-US" dirty="0"/>
-              <a:t>(year int, month int, day int)</a:t>
-            </a:r>
-          </a:p>
-          <a:p>
-            <a:r>
-              <a:rPr lang="en-US" dirty="0" err="1"/>
-              <a:t>make_interval</a:t>
-            </a:r>
-            <a:r>
-              <a:rPr lang="en-US" dirty="0"/>
-              <a:t>(years int DEFAULT 0, months int DEFAULT 0, weeks int DEFAULT 0, days int DEFAULT 0, hours int DEFAULT 0, mins int DEFAULT 0, secs double precision DEFAULT 0.0)</a:t>
-            </a:r>
-          </a:p>
-          <a:p>
-            <a:r>
-              <a:rPr lang="en-US" dirty="0" err="1">
-                <a:highlight>
-                  <a:srgbClr val="FF0000"/>
-                </a:highlight>
-              </a:rPr>
-              <a:t>make_time</a:t>
-            </a:r>
-            <a:r>
-              <a:rPr lang="en-US" dirty="0">
-                <a:highlight>
-                  <a:srgbClr val="FF0000"/>
-                </a:highlight>
-              </a:rPr>
-              <a:t>(hour int, min int, sec double precision)</a:t>
-            </a:r>
-          </a:p>
-          <a:p>
-            <a:r>
-              <a:rPr lang="en-US" dirty="0" err="1"/>
-              <a:t>make_timestamptz</a:t>
-            </a:r>
-            <a:r>
-              <a:rPr lang="en-US" dirty="0"/>
-              <a:t>(year int, month int, day int, hour int, min int, sec double precision, [ </a:t>
-            </a:r>
-            <a:r>
-              <a:rPr lang="en-US" dirty="0" err="1"/>
-              <a:t>timezone</a:t>
-            </a:r>
-            <a:r>
-              <a:rPr lang="en-US" dirty="0"/>
-              <a:t> text ])</a:t>
-            </a:r>
-          </a:p>
-        </p:txBody>
-      </p:sp>
-    </p:spTree>
-    <p:extLst>
-      <p:ext uri="{BB962C8B-B14F-4D97-AF65-F5344CB8AC3E}">
-        <p14:creationId xmlns:p14="http://schemas.microsoft.com/office/powerpoint/2010/main" val="500948338"/>
-      </p:ext>
-    </p:extLst>
-  </p:cSld>
-  <p:clrMapOvr>
-    <a:masterClrMapping/>
-  </p:clrMapOvr>
-</p:sld>
-</file>
-
-<file path=ppt/slides/slide52.xml><?xml version="1.0" encoding="utf-8"?>
-<p:sld xmlns:a="http://schemas.openxmlformats.org/drawingml/2006/main" xmlns:r="http://schemas.openxmlformats.org/officeDocument/2006/relationships" xmlns:p="http://schemas.openxmlformats.org/presentationml/2006/main">
-  <p:cSld>
-    <p:spTree>
-      <p:nvGrpSpPr>
-        <p:cNvPr id="1" name=""/>
-        <p:cNvGrpSpPr/>
-        <p:nvPr/>
-      </p:nvGrpSpPr>
-      <p:grpSpPr>
-        <a:xfrm>
-          <a:off x="0" y="0"/>
-          <a:ext cx="0" cy="0"/>
-          <a:chOff x="0" y="0"/>
-          <a:chExt cx="0" cy="0"/>
-        </a:xfrm>
-      </p:grpSpPr>
-      <p:sp>
-        <p:nvSpPr>
-          <p:cNvPr id="2" name="Title 1">
-            <a:extLst>
-              <a:ext uri="{FF2B5EF4-FFF2-40B4-BE49-F238E27FC236}">
                 <a16:creationId xmlns:a16="http://schemas.microsoft.com/office/drawing/2014/main" id="{28677F6D-93C0-4A95-A536-490459BE7015}"/>
               </a:ext>
             </a:extLst>

</xml_diff>